<commit_message>
Adding nearly finished Poster
</commit_message>
<xml_diff>
--- a/Posters/JacobORDSpring2019.pptx
+++ b/Posters/JacobORDSpring2019.pptx
@@ -1,22 +1,435 @@
 
 <file path=ppt/presentation.xml><?xml version="1.0" encoding="utf-8"?>
-<p:presentation xmlns:a="http://schemas.openxmlformats.org/drawingml/2006/main" xmlns:p="http://schemas.openxmlformats.org/presentationml/2006/main" xmlns:r="http://schemas.openxmlformats.org/officeDocument/2006/relationships" xmlns:p14="http://schemas.microsoft.com/office/powerpoint/2010/main" xmlns:p15="http://schemas.microsoft.com/office/powerpoint/2012/main" xmlns:mc="http://schemas.openxmlformats.org/markup-compatibility/2006">
+<p:presentation xmlns:a="http://schemas.openxmlformats.org/drawingml/2006/main" xmlns:r="http://schemas.openxmlformats.org/officeDocument/2006/relationships" xmlns:p="http://schemas.openxmlformats.org/presentationml/2006/main">
   <p:sldMasterIdLst>
-    <p:sldMasterId id="2147483648" r:id="rId2"/>
+    <p:sldMasterId id="2147483648" r:id="rId1"/>
   </p:sldMasterIdLst>
   <p:notesMasterIdLst>
     <p:notesMasterId r:id="rId3"/>
   </p:notesMasterIdLst>
   <p:sldIdLst>
-    <p:sldId id="256" r:id="rId4"/>
+    <p:sldId id="256" r:id="rId2"/>
   </p:sldIdLst>
   <p:sldSz cx="43891200" cy="32918400"/>
   <p:notesSz cx="7010400" cy="9296400"/>
+  <p:defaultTextStyle>
+    <a:defPPr>
+      <a:defRPr lang="en-US"/>
+    </a:defPPr>
+    <a:lvl1pPr marL="0" algn="l" defTabSz="914400" rtl="0" eaLnBrk="1" latinLnBrk="0" hangingPunct="1">
+      <a:defRPr sz="1800" kern="1200">
+        <a:solidFill>
+          <a:schemeClr val="tx1"/>
+        </a:solidFill>
+        <a:latin typeface="+mn-lt"/>
+        <a:ea typeface="+mn-ea"/>
+        <a:cs typeface="+mn-cs"/>
+      </a:defRPr>
+    </a:lvl1pPr>
+    <a:lvl2pPr marL="457200" algn="l" defTabSz="914400" rtl="0" eaLnBrk="1" latinLnBrk="0" hangingPunct="1">
+      <a:defRPr sz="1800" kern="1200">
+        <a:solidFill>
+          <a:schemeClr val="tx1"/>
+        </a:solidFill>
+        <a:latin typeface="+mn-lt"/>
+        <a:ea typeface="+mn-ea"/>
+        <a:cs typeface="+mn-cs"/>
+      </a:defRPr>
+    </a:lvl2pPr>
+    <a:lvl3pPr marL="914400" algn="l" defTabSz="914400" rtl="0" eaLnBrk="1" latinLnBrk="0" hangingPunct="1">
+      <a:defRPr sz="1800" kern="1200">
+        <a:solidFill>
+          <a:schemeClr val="tx1"/>
+        </a:solidFill>
+        <a:latin typeface="+mn-lt"/>
+        <a:ea typeface="+mn-ea"/>
+        <a:cs typeface="+mn-cs"/>
+      </a:defRPr>
+    </a:lvl3pPr>
+    <a:lvl4pPr marL="1371600" algn="l" defTabSz="914400" rtl="0" eaLnBrk="1" latinLnBrk="0" hangingPunct="1">
+      <a:defRPr sz="1800" kern="1200">
+        <a:solidFill>
+          <a:schemeClr val="tx1"/>
+        </a:solidFill>
+        <a:latin typeface="+mn-lt"/>
+        <a:ea typeface="+mn-ea"/>
+        <a:cs typeface="+mn-cs"/>
+      </a:defRPr>
+    </a:lvl4pPr>
+    <a:lvl5pPr marL="1828800" algn="l" defTabSz="914400" rtl="0" eaLnBrk="1" latinLnBrk="0" hangingPunct="1">
+      <a:defRPr sz="1800" kern="1200">
+        <a:solidFill>
+          <a:schemeClr val="tx1"/>
+        </a:solidFill>
+        <a:latin typeface="+mn-lt"/>
+        <a:ea typeface="+mn-ea"/>
+        <a:cs typeface="+mn-cs"/>
+      </a:defRPr>
+    </a:lvl5pPr>
+    <a:lvl6pPr marL="2286000" algn="l" defTabSz="914400" rtl="0" eaLnBrk="1" latinLnBrk="0" hangingPunct="1">
+      <a:defRPr sz="1800" kern="1200">
+        <a:solidFill>
+          <a:schemeClr val="tx1"/>
+        </a:solidFill>
+        <a:latin typeface="+mn-lt"/>
+        <a:ea typeface="+mn-ea"/>
+        <a:cs typeface="+mn-cs"/>
+      </a:defRPr>
+    </a:lvl6pPr>
+    <a:lvl7pPr marL="2743200" algn="l" defTabSz="914400" rtl="0" eaLnBrk="1" latinLnBrk="0" hangingPunct="1">
+      <a:defRPr sz="1800" kern="1200">
+        <a:solidFill>
+          <a:schemeClr val="tx1"/>
+        </a:solidFill>
+        <a:latin typeface="+mn-lt"/>
+        <a:ea typeface="+mn-ea"/>
+        <a:cs typeface="+mn-cs"/>
+      </a:defRPr>
+    </a:lvl7pPr>
+    <a:lvl8pPr marL="3200400" algn="l" defTabSz="914400" rtl="0" eaLnBrk="1" latinLnBrk="0" hangingPunct="1">
+      <a:defRPr sz="1800" kern="1200">
+        <a:solidFill>
+          <a:schemeClr val="tx1"/>
+        </a:solidFill>
+        <a:latin typeface="+mn-lt"/>
+        <a:ea typeface="+mn-ea"/>
+        <a:cs typeface="+mn-cs"/>
+      </a:defRPr>
+    </a:lvl8pPr>
+    <a:lvl9pPr marL="3657600" algn="l" defTabSz="914400" rtl="0" eaLnBrk="1" latinLnBrk="0" hangingPunct="1">
+      <a:defRPr sz="1800" kern="1200">
+        <a:solidFill>
+          <a:schemeClr val="tx1"/>
+        </a:solidFill>
+        <a:latin typeface="+mn-lt"/>
+        <a:ea typeface="+mn-ea"/>
+        <a:cs typeface="+mn-cs"/>
+      </a:defRPr>
+    </a:lvl9pPr>
+  </p:defaultTextStyle>
 </p:presentation>
 </file>
 
 <file path=ppt/notesMasters/notesMaster1.xml><?xml version="1.0" encoding="utf-8"?>
-<p:notesMaster xmlns:a="http://schemas.openxmlformats.org/drawingml/2006/main" xmlns:p="http://schemas.openxmlformats.org/presentationml/2006/main" xmlns:r="http://schemas.openxmlformats.org/officeDocument/2006/relationships" xmlns:p14="http://schemas.microsoft.com/office/powerpoint/2010/main" xmlns:p15="http://schemas.microsoft.com/office/powerpoint/2012/main" xmlns:mc="http://schemas.openxmlformats.org/markup-compatibility/2006">
+<p:notesMaster xmlns:a="http://schemas.openxmlformats.org/drawingml/2006/main" xmlns:r="http://schemas.openxmlformats.org/officeDocument/2006/relationships" xmlns:p="http://schemas.openxmlformats.org/presentationml/2006/main">
+  <p:cSld>
+    <p:bg>
+      <p:bgRef idx="1001">
+        <a:schemeClr val="bg1"/>
+      </p:bgRef>
+    </p:bg>
+    <p:spTree>
+      <p:nvGrpSpPr>
+        <p:cNvPr id="1" name=""/>
+        <p:cNvGrpSpPr/>
+        <p:nvPr/>
+      </p:nvGrpSpPr>
+      <p:grpSpPr>
+        <a:xfrm>
+          <a:off x="0" y="0"/>
+          <a:ext cx="0" cy="0"/>
+          <a:chOff x="0" y="0"/>
+          <a:chExt cx="0" cy="0"/>
+        </a:xfrm>
+      </p:grpSpPr>
+      <p:sp>
+        <p:nvSpPr>
+          <p:cNvPr id="40" name="PlaceHolder 1"/>
+          <p:cNvSpPr>
+            <a:spLocks noGrp="1" noRot="1" noChangeAspect="1"/>
+          </p:cNvSpPr>
+          <p:nvPr>
+            <p:ph type="sldImg"/>
+          </p:nvPr>
+        </p:nvSpPr>
+        <p:spPr>
+          <a:xfrm>
+            <a:off x="533520" y="764280"/>
+            <a:ext cx="6704640" cy="3771360"/>
+          </a:xfrm>
+          <a:prstGeom prst="rect">
+            <a:avLst/>
+          </a:prstGeom>
+        </p:spPr>
+        <p:txBody>
+          <a:bodyPr lIns="0" tIns="0" rIns="0" bIns="0" anchor="ctr"/>
+          <a:lstStyle/>
+          <a:p>
+            <a:pPr algn="ctr"/>
+            <a:r>
+              <a:rPr lang="en-US" sz="4400" b="0" strike="noStrike" spc="-1">
+                <a:latin typeface="Arial"/>
+              </a:rPr>
+              <a:t>Click to move the slide</a:t>
+            </a:r>
+          </a:p>
+        </p:txBody>
+      </p:sp>
+      <p:sp>
+        <p:nvSpPr>
+          <p:cNvPr id="41" name="PlaceHolder 2"/>
+          <p:cNvSpPr>
+            <a:spLocks noGrp="1"/>
+          </p:cNvSpPr>
+          <p:nvPr>
+            <p:ph type="body"/>
+          </p:nvPr>
+        </p:nvSpPr>
+        <p:spPr>
+          <a:xfrm>
+            <a:off x="777240" y="4777560"/>
+            <a:ext cx="6217560" cy="4525920"/>
+          </a:xfrm>
+          <a:prstGeom prst="rect">
+            <a:avLst/>
+          </a:prstGeom>
+        </p:spPr>
+        <p:txBody>
+          <a:bodyPr lIns="0" tIns="0" rIns="0" bIns="0"/>
+          <a:lstStyle/>
+          <a:p>
+            <a:r>
+              <a:rPr lang="en-US" sz="2000" b="0" strike="noStrike" spc="-1">
+                <a:latin typeface="Arial"/>
+              </a:rPr>
+              <a:t>Click to edit the notes format</a:t>
+            </a:r>
+          </a:p>
+        </p:txBody>
+      </p:sp>
+      <p:sp>
+        <p:nvSpPr>
+          <p:cNvPr id="42" name="PlaceHolder 3"/>
+          <p:cNvSpPr>
+            <a:spLocks noGrp="1"/>
+          </p:cNvSpPr>
+          <p:nvPr>
+            <p:ph type="hdr"/>
+          </p:nvPr>
+        </p:nvSpPr>
+        <p:spPr>
+          <a:xfrm>
+            <a:off x="0" y="0"/>
+            <a:ext cx="3372840" cy="502560"/>
+          </a:xfrm>
+          <a:prstGeom prst="rect">
+            <a:avLst/>
+          </a:prstGeom>
+        </p:spPr>
+        <p:txBody>
+          <a:bodyPr lIns="0" tIns="0" rIns="0" bIns="0"/>
+          <a:lstStyle/>
+          <a:p>
+            <a:r>
+              <a:rPr lang="en-US" sz="1400" b="0" strike="noStrike" spc="-1">
+                <a:latin typeface="Times New Roman"/>
+              </a:rPr>
+              <a:t>&lt;header&gt;</a:t>
+            </a:r>
+          </a:p>
+        </p:txBody>
+      </p:sp>
+      <p:sp>
+        <p:nvSpPr>
+          <p:cNvPr id="43" name="PlaceHolder 4"/>
+          <p:cNvSpPr>
+            <a:spLocks noGrp="1"/>
+          </p:cNvSpPr>
+          <p:nvPr>
+            <p:ph type="dt"/>
+          </p:nvPr>
+        </p:nvSpPr>
+        <p:spPr>
+          <a:xfrm>
+            <a:off x="4399200" y="0"/>
+            <a:ext cx="3372840" cy="502560"/>
+          </a:xfrm>
+          <a:prstGeom prst="rect">
+            <a:avLst/>
+          </a:prstGeom>
+        </p:spPr>
+        <p:txBody>
+          <a:bodyPr lIns="0" tIns="0" rIns="0" bIns="0"/>
+          <a:lstStyle/>
+          <a:p>
+            <a:pPr algn="r"/>
+            <a:r>
+              <a:rPr lang="en-US" sz="1400" b="0" strike="noStrike" spc="-1">
+                <a:latin typeface="Times New Roman"/>
+              </a:rPr>
+              <a:t>&lt;date/time&gt;</a:t>
+            </a:r>
+          </a:p>
+        </p:txBody>
+      </p:sp>
+      <p:sp>
+        <p:nvSpPr>
+          <p:cNvPr id="44" name="PlaceHolder 5"/>
+          <p:cNvSpPr>
+            <a:spLocks noGrp="1"/>
+          </p:cNvSpPr>
+          <p:nvPr>
+            <p:ph type="ftr"/>
+          </p:nvPr>
+        </p:nvSpPr>
+        <p:spPr>
+          <a:xfrm>
+            <a:off x="0" y="9555480"/>
+            <a:ext cx="3372840" cy="502560"/>
+          </a:xfrm>
+          <a:prstGeom prst="rect">
+            <a:avLst/>
+          </a:prstGeom>
+        </p:spPr>
+        <p:txBody>
+          <a:bodyPr lIns="0" tIns="0" rIns="0" bIns="0" anchor="b"/>
+          <a:lstStyle/>
+          <a:p>
+            <a:r>
+              <a:rPr lang="en-US" sz="1400" b="0" strike="noStrike" spc="-1">
+                <a:latin typeface="Times New Roman"/>
+              </a:rPr>
+              <a:t>&lt;footer&gt;</a:t>
+            </a:r>
+          </a:p>
+        </p:txBody>
+      </p:sp>
+      <p:sp>
+        <p:nvSpPr>
+          <p:cNvPr id="45" name="PlaceHolder 6"/>
+          <p:cNvSpPr>
+            <a:spLocks noGrp="1"/>
+          </p:cNvSpPr>
+          <p:nvPr>
+            <p:ph type="sldNum"/>
+          </p:nvPr>
+        </p:nvSpPr>
+        <p:spPr>
+          <a:xfrm>
+            <a:off x="4399200" y="9555480"/>
+            <a:ext cx="3372840" cy="502560"/>
+          </a:xfrm>
+          <a:prstGeom prst="rect">
+            <a:avLst/>
+          </a:prstGeom>
+        </p:spPr>
+        <p:txBody>
+          <a:bodyPr lIns="0" tIns="0" rIns="0" bIns="0" anchor="b"/>
+          <a:lstStyle/>
+          <a:p>
+            <a:pPr algn="r"/>
+            <a:fld id="{0C00F8E5-3894-4751-B318-C6DD93AD492E}" type="slidenum">
+              <a:rPr lang="en-US" sz="1400" b="0" strike="noStrike" spc="-1">
+                <a:latin typeface="Times New Roman"/>
+              </a:rPr>
+              <a:t>‹#›</a:t>
+            </a:fld>
+            <a:endParaRPr lang="en-US" sz="1400" b="0" strike="noStrike" spc="-1">
+              <a:latin typeface="Times New Roman"/>
+            </a:endParaRPr>
+          </a:p>
+        </p:txBody>
+      </p:sp>
+    </p:spTree>
+  </p:cSld>
+  <p:clrMap bg1="lt1" tx1="dk1" bg2="lt2" tx2="dk2" accent1="accent1" accent2="accent2" accent3="accent3" accent4="accent4" accent5="accent5" accent6="accent6" hlink="hlink" folHlink="folHlink"/>
+  <p:notesStyle>
+    <a:lvl1pPr marL="0" algn="l" defTabSz="914400" rtl="0" eaLnBrk="1" latinLnBrk="0" hangingPunct="1">
+      <a:defRPr sz="1200" kern="1200">
+        <a:solidFill>
+          <a:schemeClr val="tx1"/>
+        </a:solidFill>
+        <a:latin typeface="+mn-lt"/>
+        <a:ea typeface="+mn-ea"/>
+        <a:cs typeface="+mn-cs"/>
+      </a:defRPr>
+    </a:lvl1pPr>
+    <a:lvl2pPr marL="457200" algn="l" defTabSz="914400" rtl="0" eaLnBrk="1" latinLnBrk="0" hangingPunct="1">
+      <a:defRPr sz="1200" kern="1200">
+        <a:solidFill>
+          <a:schemeClr val="tx1"/>
+        </a:solidFill>
+        <a:latin typeface="+mn-lt"/>
+        <a:ea typeface="+mn-ea"/>
+        <a:cs typeface="+mn-cs"/>
+      </a:defRPr>
+    </a:lvl2pPr>
+    <a:lvl3pPr marL="914400" algn="l" defTabSz="914400" rtl="0" eaLnBrk="1" latinLnBrk="0" hangingPunct="1">
+      <a:defRPr sz="1200" kern="1200">
+        <a:solidFill>
+          <a:schemeClr val="tx1"/>
+        </a:solidFill>
+        <a:latin typeface="+mn-lt"/>
+        <a:ea typeface="+mn-ea"/>
+        <a:cs typeface="+mn-cs"/>
+      </a:defRPr>
+    </a:lvl3pPr>
+    <a:lvl4pPr marL="1371600" algn="l" defTabSz="914400" rtl="0" eaLnBrk="1" latinLnBrk="0" hangingPunct="1">
+      <a:defRPr sz="1200" kern="1200">
+        <a:solidFill>
+          <a:schemeClr val="tx1"/>
+        </a:solidFill>
+        <a:latin typeface="+mn-lt"/>
+        <a:ea typeface="+mn-ea"/>
+        <a:cs typeface="+mn-cs"/>
+      </a:defRPr>
+    </a:lvl4pPr>
+    <a:lvl5pPr marL="1828800" algn="l" defTabSz="914400" rtl="0" eaLnBrk="1" latinLnBrk="0" hangingPunct="1">
+      <a:defRPr sz="1200" kern="1200">
+        <a:solidFill>
+          <a:schemeClr val="tx1"/>
+        </a:solidFill>
+        <a:latin typeface="+mn-lt"/>
+        <a:ea typeface="+mn-ea"/>
+        <a:cs typeface="+mn-cs"/>
+      </a:defRPr>
+    </a:lvl5pPr>
+    <a:lvl6pPr marL="2286000" algn="l" defTabSz="914400" rtl="0" eaLnBrk="1" latinLnBrk="0" hangingPunct="1">
+      <a:defRPr sz="1200" kern="1200">
+        <a:solidFill>
+          <a:schemeClr val="tx1"/>
+        </a:solidFill>
+        <a:latin typeface="+mn-lt"/>
+        <a:ea typeface="+mn-ea"/>
+        <a:cs typeface="+mn-cs"/>
+      </a:defRPr>
+    </a:lvl6pPr>
+    <a:lvl7pPr marL="2743200" algn="l" defTabSz="914400" rtl="0" eaLnBrk="1" latinLnBrk="0" hangingPunct="1">
+      <a:defRPr sz="1200" kern="1200">
+        <a:solidFill>
+          <a:schemeClr val="tx1"/>
+        </a:solidFill>
+        <a:latin typeface="+mn-lt"/>
+        <a:ea typeface="+mn-ea"/>
+        <a:cs typeface="+mn-cs"/>
+      </a:defRPr>
+    </a:lvl7pPr>
+    <a:lvl8pPr marL="3200400" algn="l" defTabSz="914400" rtl="0" eaLnBrk="1" latinLnBrk="0" hangingPunct="1">
+      <a:defRPr sz="1200" kern="1200">
+        <a:solidFill>
+          <a:schemeClr val="tx1"/>
+        </a:solidFill>
+        <a:latin typeface="+mn-lt"/>
+        <a:ea typeface="+mn-ea"/>
+        <a:cs typeface="+mn-cs"/>
+      </a:defRPr>
+    </a:lvl8pPr>
+    <a:lvl9pPr marL="3657600" algn="l" defTabSz="914400" rtl="0" eaLnBrk="1" latinLnBrk="0" hangingPunct="1">
+      <a:defRPr sz="1200" kern="1200">
+        <a:solidFill>
+          <a:schemeClr val="tx1"/>
+        </a:solidFill>
+        <a:latin typeface="+mn-lt"/>
+        <a:ea typeface="+mn-ea"/>
+        <a:cs typeface="+mn-cs"/>
+      </a:defRPr>
+    </a:lvl9pPr>
+  </p:notesStyle>
+</p:notesMaster>
+</file>
+
+<file path=ppt/notesSlides/notesSlide1.xml><?xml version="1.0" encoding="utf-8"?>
+<p:notes xmlns:a="http://schemas.openxmlformats.org/drawingml/2006/main" xmlns:r="http://schemas.openxmlformats.org/officeDocument/2006/relationships" xmlns:p="http://schemas.openxmlformats.org/presentationml/2006/main">
   <p:cSld>
     <p:spTree>
       <p:nvGrpSpPr>
@@ -34,9 +447,9 @@
       </p:grpSpPr>
       <p:sp>
         <p:nvSpPr>
-          <p:cNvPr id="40" name="PlaceHolder 1"/>
+          <p:cNvPr id="65" name="PlaceHolder 1"/>
           <p:cNvSpPr>
-            <a:spLocks noGrp="1"/>
+            <a:spLocks noGrp="1" noRot="1" noChangeAspect="1"/>
           </p:cNvSpPr>
           <p:nvPr>
             <p:ph type="sldImg"/>
@@ -44,238 +457,8 @@
         </p:nvSpPr>
         <p:spPr>
           <a:xfrm>
-            <a:off x="533520" y="764280"/>
-            <a:ext cx="6704640" cy="3771360"/>
-          </a:xfrm>
-          <a:prstGeom prst="rect">
-            <a:avLst/>
-          </a:prstGeom>
-        </p:spPr>
-        <p:txBody>
-          <a:bodyPr lIns="0" rIns="0" tIns="0" bIns="0" anchor="ctr"/>
-          <a:p>
-            <a:pPr algn="ctr"/>
-            <a:r>
-              <a:rPr b="0" lang="en-US" sz="4400" spc="-1" strike="noStrike">
-                <a:latin typeface="Arial"/>
-              </a:rPr>
-              <a:t>Click to move the slide</a:t>
-            </a:r>
-            <a:endParaRPr b="0" lang="en-US" sz="4400" spc="-1" strike="noStrike">
-              <a:latin typeface="Arial"/>
-            </a:endParaRPr>
-          </a:p>
-        </p:txBody>
-      </p:sp>
-      <p:sp>
-        <p:nvSpPr>
-          <p:cNvPr id="41" name="PlaceHolder 2"/>
-          <p:cNvSpPr>
-            <a:spLocks noGrp="1"/>
-          </p:cNvSpPr>
-          <p:nvPr>
-            <p:ph type="body"/>
-          </p:nvPr>
-        </p:nvSpPr>
-        <p:spPr>
-          <a:xfrm>
-            <a:off x="777240" y="4777560"/>
-            <a:ext cx="6217560" cy="4525920"/>
-          </a:xfrm>
-          <a:prstGeom prst="rect">
-            <a:avLst/>
-          </a:prstGeom>
-        </p:spPr>
-        <p:txBody>
-          <a:bodyPr lIns="0" rIns="0" tIns="0" bIns="0"/>
-          <a:p>
-            <a:r>
-              <a:rPr b="0" lang="en-US" sz="2000" spc="-1" strike="noStrike">
-                <a:latin typeface="Arial"/>
-              </a:rPr>
-              <a:t>Click to edit the notes format</a:t>
-            </a:r>
-            <a:endParaRPr b="0" lang="en-US" sz="2000" spc="-1" strike="noStrike">
-              <a:latin typeface="Arial"/>
-            </a:endParaRPr>
-          </a:p>
-        </p:txBody>
-      </p:sp>
-      <p:sp>
-        <p:nvSpPr>
-          <p:cNvPr id="42" name="PlaceHolder 3"/>
-          <p:cNvSpPr>
-            <a:spLocks noGrp="1"/>
-          </p:cNvSpPr>
-          <p:nvPr>
-            <p:ph type="hdr"/>
-          </p:nvPr>
-        </p:nvSpPr>
-        <p:spPr>
-          <a:xfrm>
-            <a:off x="0" y="0"/>
-            <a:ext cx="3372840" cy="502560"/>
-          </a:xfrm>
-          <a:prstGeom prst="rect">
-            <a:avLst/>
-          </a:prstGeom>
-        </p:spPr>
-        <p:txBody>
-          <a:bodyPr lIns="0" rIns="0" tIns="0" bIns="0"/>
-          <a:p>
-            <a:r>
-              <a:rPr b="0" lang="en-US" sz="1400" spc="-1" strike="noStrike">
-                <a:latin typeface="Times New Roman"/>
-              </a:rPr>
-              <a:t>&lt;header&gt;</a:t>
-            </a:r>
-            <a:endParaRPr b="0" lang="en-US" sz="1400" spc="-1" strike="noStrike">
-              <a:latin typeface="Times New Roman"/>
-            </a:endParaRPr>
-          </a:p>
-        </p:txBody>
-      </p:sp>
-      <p:sp>
-        <p:nvSpPr>
-          <p:cNvPr id="43" name="PlaceHolder 4"/>
-          <p:cNvSpPr>
-            <a:spLocks noGrp="1"/>
-          </p:cNvSpPr>
-          <p:nvPr>
-            <p:ph type="dt"/>
-          </p:nvPr>
-        </p:nvSpPr>
-        <p:spPr>
-          <a:xfrm>
-            <a:off x="4399200" y="0"/>
-            <a:ext cx="3372840" cy="502560"/>
-          </a:xfrm>
-          <a:prstGeom prst="rect">
-            <a:avLst/>
-          </a:prstGeom>
-        </p:spPr>
-        <p:txBody>
-          <a:bodyPr lIns="0" rIns="0" tIns="0" bIns="0"/>
-          <a:p>
-            <a:pPr algn="r"/>
-            <a:r>
-              <a:rPr b="0" lang="en-US" sz="1400" spc="-1" strike="noStrike">
-                <a:latin typeface="Times New Roman"/>
-              </a:rPr>
-              <a:t>&lt;date/time&gt;</a:t>
-            </a:r>
-            <a:endParaRPr b="0" lang="en-US" sz="1400" spc="-1" strike="noStrike">
-              <a:latin typeface="Times New Roman"/>
-            </a:endParaRPr>
-          </a:p>
-        </p:txBody>
-      </p:sp>
-      <p:sp>
-        <p:nvSpPr>
-          <p:cNvPr id="44" name="PlaceHolder 5"/>
-          <p:cNvSpPr>
-            <a:spLocks noGrp="1"/>
-          </p:cNvSpPr>
-          <p:nvPr>
-            <p:ph type="ftr"/>
-          </p:nvPr>
-        </p:nvSpPr>
-        <p:spPr>
-          <a:xfrm>
-            <a:off x="0" y="9555480"/>
-            <a:ext cx="3372840" cy="502560"/>
-          </a:xfrm>
-          <a:prstGeom prst="rect">
-            <a:avLst/>
-          </a:prstGeom>
-        </p:spPr>
-        <p:txBody>
-          <a:bodyPr lIns="0" rIns="0" tIns="0" bIns="0" anchor="b"/>
-          <a:p>
-            <a:r>
-              <a:rPr b="0" lang="en-US" sz="1400" spc="-1" strike="noStrike">
-                <a:latin typeface="Times New Roman"/>
-              </a:rPr>
-              <a:t>&lt;footer&gt;</a:t>
-            </a:r>
-            <a:endParaRPr b="0" lang="en-US" sz="1400" spc="-1" strike="noStrike">
-              <a:latin typeface="Times New Roman"/>
-            </a:endParaRPr>
-          </a:p>
-        </p:txBody>
-      </p:sp>
-      <p:sp>
-        <p:nvSpPr>
-          <p:cNvPr id="45" name="PlaceHolder 6"/>
-          <p:cNvSpPr>
-            <a:spLocks noGrp="1"/>
-          </p:cNvSpPr>
-          <p:nvPr>
-            <p:ph type="sldNum"/>
-          </p:nvPr>
-        </p:nvSpPr>
-        <p:spPr>
-          <a:xfrm>
-            <a:off x="4399200" y="9555480"/>
-            <a:ext cx="3372840" cy="502560"/>
-          </a:xfrm>
-          <a:prstGeom prst="rect">
-            <a:avLst/>
-          </a:prstGeom>
-        </p:spPr>
-        <p:txBody>
-          <a:bodyPr lIns="0" rIns="0" tIns="0" bIns="0" anchor="b"/>
-          <a:p>
-            <a:pPr algn="r"/>
-            <a:fld id="{0C00F8E5-3894-4751-B318-C6DD93AD492E}" type="slidenum">
-              <a:rPr b="0" lang="en-US" sz="1400" spc="-1" strike="noStrike">
-                <a:latin typeface="Times New Roman"/>
-              </a:rPr>
-              <a:t>&lt;number&gt;</a:t>
-            </a:fld>
-            <a:endParaRPr b="0" lang="en-US" sz="1400" spc="-1" strike="noStrike">
-              <a:latin typeface="Times New Roman"/>
-            </a:endParaRPr>
-          </a:p>
-        </p:txBody>
-      </p:sp>
-    </p:spTree>
-  </p:cSld>
-  <p:clrMap bg1="lt1" bg2="lt2" tx1="dk1" tx2="dk2" accent1="accent1" accent2="accent2" accent3="accent3" accent4="accent4" accent5="accent5" accent6="accent6" hlink="hlink" folHlink="folHlink"/>
-</p:notesMaster>
-</file>
-
-<file path=ppt/notesSlides/notesSlide1.xml><?xml version="1.0" encoding="utf-8"?>
-<p:notes xmlns:a="http://schemas.openxmlformats.org/drawingml/2006/main" xmlns:p="http://schemas.openxmlformats.org/presentationml/2006/main" xmlns:r="http://schemas.openxmlformats.org/officeDocument/2006/relationships" xmlns:p14="http://schemas.microsoft.com/office/powerpoint/2010/main" xmlns:p15="http://schemas.microsoft.com/office/powerpoint/2012/main" xmlns:mc="http://schemas.openxmlformats.org/markup-compatibility/2006">
-  <p:cSld>
-    <p:spTree>
-      <p:nvGrpSpPr>
-        <p:cNvPr id="1" name=""/>
-        <p:cNvGrpSpPr/>
-        <p:nvPr/>
-      </p:nvGrpSpPr>
-      <p:grpSpPr>
-        <a:xfrm>
-          <a:off x="0" y="0"/>
-          <a:ext cx="0" cy="0"/>
-          <a:chOff x="0" y="0"/>
-          <a:chExt cx="0" cy="0"/>
-        </a:xfrm>
-      </p:grpSpPr>
-      <p:sp>
-        <p:nvSpPr>
-          <p:cNvPr id="65" name="PlaceHolder 1"/>
-          <p:cNvSpPr>
-            <a:spLocks noGrp="1"/>
-          </p:cNvSpPr>
-          <p:nvPr>
-            <p:ph type="sldImg"/>
-          </p:nvPr>
-        </p:nvSpPr>
-        <p:spPr>
-          <a:xfrm>
-            <a:off x="1414440" y="1162080"/>
-            <a:ext cx="4180680" cy="3136320"/>
+            <a:off x="1414463" y="1162050"/>
+            <a:ext cx="4179887" cy="3136900"/>
           </a:xfrm>
           <a:prstGeom prst="rect">
             <a:avLst/>
@@ -302,9 +485,10 @@
           </a:prstGeom>
         </p:spPr>
         <p:txBody>
-          <a:bodyPr lIns="93240" rIns="93240" tIns="46440" bIns="46440"/>
-          <a:p>
-            <a:endParaRPr b="0" lang="en-US" sz="2000" spc="-1" strike="noStrike">
+          <a:bodyPr lIns="93240" tIns="46440" rIns="93240" bIns="46440"/>
+          <a:lstStyle/>
+          <a:p>
+            <a:endParaRPr lang="en-US" sz="2000" b="0" strike="noStrike" spc="-1">
               <a:latin typeface="Arial"/>
             </a:endParaRPr>
           </a:p>
@@ -330,13 +514,20 @@
           </a:ln>
         </p:spPr>
         <p:style>
-          <a:lnRef idx="0"/>
-          <a:fillRef idx="0"/>
-          <a:effectRef idx="0"/>
+          <a:lnRef idx="0">
+            <a:scrgbClr r="0" g="0" b="0"/>
+          </a:lnRef>
+          <a:fillRef idx="0">
+            <a:scrgbClr r="0" g="0" b="0"/>
+          </a:fillRef>
+          <a:effectRef idx="0">
+            <a:scrgbClr r="0" g="0" b="0"/>
+          </a:effectRef>
           <a:fontRef idx="minor"/>
         </p:style>
         <p:txBody>
-          <a:bodyPr lIns="93240" rIns="93240" tIns="46440" bIns="46440" anchor="b"/>
+          <a:bodyPr lIns="93240" tIns="46440" rIns="93240" bIns="46440" anchor="b"/>
+          <a:lstStyle/>
           <a:p>
             <a:pPr algn="r">
               <a:lnSpc>
@@ -344,16 +535,16 @@
               </a:lnSpc>
             </a:pPr>
             <a:fld id="{6562239E-94BB-4ECF-96D1-373F276CFAD9}" type="slidenum">
-              <a:rPr b="0" lang="en-US" sz="1200" spc="-1" strike="noStrike">
+              <a:rPr lang="en-US" sz="1200" b="0" strike="noStrike" spc="-1">
                 <a:solidFill>
                   <a:srgbClr val="000000"/>
                 </a:solidFill>
                 <a:latin typeface="+mn-lt"/>
                 <a:ea typeface="+mn-ea"/>
               </a:rPr>
-              <a:t>&lt;number&gt;</a:t>
+              <a:t>1</a:t>
             </a:fld>
-            <a:endParaRPr b="0" lang="en-US" sz="1200" spc="-1" strike="noStrike">
+            <a:endParaRPr lang="en-US" sz="1200" b="0" strike="noStrike" spc="-1">
               <a:latin typeface="Arial"/>
             </a:endParaRPr>
           </a:p>
@@ -361,11 +552,14 @@
       </p:sp>
     </p:spTree>
   </p:cSld>
+  <p:clrMapOvr>
+    <a:masterClrMapping/>
+  </p:clrMapOvr>
 </p:notes>
 </file>
 
 <file path=ppt/slideLayouts/slideLayout1.xml><?xml version="1.0" encoding="utf-8"?>
-<p:sldLayout xmlns:a="http://schemas.openxmlformats.org/drawingml/2006/main" xmlns:p="http://schemas.openxmlformats.org/presentationml/2006/main" xmlns:r="http://schemas.openxmlformats.org/officeDocument/2006/relationships" xmlns:p14="http://schemas.microsoft.com/office/powerpoint/2010/main" xmlns:p15="http://schemas.microsoft.com/office/powerpoint/2012/main" xmlns:mc="http://schemas.openxmlformats.org/markup-compatibility/2006" type="blank" preserve="1">
+<p:sldLayout xmlns:a="http://schemas.openxmlformats.org/drawingml/2006/main" xmlns:r="http://schemas.openxmlformats.org/officeDocument/2006/relationships" xmlns:p="http://schemas.openxmlformats.org/presentationml/2006/main" type="blank" preserve="1">
   <p:cSld name="Blank Slide">
     <p:spTree>
       <p:nvGrpSpPr>
@@ -383,11 +577,14 @@
       </p:grpSpPr>
     </p:spTree>
   </p:cSld>
+  <p:clrMapOvr>
+    <a:masterClrMapping/>
+  </p:clrMapOvr>
 </p:sldLayout>
 </file>
 
 <file path=ppt/slideLayouts/slideLayout10.xml><?xml version="1.0" encoding="utf-8"?>
-<p:sldLayout xmlns:a="http://schemas.openxmlformats.org/drawingml/2006/main" xmlns:p="http://schemas.openxmlformats.org/presentationml/2006/main" xmlns:r="http://schemas.openxmlformats.org/officeDocument/2006/relationships" xmlns:p14="http://schemas.microsoft.com/office/powerpoint/2010/main" xmlns:p15="http://schemas.microsoft.com/office/powerpoint/2012/main" xmlns:mc="http://schemas.openxmlformats.org/markup-compatibility/2006" type="objOverTx" preserve="1">
+<p:sldLayout xmlns:a="http://schemas.openxmlformats.org/drawingml/2006/main" xmlns:r="http://schemas.openxmlformats.org/officeDocument/2006/relationships" xmlns:p="http://schemas.openxmlformats.org/presentationml/2006/main" type="objOverTx" preserve="1">
   <p:cSld name="Title, Content over Content">
     <p:spTree>
       <p:nvGrpSpPr>
@@ -423,10 +620,11 @@
           </a:prstGeom>
         </p:spPr>
         <p:txBody>
-          <a:bodyPr lIns="0" rIns="0" tIns="0" bIns="0" anchor="ctr"/>
+          <a:bodyPr lIns="0" tIns="0" rIns="0" bIns="0" anchor="ctr"/>
+          <a:lstStyle/>
           <a:p>
             <a:pPr algn="ctr"/>
-            <a:endParaRPr b="0" lang="en-US" sz="4400" spc="-1" strike="noStrike">
+            <a:endParaRPr lang="en-US" sz="4400" b="0" strike="noStrike" spc="-1">
               <a:latin typeface="Arial"/>
             </a:endParaRPr>
           </a:p>
@@ -452,11 +650,12 @@
           </a:prstGeom>
         </p:spPr>
         <p:txBody>
-          <a:bodyPr lIns="0" rIns="0" tIns="0" bIns="0">
+          <a:bodyPr lIns="0" tIns="0" rIns="0" bIns="0">
             <a:normAutofit/>
           </a:bodyPr>
-          <a:p>
-            <a:endParaRPr b="0" lang="en-US" sz="3200" spc="-1" strike="noStrike">
+          <a:lstStyle/>
+          <a:p>
+            <a:endParaRPr lang="en-US" sz="3200" b="0" strike="noStrike" spc="-1">
               <a:latin typeface="Arial"/>
             </a:endParaRPr>
           </a:p>
@@ -482,11 +681,12 @@
           </a:prstGeom>
         </p:spPr>
         <p:txBody>
-          <a:bodyPr lIns="0" rIns="0" tIns="0" bIns="0">
+          <a:bodyPr lIns="0" tIns="0" rIns="0" bIns="0">
             <a:normAutofit/>
           </a:bodyPr>
-          <a:p>
-            <a:endParaRPr b="0" lang="en-US" sz="3200" spc="-1" strike="noStrike">
+          <a:lstStyle/>
+          <a:p>
+            <a:endParaRPr lang="en-US" sz="3200" b="0" strike="noStrike" spc="-1">
               <a:latin typeface="Arial"/>
             </a:endParaRPr>
           </a:p>
@@ -494,11 +694,14 @@
       </p:sp>
     </p:spTree>
   </p:cSld>
+  <p:clrMapOvr>
+    <a:masterClrMapping/>
+  </p:clrMapOvr>
 </p:sldLayout>
 </file>
 
 <file path=ppt/slideLayouts/slideLayout11.xml><?xml version="1.0" encoding="utf-8"?>
-<p:sldLayout xmlns:a="http://schemas.openxmlformats.org/drawingml/2006/main" xmlns:p="http://schemas.openxmlformats.org/presentationml/2006/main" xmlns:r="http://schemas.openxmlformats.org/officeDocument/2006/relationships" xmlns:p14="http://schemas.microsoft.com/office/powerpoint/2010/main" xmlns:p15="http://schemas.microsoft.com/office/powerpoint/2012/main" xmlns:mc="http://schemas.openxmlformats.org/markup-compatibility/2006" type="fourObj" preserve="1">
+<p:sldLayout xmlns:a="http://schemas.openxmlformats.org/drawingml/2006/main" xmlns:r="http://schemas.openxmlformats.org/officeDocument/2006/relationships" xmlns:p="http://schemas.openxmlformats.org/presentationml/2006/main" type="fourObj" preserve="1">
   <p:cSld name="Title, 4 Content">
     <p:spTree>
       <p:nvGrpSpPr>
@@ -534,10 +737,11 @@
           </a:prstGeom>
         </p:spPr>
         <p:txBody>
-          <a:bodyPr lIns="0" rIns="0" tIns="0" bIns="0" anchor="ctr"/>
+          <a:bodyPr lIns="0" tIns="0" rIns="0" bIns="0" anchor="ctr"/>
+          <a:lstStyle/>
           <a:p>
             <a:pPr algn="ctr"/>
-            <a:endParaRPr b="0" lang="en-US" sz="4400" spc="-1" strike="noStrike">
+            <a:endParaRPr lang="en-US" sz="4400" b="0" strike="noStrike" spc="-1">
               <a:latin typeface="Arial"/>
             </a:endParaRPr>
           </a:p>
@@ -563,11 +767,12 @@
           </a:prstGeom>
         </p:spPr>
         <p:txBody>
-          <a:bodyPr lIns="0" rIns="0" tIns="0" bIns="0">
+          <a:bodyPr lIns="0" tIns="0" rIns="0" bIns="0">
             <a:normAutofit/>
           </a:bodyPr>
-          <a:p>
-            <a:endParaRPr b="0" lang="en-US" sz="3200" spc="-1" strike="noStrike">
+          <a:lstStyle/>
+          <a:p>
+            <a:endParaRPr lang="en-US" sz="3200" b="0" strike="noStrike" spc="-1">
               <a:latin typeface="Arial"/>
             </a:endParaRPr>
           </a:p>
@@ -593,11 +798,12 @@
           </a:prstGeom>
         </p:spPr>
         <p:txBody>
-          <a:bodyPr lIns="0" rIns="0" tIns="0" bIns="0">
+          <a:bodyPr lIns="0" tIns="0" rIns="0" bIns="0">
             <a:normAutofit/>
           </a:bodyPr>
-          <a:p>
-            <a:endParaRPr b="0" lang="en-US" sz="3200" spc="-1" strike="noStrike">
+          <a:lstStyle/>
+          <a:p>
+            <a:endParaRPr lang="en-US" sz="3200" b="0" strike="noStrike" spc="-1">
               <a:latin typeface="Arial"/>
             </a:endParaRPr>
           </a:p>
@@ -623,11 +829,12 @@
           </a:prstGeom>
         </p:spPr>
         <p:txBody>
-          <a:bodyPr lIns="0" rIns="0" tIns="0" bIns="0">
+          <a:bodyPr lIns="0" tIns="0" rIns="0" bIns="0">
             <a:normAutofit/>
           </a:bodyPr>
-          <a:p>
-            <a:endParaRPr b="0" lang="en-US" sz="3200" spc="-1" strike="noStrike">
+          <a:lstStyle/>
+          <a:p>
+            <a:endParaRPr lang="en-US" sz="3200" b="0" strike="noStrike" spc="-1">
               <a:latin typeface="Arial"/>
             </a:endParaRPr>
           </a:p>
@@ -653,11 +860,12 @@
           </a:prstGeom>
         </p:spPr>
         <p:txBody>
-          <a:bodyPr lIns="0" rIns="0" tIns="0" bIns="0">
+          <a:bodyPr lIns="0" tIns="0" rIns="0" bIns="0">
             <a:normAutofit/>
           </a:bodyPr>
-          <a:p>
-            <a:endParaRPr b="0" lang="en-US" sz="3200" spc="-1" strike="noStrike">
+          <a:lstStyle/>
+          <a:p>
+            <a:endParaRPr lang="en-US" sz="3200" b="0" strike="noStrike" spc="-1">
               <a:latin typeface="Arial"/>
             </a:endParaRPr>
           </a:p>
@@ -665,11 +873,14 @@
       </p:sp>
     </p:spTree>
   </p:cSld>
+  <p:clrMapOvr>
+    <a:masterClrMapping/>
+  </p:clrMapOvr>
 </p:sldLayout>
 </file>
 
 <file path=ppt/slideLayouts/slideLayout12.xml><?xml version="1.0" encoding="utf-8"?>
-<p:sldLayout xmlns:a="http://schemas.openxmlformats.org/drawingml/2006/main" xmlns:p="http://schemas.openxmlformats.org/presentationml/2006/main" xmlns:r="http://schemas.openxmlformats.org/officeDocument/2006/relationships" xmlns:p14="http://schemas.microsoft.com/office/powerpoint/2010/main" xmlns:p15="http://schemas.microsoft.com/office/powerpoint/2012/main" xmlns:mc="http://schemas.openxmlformats.org/markup-compatibility/2006" type="blank" preserve="1">
+<p:sldLayout xmlns:a="http://schemas.openxmlformats.org/drawingml/2006/main" xmlns:r="http://schemas.openxmlformats.org/officeDocument/2006/relationships" xmlns:p="http://schemas.openxmlformats.org/presentationml/2006/main" type="blank" preserve="1">
   <p:cSld name="Title, 6 Content">
     <p:spTree>
       <p:nvGrpSpPr>
@@ -705,10 +916,11 @@
           </a:prstGeom>
         </p:spPr>
         <p:txBody>
-          <a:bodyPr lIns="0" rIns="0" tIns="0" bIns="0" anchor="ctr"/>
+          <a:bodyPr lIns="0" tIns="0" rIns="0" bIns="0" anchor="ctr"/>
+          <a:lstStyle/>
           <a:p>
             <a:pPr algn="ctr"/>
-            <a:endParaRPr b="0" lang="en-US" sz="4400" spc="-1" strike="noStrike">
+            <a:endParaRPr lang="en-US" sz="4400" b="0" strike="noStrike" spc="-1">
               <a:latin typeface="Arial"/>
             </a:endParaRPr>
           </a:p>
@@ -734,11 +946,12 @@
           </a:prstGeom>
         </p:spPr>
         <p:txBody>
-          <a:bodyPr lIns="0" rIns="0" tIns="0" bIns="0">
+          <a:bodyPr lIns="0" tIns="0" rIns="0" bIns="0">
             <a:normAutofit/>
           </a:bodyPr>
-          <a:p>
-            <a:endParaRPr b="0" lang="en-US" sz="3200" spc="-1" strike="noStrike">
+          <a:lstStyle/>
+          <a:p>
+            <a:endParaRPr lang="en-US" sz="3200" b="0" strike="noStrike" spc="-1">
               <a:latin typeface="Arial"/>
             </a:endParaRPr>
           </a:p>
@@ -764,11 +977,12 @@
           </a:prstGeom>
         </p:spPr>
         <p:txBody>
-          <a:bodyPr lIns="0" rIns="0" tIns="0" bIns="0">
+          <a:bodyPr lIns="0" tIns="0" rIns="0" bIns="0">
             <a:normAutofit/>
           </a:bodyPr>
-          <a:p>
-            <a:endParaRPr b="0" lang="en-US" sz="3200" spc="-1" strike="noStrike">
+          <a:lstStyle/>
+          <a:p>
+            <a:endParaRPr lang="en-US" sz="3200" b="0" strike="noStrike" spc="-1">
               <a:latin typeface="Arial"/>
             </a:endParaRPr>
           </a:p>
@@ -794,11 +1008,12 @@
           </a:prstGeom>
         </p:spPr>
         <p:txBody>
-          <a:bodyPr lIns="0" rIns="0" tIns="0" bIns="0">
+          <a:bodyPr lIns="0" tIns="0" rIns="0" bIns="0">
             <a:normAutofit/>
           </a:bodyPr>
-          <a:p>
-            <a:endParaRPr b="0" lang="en-US" sz="3200" spc="-1" strike="noStrike">
+          <a:lstStyle/>
+          <a:p>
+            <a:endParaRPr lang="en-US" sz="3200" b="0" strike="noStrike" spc="-1">
               <a:latin typeface="Arial"/>
             </a:endParaRPr>
           </a:p>
@@ -824,11 +1039,12 @@
           </a:prstGeom>
         </p:spPr>
         <p:txBody>
-          <a:bodyPr lIns="0" rIns="0" tIns="0" bIns="0">
+          <a:bodyPr lIns="0" tIns="0" rIns="0" bIns="0">
             <a:normAutofit/>
           </a:bodyPr>
-          <a:p>
-            <a:endParaRPr b="0" lang="en-US" sz="3200" spc="-1" strike="noStrike">
+          <a:lstStyle/>
+          <a:p>
+            <a:endParaRPr lang="en-US" sz="3200" b="0" strike="noStrike" spc="-1">
               <a:latin typeface="Arial"/>
             </a:endParaRPr>
           </a:p>
@@ -854,11 +1070,12 @@
           </a:prstGeom>
         </p:spPr>
         <p:txBody>
-          <a:bodyPr lIns="0" rIns="0" tIns="0" bIns="0">
+          <a:bodyPr lIns="0" tIns="0" rIns="0" bIns="0">
             <a:normAutofit/>
           </a:bodyPr>
-          <a:p>
-            <a:endParaRPr b="0" lang="en-US" sz="3200" spc="-1" strike="noStrike">
+          <a:lstStyle/>
+          <a:p>
+            <a:endParaRPr lang="en-US" sz="3200" b="0" strike="noStrike" spc="-1">
               <a:latin typeface="Arial"/>
             </a:endParaRPr>
           </a:p>
@@ -884,11 +1101,12 @@
           </a:prstGeom>
         </p:spPr>
         <p:txBody>
-          <a:bodyPr lIns="0" rIns="0" tIns="0" bIns="0">
+          <a:bodyPr lIns="0" tIns="0" rIns="0" bIns="0">
             <a:normAutofit/>
           </a:bodyPr>
-          <a:p>
-            <a:endParaRPr b="0" lang="en-US" sz="3200" spc="-1" strike="noStrike">
+          <a:lstStyle/>
+          <a:p>
+            <a:endParaRPr lang="en-US" sz="3200" b="0" strike="noStrike" spc="-1">
               <a:latin typeface="Arial"/>
             </a:endParaRPr>
           </a:p>
@@ -896,11 +1114,14 @@
       </p:sp>
     </p:spTree>
   </p:cSld>
+  <p:clrMapOvr>
+    <a:masterClrMapping/>
+  </p:clrMapOvr>
 </p:sldLayout>
 </file>
 
 <file path=ppt/slideLayouts/slideLayout2.xml><?xml version="1.0" encoding="utf-8"?>
-<p:sldLayout xmlns:a="http://schemas.openxmlformats.org/drawingml/2006/main" xmlns:p="http://schemas.openxmlformats.org/presentationml/2006/main" xmlns:r="http://schemas.openxmlformats.org/officeDocument/2006/relationships" xmlns:p14="http://schemas.microsoft.com/office/powerpoint/2010/main" xmlns:p15="http://schemas.microsoft.com/office/powerpoint/2012/main" xmlns:mc="http://schemas.openxmlformats.org/markup-compatibility/2006" type="tx" preserve="1">
+<p:sldLayout xmlns:a="http://schemas.openxmlformats.org/drawingml/2006/main" xmlns:r="http://schemas.openxmlformats.org/officeDocument/2006/relationships" xmlns:p="http://schemas.openxmlformats.org/presentationml/2006/main" type="tx" preserve="1">
   <p:cSld name="Title Slide">
     <p:spTree>
       <p:nvGrpSpPr>
@@ -936,10 +1157,11 @@
           </a:prstGeom>
         </p:spPr>
         <p:txBody>
-          <a:bodyPr lIns="0" rIns="0" tIns="0" bIns="0" anchor="ctr"/>
+          <a:bodyPr lIns="0" tIns="0" rIns="0" bIns="0" anchor="ctr"/>
+          <a:lstStyle/>
           <a:p>
             <a:pPr algn="ctr"/>
-            <a:endParaRPr b="0" lang="en-US" sz="4400" spc="-1" strike="noStrike">
+            <a:endParaRPr lang="en-US" sz="4400" b="0" strike="noStrike" spc="-1">
               <a:latin typeface="Arial"/>
             </a:endParaRPr>
           </a:p>
@@ -965,10 +1187,11 @@
           </a:prstGeom>
         </p:spPr>
         <p:txBody>
-          <a:bodyPr lIns="0" rIns="0" tIns="0" bIns="0" anchor="ctr"/>
+          <a:bodyPr lIns="0" tIns="0" rIns="0" bIns="0" anchor="ctr"/>
+          <a:lstStyle/>
           <a:p>
             <a:pPr algn="ctr"/>
-            <a:endParaRPr b="0" lang="en-US" sz="3200" spc="-1" strike="noStrike">
+            <a:endParaRPr lang="en-US" sz="3200" b="0" strike="noStrike" spc="-1">
               <a:latin typeface="Arial"/>
             </a:endParaRPr>
           </a:p>
@@ -976,11 +1199,14 @@
       </p:sp>
     </p:spTree>
   </p:cSld>
+  <p:clrMapOvr>
+    <a:masterClrMapping/>
+  </p:clrMapOvr>
 </p:sldLayout>
 </file>
 
 <file path=ppt/slideLayouts/slideLayout3.xml><?xml version="1.0" encoding="utf-8"?>
-<p:sldLayout xmlns:a="http://schemas.openxmlformats.org/drawingml/2006/main" xmlns:p="http://schemas.openxmlformats.org/presentationml/2006/main" xmlns:r="http://schemas.openxmlformats.org/officeDocument/2006/relationships" xmlns:p14="http://schemas.microsoft.com/office/powerpoint/2010/main" xmlns:p15="http://schemas.microsoft.com/office/powerpoint/2012/main" xmlns:mc="http://schemas.openxmlformats.org/markup-compatibility/2006" type="obj" preserve="1">
+<p:sldLayout xmlns:a="http://schemas.openxmlformats.org/drawingml/2006/main" xmlns:r="http://schemas.openxmlformats.org/officeDocument/2006/relationships" xmlns:p="http://schemas.openxmlformats.org/presentationml/2006/main" type="obj" preserve="1">
   <p:cSld name="Title, Content">
     <p:spTree>
       <p:nvGrpSpPr>
@@ -1016,10 +1242,11 @@
           </a:prstGeom>
         </p:spPr>
         <p:txBody>
-          <a:bodyPr lIns="0" rIns="0" tIns="0" bIns="0" anchor="ctr"/>
+          <a:bodyPr lIns="0" tIns="0" rIns="0" bIns="0" anchor="ctr"/>
+          <a:lstStyle/>
           <a:p>
             <a:pPr algn="ctr"/>
-            <a:endParaRPr b="0" lang="en-US" sz="4400" spc="-1" strike="noStrike">
+            <a:endParaRPr lang="en-US" sz="4400" b="0" strike="noStrike" spc="-1">
               <a:latin typeface="Arial"/>
             </a:endParaRPr>
           </a:p>
@@ -1045,11 +1272,12 @@
           </a:prstGeom>
         </p:spPr>
         <p:txBody>
-          <a:bodyPr lIns="0" rIns="0" tIns="0" bIns="0">
+          <a:bodyPr lIns="0" tIns="0" rIns="0" bIns="0">
             <a:normAutofit/>
           </a:bodyPr>
-          <a:p>
-            <a:endParaRPr b="0" lang="en-US" sz="3200" spc="-1" strike="noStrike">
+          <a:lstStyle/>
+          <a:p>
+            <a:endParaRPr lang="en-US" sz="3200" b="0" strike="noStrike" spc="-1">
               <a:latin typeface="Arial"/>
             </a:endParaRPr>
           </a:p>
@@ -1057,11 +1285,14 @@
       </p:sp>
     </p:spTree>
   </p:cSld>
+  <p:clrMapOvr>
+    <a:masterClrMapping/>
+  </p:clrMapOvr>
 </p:sldLayout>
 </file>
 
 <file path=ppt/slideLayouts/slideLayout4.xml><?xml version="1.0" encoding="utf-8"?>
-<p:sldLayout xmlns:a="http://schemas.openxmlformats.org/drawingml/2006/main" xmlns:p="http://schemas.openxmlformats.org/presentationml/2006/main" xmlns:r="http://schemas.openxmlformats.org/officeDocument/2006/relationships" xmlns:p14="http://schemas.microsoft.com/office/powerpoint/2010/main" xmlns:p15="http://schemas.microsoft.com/office/powerpoint/2012/main" xmlns:mc="http://schemas.openxmlformats.org/markup-compatibility/2006" type="twoObj" preserve="1">
+<p:sldLayout xmlns:a="http://schemas.openxmlformats.org/drawingml/2006/main" xmlns:r="http://schemas.openxmlformats.org/officeDocument/2006/relationships" xmlns:p="http://schemas.openxmlformats.org/presentationml/2006/main" type="twoObj" preserve="1">
   <p:cSld name="Title, 2 Content">
     <p:spTree>
       <p:nvGrpSpPr>
@@ -1097,10 +1328,11 @@
           </a:prstGeom>
         </p:spPr>
         <p:txBody>
-          <a:bodyPr lIns="0" rIns="0" tIns="0" bIns="0" anchor="ctr"/>
+          <a:bodyPr lIns="0" tIns="0" rIns="0" bIns="0" anchor="ctr"/>
+          <a:lstStyle/>
           <a:p>
             <a:pPr algn="ctr"/>
-            <a:endParaRPr b="0" lang="en-US" sz="4400" spc="-1" strike="noStrike">
+            <a:endParaRPr lang="en-US" sz="4400" b="0" strike="noStrike" spc="-1">
               <a:latin typeface="Arial"/>
             </a:endParaRPr>
           </a:p>
@@ -1126,11 +1358,12 @@
           </a:prstGeom>
         </p:spPr>
         <p:txBody>
-          <a:bodyPr lIns="0" rIns="0" tIns="0" bIns="0">
+          <a:bodyPr lIns="0" tIns="0" rIns="0" bIns="0">
             <a:normAutofit/>
           </a:bodyPr>
-          <a:p>
-            <a:endParaRPr b="0" lang="en-US" sz="3200" spc="-1" strike="noStrike">
+          <a:lstStyle/>
+          <a:p>
+            <a:endParaRPr lang="en-US" sz="3200" b="0" strike="noStrike" spc="-1">
               <a:latin typeface="Arial"/>
             </a:endParaRPr>
           </a:p>
@@ -1156,11 +1389,12 @@
           </a:prstGeom>
         </p:spPr>
         <p:txBody>
-          <a:bodyPr lIns="0" rIns="0" tIns="0" bIns="0">
+          <a:bodyPr lIns="0" tIns="0" rIns="0" bIns="0">
             <a:normAutofit/>
           </a:bodyPr>
-          <a:p>
-            <a:endParaRPr b="0" lang="en-US" sz="3200" spc="-1" strike="noStrike">
+          <a:lstStyle/>
+          <a:p>
+            <a:endParaRPr lang="en-US" sz="3200" b="0" strike="noStrike" spc="-1">
               <a:latin typeface="Arial"/>
             </a:endParaRPr>
           </a:p>
@@ -1168,11 +1402,14 @@
       </p:sp>
     </p:spTree>
   </p:cSld>
+  <p:clrMapOvr>
+    <a:masterClrMapping/>
+  </p:clrMapOvr>
 </p:sldLayout>
 </file>
 
 <file path=ppt/slideLayouts/slideLayout5.xml><?xml version="1.0" encoding="utf-8"?>
-<p:sldLayout xmlns:a="http://schemas.openxmlformats.org/drawingml/2006/main" xmlns:p="http://schemas.openxmlformats.org/presentationml/2006/main" xmlns:r="http://schemas.openxmlformats.org/officeDocument/2006/relationships" xmlns:p14="http://schemas.microsoft.com/office/powerpoint/2010/main" xmlns:p15="http://schemas.microsoft.com/office/powerpoint/2012/main" xmlns:mc="http://schemas.openxmlformats.org/markup-compatibility/2006" type="titleOnly" preserve="1">
+<p:sldLayout xmlns:a="http://schemas.openxmlformats.org/drawingml/2006/main" xmlns:r="http://schemas.openxmlformats.org/officeDocument/2006/relationships" xmlns:p="http://schemas.openxmlformats.org/presentationml/2006/main" type="titleOnly" preserve="1">
   <p:cSld name="Title Only">
     <p:spTree>
       <p:nvGrpSpPr>
@@ -1208,10 +1445,11 @@
           </a:prstGeom>
         </p:spPr>
         <p:txBody>
-          <a:bodyPr lIns="0" rIns="0" tIns="0" bIns="0" anchor="ctr"/>
+          <a:bodyPr lIns="0" tIns="0" rIns="0" bIns="0" anchor="ctr"/>
+          <a:lstStyle/>
           <a:p>
             <a:pPr algn="ctr"/>
-            <a:endParaRPr b="0" lang="en-US" sz="4400" spc="-1" strike="noStrike">
+            <a:endParaRPr lang="en-US" sz="4400" b="0" strike="noStrike" spc="-1">
               <a:latin typeface="Arial"/>
             </a:endParaRPr>
           </a:p>
@@ -1219,11 +1457,14 @@
       </p:sp>
     </p:spTree>
   </p:cSld>
+  <p:clrMapOvr>
+    <a:masterClrMapping/>
+  </p:clrMapOvr>
 </p:sldLayout>
 </file>
 
 <file path=ppt/slideLayouts/slideLayout6.xml><?xml version="1.0" encoding="utf-8"?>
-<p:sldLayout xmlns:a="http://schemas.openxmlformats.org/drawingml/2006/main" xmlns:p="http://schemas.openxmlformats.org/presentationml/2006/main" xmlns:r="http://schemas.openxmlformats.org/officeDocument/2006/relationships" xmlns:p14="http://schemas.microsoft.com/office/powerpoint/2010/main" xmlns:p15="http://schemas.microsoft.com/office/powerpoint/2012/main" xmlns:mc="http://schemas.openxmlformats.org/markup-compatibility/2006" type="objOnly" preserve="1">
+<p:sldLayout xmlns:a="http://schemas.openxmlformats.org/drawingml/2006/main" xmlns:r="http://schemas.openxmlformats.org/officeDocument/2006/relationships" xmlns:p="http://schemas.openxmlformats.org/presentationml/2006/main" type="objOnly" preserve="1">
   <p:cSld name="Centered Text">
     <p:spTree>
       <p:nvGrpSpPr>
@@ -1259,10 +1500,11 @@
           </a:prstGeom>
         </p:spPr>
         <p:txBody>
-          <a:bodyPr lIns="0" rIns="0" tIns="0" bIns="0" anchor="ctr"/>
+          <a:bodyPr lIns="0" tIns="0" rIns="0" bIns="0" anchor="ctr"/>
+          <a:lstStyle/>
           <a:p>
             <a:pPr algn="ctr"/>
-            <a:endParaRPr b="0" lang="en-US" sz="3200" spc="-1" strike="noStrike">
+            <a:endParaRPr lang="en-US" sz="3200" b="0" strike="noStrike" spc="-1">
               <a:latin typeface="Arial"/>
             </a:endParaRPr>
           </a:p>
@@ -1270,11 +1512,14 @@
       </p:sp>
     </p:spTree>
   </p:cSld>
+  <p:clrMapOvr>
+    <a:masterClrMapping/>
+  </p:clrMapOvr>
 </p:sldLayout>
 </file>
 
 <file path=ppt/slideLayouts/slideLayout7.xml><?xml version="1.0" encoding="utf-8"?>
-<p:sldLayout xmlns:a="http://schemas.openxmlformats.org/drawingml/2006/main" xmlns:p="http://schemas.openxmlformats.org/presentationml/2006/main" xmlns:r="http://schemas.openxmlformats.org/officeDocument/2006/relationships" xmlns:p14="http://schemas.microsoft.com/office/powerpoint/2010/main" xmlns:p15="http://schemas.microsoft.com/office/powerpoint/2012/main" xmlns:mc="http://schemas.openxmlformats.org/markup-compatibility/2006" type="twoObjAndObj" preserve="1">
+<p:sldLayout xmlns:a="http://schemas.openxmlformats.org/drawingml/2006/main" xmlns:r="http://schemas.openxmlformats.org/officeDocument/2006/relationships" xmlns:p="http://schemas.openxmlformats.org/presentationml/2006/main" type="twoObjAndObj" preserve="1">
   <p:cSld name="Title, 2 Content and Content">
     <p:spTree>
       <p:nvGrpSpPr>
@@ -1310,10 +1555,11 @@
           </a:prstGeom>
         </p:spPr>
         <p:txBody>
-          <a:bodyPr lIns="0" rIns="0" tIns="0" bIns="0" anchor="ctr"/>
+          <a:bodyPr lIns="0" tIns="0" rIns="0" bIns="0" anchor="ctr"/>
+          <a:lstStyle/>
           <a:p>
             <a:pPr algn="ctr"/>
-            <a:endParaRPr b="0" lang="en-US" sz="4400" spc="-1" strike="noStrike">
+            <a:endParaRPr lang="en-US" sz="4400" b="0" strike="noStrike" spc="-1">
               <a:latin typeface="Arial"/>
             </a:endParaRPr>
           </a:p>
@@ -1339,11 +1585,12 @@
           </a:prstGeom>
         </p:spPr>
         <p:txBody>
-          <a:bodyPr lIns="0" rIns="0" tIns="0" bIns="0">
+          <a:bodyPr lIns="0" tIns="0" rIns="0" bIns="0">
             <a:normAutofit/>
           </a:bodyPr>
-          <a:p>
-            <a:endParaRPr b="0" lang="en-US" sz="3200" spc="-1" strike="noStrike">
+          <a:lstStyle/>
+          <a:p>
+            <a:endParaRPr lang="en-US" sz="3200" b="0" strike="noStrike" spc="-1">
               <a:latin typeface="Arial"/>
             </a:endParaRPr>
           </a:p>
@@ -1369,11 +1616,12 @@
           </a:prstGeom>
         </p:spPr>
         <p:txBody>
-          <a:bodyPr lIns="0" rIns="0" tIns="0" bIns="0">
+          <a:bodyPr lIns="0" tIns="0" rIns="0" bIns="0">
             <a:normAutofit/>
           </a:bodyPr>
-          <a:p>
-            <a:endParaRPr b="0" lang="en-US" sz="3200" spc="-1" strike="noStrike">
+          <a:lstStyle/>
+          <a:p>
+            <a:endParaRPr lang="en-US" sz="3200" b="0" strike="noStrike" spc="-1">
               <a:latin typeface="Arial"/>
             </a:endParaRPr>
           </a:p>
@@ -1399,11 +1647,12 @@
           </a:prstGeom>
         </p:spPr>
         <p:txBody>
-          <a:bodyPr lIns="0" rIns="0" tIns="0" bIns="0">
+          <a:bodyPr lIns="0" tIns="0" rIns="0" bIns="0">
             <a:normAutofit/>
           </a:bodyPr>
-          <a:p>
-            <a:endParaRPr b="0" lang="en-US" sz="3200" spc="-1" strike="noStrike">
+          <a:lstStyle/>
+          <a:p>
+            <a:endParaRPr lang="en-US" sz="3200" b="0" strike="noStrike" spc="-1">
               <a:latin typeface="Arial"/>
             </a:endParaRPr>
           </a:p>
@@ -1411,11 +1660,14 @@
       </p:sp>
     </p:spTree>
   </p:cSld>
+  <p:clrMapOvr>
+    <a:masterClrMapping/>
+  </p:clrMapOvr>
 </p:sldLayout>
 </file>
 
 <file path=ppt/slideLayouts/slideLayout8.xml><?xml version="1.0" encoding="utf-8"?>
-<p:sldLayout xmlns:a="http://schemas.openxmlformats.org/drawingml/2006/main" xmlns:p="http://schemas.openxmlformats.org/presentationml/2006/main" xmlns:r="http://schemas.openxmlformats.org/officeDocument/2006/relationships" xmlns:p14="http://schemas.microsoft.com/office/powerpoint/2010/main" xmlns:p15="http://schemas.microsoft.com/office/powerpoint/2012/main" xmlns:mc="http://schemas.openxmlformats.org/markup-compatibility/2006" type="objAndTwoObj" preserve="1">
+<p:sldLayout xmlns:a="http://schemas.openxmlformats.org/drawingml/2006/main" xmlns:r="http://schemas.openxmlformats.org/officeDocument/2006/relationships" xmlns:p="http://schemas.openxmlformats.org/presentationml/2006/main" type="objAndTwoObj" preserve="1">
   <p:cSld name="Title Content and 2 Content">
     <p:spTree>
       <p:nvGrpSpPr>
@@ -1451,10 +1703,11 @@
           </a:prstGeom>
         </p:spPr>
         <p:txBody>
-          <a:bodyPr lIns="0" rIns="0" tIns="0" bIns="0" anchor="ctr"/>
+          <a:bodyPr lIns="0" tIns="0" rIns="0" bIns="0" anchor="ctr"/>
+          <a:lstStyle/>
           <a:p>
             <a:pPr algn="ctr"/>
-            <a:endParaRPr b="0" lang="en-US" sz="4400" spc="-1" strike="noStrike">
+            <a:endParaRPr lang="en-US" sz="4400" b="0" strike="noStrike" spc="-1">
               <a:latin typeface="Arial"/>
             </a:endParaRPr>
           </a:p>
@@ -1480,11 +1733,12 @@
           </a:prstGeom>
         </p:spPr>
         <p:txBody>
-          <a:bodyPr lIns="0" rIns="0" tIns="0" bIns="0">
+          <a:bodyPr lIns="0" tIns="0" rIns="0" bIns="0">
             <a:normAutofit/>
           </a:bodyPr>
-          <a:p>
-            <a:endParaRPr b="0" lang="en-US" sz="3200" spc="-1" strike="noStrike">
+          <a:lstStyle/>
+          <a:p>
+            <a:endParaRPr lang="en-US" sz="3200" b="0" strike="noStrike" spc="-1">
               <a:latin typeface="Arial"/>
             </a:endParaRPr>
           </a:p>
@@ -1510,11 +1764,12 @@
           </a:prstGeom>
         </p:spPr>
         <p:txBody>
-          <a:bodyPr lIns="0" rIns="0" tIns="0" bIns="0">
+          <a:bodyPr lIns="0" tIns="0" rIns="0" bIns="0">
             <a:normAutofit/>
           </a:bodyPr>
-          <a:p>
-            <a:endParaRPr b="0" lang="en-US" sz="3200" spc="-1" strike="noStrike">
+          <a:lstStyle/>
+          <a:p>
+            <a:endParaRPr lang="en-US" sz="3200" b="0" strike="noStrike" spc="-1">
               <a:latin typeface="Arial"/>
             </a:endParaRPr>
           </a:p>
@@ -1540,11 +1795,12 @@
           </a:prstGeom>
         </p:spPr>
         <p:txBody>
-          <a:bodyPr lIns="0" rIns="0" tIns="0" bIns="0">
+          <a:bodyPr lIns="0" tIns="0" rIns="0" bIns="0">
             <a:normAutofit/>
           </a:bodyPr>
-          <a:p>
-            <a:endParaRPr b="0" lang="en-US" sz="3200" spc="-1" strike="noStrike">
+          <a:lstStyle/>
+          <a:p>
+            <a:endParaRPr lang="en-US" sz="3200" b="0" strike="noStrike" spc="-1">
               <a:latin typeface="Arial"/>
             </a:endParaRPr>
           </a:p>
@@ -1552,11 +1808,14 @@
       </p:sp>
     </p:spTree>
   </p:cSld>
+  <p:clrMapOvr>
+    <a:masterClrMapping/>
+  </p:clrMapOvr>
 </p:sldLayout>
 </file>
 
 <file path=ppt/slideLayouts/slideLayout9.xml><?xml version="1.0" encoding="utf-8"?>
-<p:sldLayout xmlns:a="http://schemas.openxmlformats.org/drawingml/2006/main" xmlns:p="http://schemas.openxmlformats.org/presentationml/2006/main" xmlns:r="http://schemas.openxmlformats.org/officeDocument/2006/relationships" xmlns:p14="http://schemas.microsoft.com/office/powerpoint/2010/main" xmlns:p15="http://schemas.microsoft.com/office/powerpoint/2012/main" xmlns:mc="http://schemas.openxmlformats.org/markup-compatibility/2006" type="twoObjOverTx" preserve="1">
+<p:sldLayout xmlns:a="http://schemas.openxmlformats.org/drawingml/2006/main" xmlns:r="http://schemas.openxmlformats.org/officeDocument/2006/relationships" xmlns:p="http://schemas.openxmlformats.org/presentationml/2006/main" type="twoObjOverTx" preserve="1">
   <p:cSld name="Title, 2 Content over Content">
     <p:spTree>
       <p:nvGrpSpPr>
@@ -1592,10 +1851,11 @@
           </a:prstGeom>
         </p:spPr>
         <p:txBody>
-          <a:bodyPr lIns="0" rIns="0" tIns="0" bIns="0" anchor="ctr"/>
+          <a:bodyPr lIns="0" tIns="0" rIns="0" bIns="0" anchor="ctr"/>
+          <a:lstStyle/>
           <a:p>
             <a:pPr algn="ctr"/>
-            <a:endParaRPr b="0" lang="en-US" sz="4400" spc="-1" strike="noStrike">
+            <a:endParaRPr lang="en-US" sz="4400" b="0" strike="noStrike" spc="-1">
               <a:latin typeface="Arial"/>
             </a:endParaRPr>
           </a:p>
@@ -1621,11 +1881,12 @@
           </a:prstGeom>
         </p:spPr>
         <p:txBody>
-          <a:bodyPr lIns="0" rIns="0" tIns="0" bIns="0">
+          <a:bodyPr lIns="0" tIns="0" rIns="0" bIns="0">
             <a:normAutofit/>
           </a:bodyPr>
-          <a:p>
-            <a:endParaRPr b="0" lang="en-US" sz="3200" spc="-1" strike="noStrike">
+          <a:lstStyle/>
+          <a:p>
+            <a:endParaRPr lang="en-US" sz="3200" b="0" strike="noStrike" spc="-1">
               <a:latin typeface="Arial"/>
             </a:endParaRPr>
           </a:p>
@@ -1651,11 +1912,12 @@
           </a:prstGeom>
         </p:spPr>
         <p:txBody>
-          <a:bodyPr lIns="0" rIns="0" tIns="0" bIns="0">
+          <a:bodyPr lIns="0" tIns="0" rIns="0" bIns="0">
             <a:normAutofit/>
           </a:bodyPr>
-          <a:p>
-            <a:endParaRPr b="0" lang="en-US" sz="3200" spc="-1" strike="noStrike">
+          <a:lstStyle/>
+          <a:p>
+            <a:endParaRPr lang="en-US" sz="3200" b="0" strike="noStrike" spc="-1">
               <a:latin typeface="Arial"/>
             </a:endParaRPr>
           </a:p>
@@ -1681,11 +1943,12 @@
           </a:prstGeom>
         </p:spPr>
         <p:txBody>
-          <a:bodyPr lIns="0" rIns="0" tIns="0" bIns="0">
+          <a:bodyPr lIns="0" tIns="0" rIns="0" bIns="0">
             <a:normAutofit/>
           </a:bodyPr>
-          <a:p>
-            <a:endParaRPr b="0" lang="en-US" sz="3200" spc="-1" strike="noStrike">
+          <a:lstStyle/>
+          <a:p>
+            <a:endParaRPr lang="en-US" sz="3200" b="0" strike="noStrike" spc="-1">
               <a:latin typeface="Arial"/>
             </a:endParaRPr>
           </a:p>
@@ -1693,17 +1956,21 @@
       </p:sp>
     </p:spTree>
   </p:cSld>
+  <p:clrMapOvr>
+    <a:masterClrMapping/>
+  </p:clrMapOvr>
 </p:sldLayout>
 </file>
 
 <file path=ppt/slideMasters/slideMaster1.xml><?xml version="1.0" encoding="utf-8"?>
-<p:sldMaster xmlns:a="http://schemas.openxmlformats.org/drawingml/2006/main" xmlns:p="http://schemas.openxmlformats.org/presentationml/2006/main" xmlns:r="http://schemas.openxmlformats.org/officeDocument/2006/relationships" xmlns:p14="http://schemas.microsoft.com/office/powerpoint/2010/main" xmlns:p15="http://schemas.microsoft.com/office/powerpoint/2012/main" xmlns:mc="http://schemas.openxmlformats.org/markup-compatibility/2006">
+<p:sldMaster xmlns:a="http://schemas.openxmlformats.org/drawingml/2006/main" xmlns:r="http://schemas.openxmlformats.org/officeDocument/2006/relationships" xmlns:p="http://schemas.openxmlformats.org/presentationml/2006/main">
   <p:cSld>
     <p:bg>
       <p:bgPr>
         <a:solidFill>
-          <a:srgbClr val="ffffff"/>
+          <a:srgbClr val="FFFFFF"/>
         </a:solidFill>
+        <a:effectLst/>
       </p:bgPr>
     </p:bg>
     <p:spTree>
@@ -1722,7 +1989,7 @@
       </p:grpSpPr>
       <p:sp>
         <p:nvSpPr>
-          <p:cNvPr id="0" name="CustomShape 1"/>
+          <p:cNvPr id="4" name="CustomShape 1"/>
           <p:cNvSpPr/>
           <p:nvPr/>
         </p:nvSpPr>
@@ -1758,7 +2025,7 @@
       </p:sp>
       <p:sp>
         <p:nvSpPr>
-          <p:cNvPr id="1" name="CustomShape 2"/>
+          <p:cNvPr id="5" name="CustomShape 2"/>
           <p:cNvSpPr/>
           <p:nvPr/>
         </p:nvSpPr>
@@ -1811,7 +2078,7 @@
           </a:prstGeom>
           <a:ln w="114480">
             <a:solidFill>
-              <a:srgbClr val="00ace4"/>
+              <a:srgbClr val="00ACE4"/>
             </a:solidFill>
             <a:round/>
           </a:ln>
@@ -1867,7 +2134,8 @@
           <a:fontRef idx="minor"/>
         </p:style>
         <p:txBody>
-          <a:bodyPr lIns="274320" rIns="274320" tIns="45000" bIns="45000"/>
+          <a:bodyPr lIns="274320" tIns="45000" rIns="274320" bIns="45000"/>
+          <a:lstStyle/>
           <a:p>
             <a:pPr>
               <a:lnSpc>
@@ -1878,7 +2146,7 @@
               </a:spcBef>
             </a:pPr>
             <a:r>
-              <a:rPr b="0" lang="en-US" sz="9600" spc="-1" strike="noStrike">
+              <a:rPr lang="en-US" sz="9600" b="0" strike="noStrike" spc="-1">
                 <a:solidFill>
                   <a:srgbClr val="808080"/>
                 </a:solidFill>
@@ -1887,7 +2155,7 @@
               </a:rPr>
               <a:t>Printing:</a:t>
             </a:r>
-            <a:endParaRPr b="0" lang="en-US" sz="9600" spc="-1" strike="noStrike">
+            <a:endParaRPr lang="en-US" sz="9600" b="0" strike="noStrike" spc="-1">
               <a:latin typeface="Arial"/>
             </a:endParaRPr>
           </a:p>
@@ -1901,7 +2169,7 @@
               </a:spcBef>
             </a:pPr>
             <a:r>
-              <a:rPr b="0" lang="en-US" sz="6600" spc="-1" strike="noStrike">
+              <a:rPr lang="en-US" sz="6600" b="0" strike="noStrike" spc="-1">
                 <a:solidFill>
                   <a:srgbClr val="808080"/>
                 </a:solidFill>
@@ -1910,7 +2178,7 @@
               </a:rPr>
               <a:t>This poster is 48” wide by 36” high. It’s designed to be printed on a large-format printer.</a:t>
             </a:r>
-            <a:endParaRPr b="0" lang="en-US" sz="6600" spc="-1" strike="noStrike">
+            <a:endParaRPr lang="en-US" sz="6600" b="0" strike="noStrike" spc="-1">
               <a:latin typeface="Arial"/>
             </a:endParaRPr>
           </a:p>
@@ -1923,7 +2191,7 @@
                 <a:spcPts val="300"/>
               </a:spcBef>
             </a:pPr>
-            <a:endParaRPr b="0" lang="en-US" sz="6600" spc="-1" strike="noStrike">
+            <a:endParaRPr lang="en-US" sz="6600" b="0" strike="noStrike" spc="-1">
               <a:latin typeface="Arial"/>
             </a:endParaRPr>
           </a:p>
@@ -1937,7 +2205,7 @@
               </a:spcBef>
             </a:pPr>
             <a:r>
-              <a:rPr b="0" lang="en-US" sz="8800" spc="-1" strike="noStrike">
+              <a:rPr lang="en-US" sz="8800" b="0" strike="noStrike" spc="-1">
                 <a:solidFill>
                   <a:srgbClr val="808080"/>
                 </a:solidFill>
@@ -1946,7 +2214,7 @@
               </a:rPr>
               <a:t>Customizing the Content:</a:t>
             </a:r>
-            <a:endParaRPr b="0" lang="en-US" sz="8800" spc="-1" strike="noStrike">
+            <a:endParaRPr lang="en-US" sz="8800" b="0" strike="noStrike" spc="-1">
               <a:latin typeface="Arial"/>
             </a:endParaRPr>
           </a:p>
@@ -1960,7 +2228,7 @@
               </a:spcBef>
             </a:pPr>
             <a:r>
-              <a:rPr b="0" lang="en-US" sz="6600" spc="-1" strike="noStrike">
+              <a:rPr lang="en-US" sz="6600" b="0" strike="noStrike" spc="-1">
                 <a:solidFill>
                   <a:srgbClr val="808080"/>
                 </a:solidFill>
@@ -1969,7 +2237,7 @@
               </a:rPr>
               <a:t>The placeholders in this poster are formatted for you. Type in the placeholders to add text, or click an icon to add a table, chart, SmartArt graphic, picture or multimedia file.</a:t>
             </a:r>
-            <a:endParaRPr b="0" lang="en-US" sz="6600" spc="-1" strike="noStrike">
+            <a:endParaRPr lang="en-US" sz="6600" b="0" strike="noStrike" spc="-1">
               <a:latin typeface="Arial"/>
             </a:endParaRPr>
           </a:p>
@@ -1983,7 +2251,7 @@
               </a:spcBef>
             </a:pPr>
             <a:r>
-              <a:rPr b="0" lang="en-US" sz="6600" spc="-1" strike="noStrike">
+              <a:rPr lang="en-US" sz="6600" b="0" strike="noStrike" spc="-1">
                 <a:solidFill>
                   <a:srgbClr val="808080"/>
                 </a:solidFill>
@@ -1992,7 +2260,7 @@
               </a:rPr>
               <a:t>To add or remove bullet points from text, click the Bullets button on the Home tab.</a:t>
             </a:r>
-            <a:endParaRPr b="0" lang="en-US" sz="6600" spc="-1" strike="noStrike">
+            <a:endParaRPr lang="en-US" sz="6600" b="0" strike="noStrike" spc="-1">
               <a:latin typeface="Arial"/>
             </a:endParaRPr>
           </a:p>
@@ -2006,7 +2274,7 @@
               </a:spcBef>
             </a:pPr>
             <a:r>
-              <a:rPr b="0" lang="en-US" sz="6600" spc="-1" strike="noStrike">
+              <a:rPr lang="en-US" sz="6600" b="0" strike="noStrike" spc="-1">
                 <a:solidFill>
                   <a:srgbClr val="808080"/>
                 </a:solidFill>
@@ -2015,7 +2283,7 @@
               </a:rPr>
               <a:t>If you need more placeholders for titles, content or body text, make a copy of what you need and drag it into place. PowerPoint’s Smart Guides will help you align it with everything else.</a:t>
             </a:r>
-            <a:endParaRPr b="0" lang="en-US" sz="6600" spc="-1" strike="noStrike">
+            <a:endParaRPr lang="en-US" sz="6600" b="0" strike="noStrike" spc="-1">
               <a:latin typeface="Arial"/>
             </a:endParaRPr>
           </a:p>
@@ -2029,7 +2297,7 @@
               </a:spcBef>
             </a:pPr>
             <a:r>
-              <a:rPr b="0" lang="en-US" sz="6600" spc="-1" strike="noStrike">
+              <a:rPr lang="en-US" sz="6600" b="0" strike="noStrike" spc="-1">
                 <a:solidFill>
                   <a:srgbClr val="808080"/>
                 </a:solidFill>
@@ -2038,7 +2306,7 @@
               </a:rPr>
               <a:t>Want to use your own pictures instead of ours? No problem! Just click a picture, press the Delete key, then click the icon to add your picture.</a:t>
             </a:r>
-            <a:endParaRPr b="0" lang="en-US" sz="6600" spc="-1" strike="noStrike">
+            <a:endParaRPr lang="en-US" sz="6600" b="0" strike="noStrike" spc="-1">
               <a:latin typeface="Arial"/>
             </a:endParaRPr>
           </a:p>
@@ -2046,26 +2314,306 @@
       </p:sp>
     </p:spTree>
   </p:cSld>
-  <p:clrMap bg1="lt1" bg2="lt2" tx1="dk1" tx2="dk2" accent1="accent1" accent2="accent2" accent3="accent3" accent4="accent4" accent5="accent5" accent6="accent6" hlink="hlink" folHlink="folHlink"/>
+  <p:clrMap bg1="lt1" tx1="dk1" bg2="lt2" tx2="dk2" accent1="accent1" accent2="accent2" accent3="accent3" accent4="accent4" accent5="accent5" accent6="accent6" hlink="hlink" folHlink="folHlink"/>
   <p:sldLayoutIdLst>
-    <p:sldLayoutId id="2147483649" r:id="rId2"/>
-    <p:sldLayoutId id="2147483650" r:id="rId3"/>
-    <p:sldLayoutId id="2147483651" r:id="rId4"/>
-    <p:sldLayoutId id="2147483652" r:id="rId5"/>
-    <p:sldLayoutId id="2147483653" r:id="rId6"/>
-    <p:sldLayoutId id="2147483654" r:id="rId7"/>
-    <p:sldLayoutId id="2147483655" r:id="rId8"/>
-    <p:sldLayoutId id="2147483656" r:id="rId9"/>
-    <p:sldLayoutId id="2147483657" r:id="rId10"/>
-    <p:sldLayoutId id="2147483658" r:id="rId11"/>
-    <p:sldLayoutId id="2147483659" r:id="rId12"/>
-    <p:sldLayoutId id="2147483660" r:id="rId13"/>
+    <p:sldLayoutId id="2147483649" r:id="rId1"/>
+    <p:sldLayoutId id="2147483650" r:id="rId2"/>
+    <p:sldLayoutId id="2147483651" r:id="rId3"/>
+    <p:sldLayoutId id="2147483652" r:id="rId4"/>
+    <p:sldLayoutId id="2147483653" r:id="rId5"/>
+    <p:sldLayoutId id="2147483654" r:id="rId6"/>
+    <p:sldLayoutId id="2147483655" r:id="rId7"/>
+    <p:sldLayoutId id="2147483656" r:id="rId8"/>
+    <p:sldLayoutId id="2147483657" r:id="rId9"/>
+    <p:sldLayoutId id="2147483658" r:id="rId10"/>
+    <p:sldLayoutId id="2147483659" r:id="rId11"/>
+    <p:sldLayoutId id="2147483660" r:id="rId12"/>
   </p:sldLayoutIdLst>
+  <p:txStyles>
+    <p:titleStyle>
+      <a:lvl1pPr algn="l" defTabSz="914400" rtl="0" eaLnBrk="1" latinLnBrk="0" hangingPunct="1">
+        <a:lnSpc>
+          <a:spcPct val="90000"/>
+        </a:lnSpc>
+        <a:spcBef>
+          <a:spcPct val="0"/>
+        </a:spcBef>
+        <a:buNone/>
+        <a:defRPr sz="4400" kern="1200">
+          <a:solidFill>
+            <a:schemeClr val="tx1"/>
+          </a:solidFill>
+          <a:latin typeface="+mj-lt"/>
+          <a:ea typeface="+mj-ea"/>
+          <a:cs typeface="+mj-cs"/>
+        </a:defRPr>
+      </a:lvl1pPr>
+    </p:titleStyle>
+    <p:bodyStyle>
+      <a:lvl1pPr marL="228600" indent="-228600" algn="l" defTabSz="914400" rtl="0" eaLnBrk="1" latinLnBrk="0" hangingPunct="1">
+        <a:lnSpc>
+          <a:spcPct val="90000"/>
+        </a:lnSpc>
+        <a:spcBef>
+          <a:spcPts val="1000"/>
+        </a:spcBef>
+        <a:buFont typeface="Arial" panose="020B0604020202020204" pitchFamily="34" charset="0"/>
+        <a:buChar char="•"/>
+        <a:defRPr sz="2800" kern="1200">
+          <a:solidFill>
+            <a:schemeClr val="tx1"/>
+          </a:solidFill>
+          <a:latin typeface="+mn-lt"/>
+          <a:ea typeface="+mn-ea"/>
+          <a:cs typeface="+mn-cs"/>
+        </a:defRPr>
+      </a:lvl1pPr>
+      <a:lvl2pPr marL="685800" indent="-228600" algn="l" defTabSz="914400" rtl="0" eaLnBrk="1" latinLnBrk="0" hangingPunct="1">
+        <a:lnSpc>
+          <a:spcPct val="90000"/>
+        </a:lnSpc>
+        <a:spcBef>
+          <a:spcPts val="500"/>
+        </a:spcBef>
+        <a:buFont typeface="Arial" panose="020B0604020202020204" pitchFamily="34" charset="0"/>
+        <a:buChar char="•"/>
+        <a:defRPr sz="2400" kern="1200">
+          <a:solidFill>
+            <a:schemeClr val="tx1"/>
+          </a:solidFill>
+          <a:latin typeface="+mn-lt"/>
+          <a:ea typeface="+mn-ea"/>
+          <a:cs typeface="+mn-cs"/>
+        </a:defRPr>
+      </a:lvl2pPr>
+      <a:lvl3pPr marL="1143000" indent="-228600" algn="l" defTabSz="914400" rtl="0" eaLnBrk="1" latinLnBrk="0" hangingPunct="1">
+        <a:lnSpc>
+          <a:spcPct val="90000"/>
+        </a:lnSpc>
+        <a:spcBef>
+          <a:spcPts val="500"/>
+        </a:spcBef>
+        <a:buFont typeface="Arial" panose="020B0604020202020204" pitchFamily="34" charset="0"/>
+        <a:buChar char="•"/>
+        <a:defRPr sz="2000" kern="1200">
+          <a:solidFill>
+            <a:schemeClr val="tx1"/>
+          </a:solidFill>
+          <a:latin typeface="+mn-lt"/>
+          <a:ea typeface="+mn-ea"/>
+          <a:cs typeface="+mn-cs"/>
+        </a:defRPr>
+      </a:lvl3pPr>
+      <a:lvl4pPr marL="1600200" indent="-228600" algn="l" defTabSz="914400" rtl="0" eaLnBrk="1" latinLnBrk="0" hangingPunct="1">
+        <a:lnSpc>
+          <a:spcPct val="90000"/>
+        </a:lnSpc>
+        <a:spcBef>
+          <a:spcPts val="500"/>
+        </a:spcBef>
+        <a:buFont typeface="Arial" panose="020B0604020202020204" pitchFamily="34" charset="0"/>
+        <a:buChar char="•"/>
+        <a:defRPr sz="1800" kern="1200">
+          <a:solidFill>
+            <a:schemeClr val="tx1"/>
+          </a:solidFill>
+          <a:latin typeface="+mn-lt"/>
+          <a:ea typeface="+mn-ea"/>
+          <a:cs typeface="+mn-cs"/>
+        </a:defRPr>
+      </a:lvl4pPr>
+      <a:lvl5pPr marL="2057400" indent="-228600" algn="l" defTabSz="914400" rtl="0" eaLnBrk="1" latinLnBrk="0" hangingPunct="1">
+        <a:lnSpc>
+          <a:spcPct val="90000"/>
+        </a:lnSpc>
+        <a:spcBef>
+          <a:spcPts val="500"/>
+        </a:spcBef>
+        <a:buFont typeface="Arial" panose="020B0604020202020204" pitchFamily="34" charset="0"/>
+        <a:buChar char="•"/>
+        <a:defRPr sz="1800" kern="1200">
+          <a:solidFill>
+            <a:schemeClr val="tx1"/>
+          </a:solidFill>
+          <a:latin typeface="+mn-lt"/>
+          <a:ea typeface="+mn-ea"/>
+          <a:cs typeface="+mn-cs"/>
+        </a:defRPr>
+      </a:lvl5pPr>
+      <a:lvl6pPr marL="2514600" indent="-228600" algn="l" defTabSz="914400" rtl="0" eaLnBrk="1" latinLnBrk="0" hangingPunct="1">
+        <a:lnSpc>
+          <a:spcPct val="90000"/>
+        </a:lnSpc>
+        <a:spcBef>
+          <a:spcPts val="500"/>
+        </a:spcBef>
+        <a:buFont typeface="Arial" panose="020B0604020202020204" pitchFamily="34" charset="0"/>
+        <a:buChar char="•"/>
+        <a:defRPr sz="1800" kern="1200">
+          <a:solidFill>
+            <a:schemeClr val="tx1"/>
+          </a:solidFill>
+          <a:latin typeface="+mn-lt"/>
+          <a:ea typeface="+mn-ea"/>
+          <a:cs typeface="+mn-cs"/>
+        </a:defRPr>
+      </a:lvl6pPr>
+      <a:lvl7pPr marL="2971800" indent="-228600" algn="l" defTabSz="914400" rtl="0" eaLnBrk="1" latinLnBrk="0" hangingPunct="1">
+        <a:lnSpc>
+          <a:spcPct val="90000"/>
+        </a:lnSpc>
+        <a:spcBef>
+          <a:spcPts val="500"/>
+        </a:spcBef>
+        <a:buFont typeface="Arial" panose="020B0604020202020204" pitchFamily="34" charset="0"/>
+        <a:buChar char="•"/>
+        <a:defRPr sz="1800" kern="1200">
+          <a:solidFill>
+            <a:schemeClr val="tx1"/>
+          </a:solidFill>
+          <a:latin typeface="+mn-lt"/>
+          <a:ea typeface="+mn-ea"/>
+          <a:cs typeface="+mn-cs"/>
+        </a:defRPr>
+      </a:lvl7pPr>
+      <a:lvl8pPr marL="3429000" indent="-228600" algn="l" defTabSz="914400" rtl="0" eaLnBrk="1" latinLnBrk="0" hangingPunct="1">
+        <a:lnSpc>
+          <a:spcPct val="90000"/>
+        </a:lnSpc>
+        <a:spcBef>
+          <a:spcPts val="500"/>
+        </a:spcBef>
+        <a:buFont typeface="Arial" panose="020B0604020202020204" pitchFamily="34" charset="0"/>
+        <a:buChar char="•"/>
+        <a:defRPr sz="1800" kern="1200">
+          <a:solidFill>
+            <a:schemeClr val="tx1"/>
+          </a:solidFill>
+          <a:latin typeface="+mn-lt"/>
+          <a:ea typeface="+mn-ea"/>
+          <a:cs typeface="+mn-cs"/>
+        </a:defRPr>
+      </a:lvl8pPr>
+      <a:lvl9pPr marL="3886200" indent="-228600" algn="l" defTabSz="914400" rtl="0" eaLnBrk="1" latinLnBrk="0" hangingPunct="1">
+        <a:lnSpc>
+          <a:spcPct val="90000"/>
+        </a:lnSpc>
+        <a:spcBef>
+          <a:spcPts val="500"/>
+        </a:spcBef>
+        <a:buFont typeface="Arial" panose="020B0604020202020204" pitchFamily="34" charset="0"/>
+        <a:buChar char="•"/>
+        <a:defRPr sz="1800" kern="1200">
+          <a:solidFill>
+            <a:schemeClr val="tx1"/>
+          </a:solidFill>
+          <a:latin typeface="+mn-lt"/>
+          <a:ea typeface="+mn-ea"/>
+          <a:cs typeface="+mn-cs"/>
+        </a:defRPr>
+      </a:lvl9pPr>
+    </p:bodyStyle>
+    <p:otherStyle>
+      <a:defPPr>
+        <a:defRPr lang="en-US"/>
+      </a:defPPr>
+      <a:lvl1pPr marL="0" algn="l" defTabSz="914400" rtl="0" eaLnBrk="1" latinLnBrk="0" hangingPunct="1">
+        <a:defRPr sz="1800" kern="1200">
+          <a:solidFill>
+            <a:schemeClr val="tx1"/>
+          </a:solidFill>
+          <a:latin typeface="+mn-lt"/>
+          <a:ea typeface="+mn-ea"/>
+          <a:cs typeface="+mn-cs"/>
+        </a:defRPr>
+      </a:lvl1pPr>
+      <a:lvl2pPr marL="457200" algn="l" defTabSz="914400" rtl="0" eaLnBrk="1" latinLnBrk="0" hangingPunct="1">
+        <a:defRPr sz="1800" kern="1200">
+          <a:solidFill>
+            <a:schemeClr val="tx1"/>
+          </a:solidFill>
+          <a:latin typeface="+mn-lt"/>
+          <a:ea typeface="+mn-ea"/>
+          <a:cs typeface="+mn-cs"/>
+        </a:defRPr>
+      </a:lvl2pPr>
+      <a:lvl3pPr marL="914400" algn="l" defTabSz="914400" rtl="0" eaLnBrk="1" latinLnBrk="0" hangingPunct="1">
+        <a:defRPr sz="1800" kern="1200">
+          <a:solidFill>
+            <a:schemeClr val="tx1"/>
+          </a:solidFill>
+          <a:latin typeface="+mn-lt"/>
+          <a:ea typeface="+mn-ea"/>
+          <a:cs typeface="+mn-cs"/>
+        </a:defRPr>
+      </a:lvl3pPr>
+      <a:lvl4pPr marL="1371600" algn="l" defTabSz="914400" rtl="0" eaLnBrk="1" latinLnBrk="0" hangingPunct="1">
+        <a:defRPr sz="1800" kern="1200">
+          <a:solidFill>
+            <a:schemeClr val="tx1"/>
+          </a:solidFill>
+          <a:latin typeface="+mn-lt"/>
+          <a:ea typeface="+mn-ea"/>
+          <a:cs typeface="+mn-cs"/>
+        </a:defRPr>
+      </a:lvl4pPr>
+      <a:lvl5pPr marL="1828800" algn="l" defTabSz="914400" rtl="0" eaLnBrk="1" latinLnBrk="0" hangingPunct="1">
+        <a:defRPr sz="1800" kern="1200">
+          <a:solidFill>
+            <a:schemeClr val="tx1"/>
+          </a:solidFill>
+          <a:latin typeface="+mn-lt"/>
+          <a:ea typeface="+mn-ea"/>
+          <a:cs typeface="+mn-cs"/>
+        </a:defRPr>
+      </a:lvl5pPr>
+      <a:lvl6pPr marL="2286000" algn="l" defTabSz="914400" rtl="0" eaLnBrk="1" latinLnBrk="0" hangingPunct="1">
+        <a:defRPr sz="1800" kern="1200">
+          <a:solidFill>
+            <a:schemeClr val="tx1"/>
+          </a:solidFill>
+          <a:latin typeface="+mn-lt"/>
+          <a:ea typeface="+mn-ea"/>
+          <a:cs typeface="+mn-cs"/>
+        </a:defRPr>
+      </a:lvl6pPr>
+      <a:lvl7pPr marL="2743200" algn="l" defTabSz="914400" rtl="0" eaLnBrk="1" latinLnBrk="0" hangingPunct="1">
+        <a:defRPr sz="1800" kern="1200">
+          <a:solidFill>
+            <a:schemeClr val="tx1"/>
+          </a:solidFill>
+          <a:latin typeface="+mn-lt"/>
+          <a:ea typeface="+mn-ea"/>
+          <a:cs typeface="+mn-cs"/>
+        </a:defRPr>
+      </a:lvl7pPr>
+      <a:lvl8pPr marL="3200400" algn="l" defTabSz="914400" rtl="0" eaLnBrk="1" latinLnBrk="0" hangingPunct="1">
+        <a:defRPr sz="1800" kern="1200">
+          <a:solidFill>
+            <a:schemeClr val="tx1"/>
+          </a:solidFill>
+          <a:latin typeface="+mn-lt"/>
+          <a:ea typeface="+mn-ea"/>
+          <a:cs typeface="+mn-cs"/>
+        </a:defRPr>
+      </a:lvl8pPr>
+      <a:lvl9pPr marL="3657600" algn="l" defTabSz="914400" rtl="0" eaLnBrk="1" latinLnBrk="0" hangingPunct="1">
+        <a:defRPr sz="1800" kern="1200">
+          <a:solidFill>
+            <a:schemeClr val="tx1"/>
+          </a:solidFill>
+          <a:latin typeface="+mn-lt"/>
+          <a:ea typeface="+mn-ea"/>
+          <a:cs typeface="+mn-cs"/>
+        </a:defRPr>
+      </a:lvl9pPr>
+    </p:otherStyle>
+  </p:txStyles>
 </p:sldMaster>
 </file>
 
 <file path=ppt/slides/slide1.xml><?xml version="1.0" encoding="utf-8"?>
-<p:sld xmlns:a="http://schemas.openxmlformats.org/drawingml/2006/main" xmlns:p="http://schemas.openxmlformats.org/presentationml/2006/main" xmlns:r="http://schemas.openxmlformats.org/officeDocument/2006/relationships" xmlns:p14="http://schemas.microsoft.com/office/powerpoint/2010/main" xmlns:p15="http://schemas.microsoft.com/office/powerpoint/2012/main" xmlns:mc="http://schemas.openxmlformats.org/markup-compatibility/2006">
+<p:sld xmlns:a="http://schemas.openxmlformats.org/drawingml/2006/main" xmlns:r="http://schemas.openxmlformats.org/officeDocument/2006/relationships" xmlns:p="http://schemas.openxmlformats.org/presentationml/2006/main">
   <p:cSld>
     <p:spTree>
       <p:nvGrpSpPr>
@@ -2101,13 +2649,20 @@
           </a:ln>
         </p:spPr>
         <p:style>
-          <a:lnRef idx="0"/>
-          <a:fillRef idx="0"/>
-          <a:effectRef idx="0"/>
+          <a:lnRef idx="0">
+            <a:scrgbClr r="0" g="0" b="0"/>
+          </a:lnRef>
+          <a:fillRef idx="0">
+            <a:scrgbClr r="0" g="0" b="0"/>
+          </a:fillRef>
+          <a:effectRef idx="0">
+            <a:scrgbClr r="0" g="0" b="0"/>
+          </a:effectRef>
           <a:fontRef idx="minor"/>
         </p:style>
         <p:txBody>
-          <a:bodyPr lIns="90000" rIns="90000" tIns="45000" bIns="45000" anchor="b"/>
+          <a:bodyPr lIns="90000" tIns="45000" rIns="90000" bIns="45000" anchor="b"/>
+          <a:lstStyle/>
           <a:p>
             <a:pPr algn="ctr">
               <a:lnSpc>
@@ -2115,30 +2670,38 @@
               </a:lnSpc>
             </a:pPr>
             <a:r>
-              <a:rPr b="0" lang="en-US" sz="9600" spc="-1" strike="noStrike">
+              <a:rPr lang="en-US" sz="9600" b="0" strike="noStrike" spc="-1" dirty="0">
                 <a:solidFill>
-                  <a:srgbClr val="ffffff"/>
+                  <a:srgbClr val="FFFFFF"/>
                 </a:solidFill>
                 <a:latin typeface="Arial"/>
                 <a:ea typeface="DejaVu Sans"/>
               </a:rPr>
-              <a:t>Validation Study of Image Recognition Algorithms </a:t>
-            </a:r>
-            <a:br/>
-            <a:br/>
-            <a:r>
-              <a:rPr b="0" lang="en-US" sz="3600" spc="-1" strike="noStrike">
+              <a:t>Validation Study of Image Segmentation Algorithms </a:t>
+            </a:r>
+            <a:br>
+              <a:rPr dirty="0"/>
+            </a:br>
+            <a:br>
+              <a:rPr dirty="0"/>
+            </a:br>
+            <a:r>
+              <a:rPr lang="en-US" sz="3600" b="0" strike="noStrike" spc="-1" dirty="0">
                 <a:solidFill>
-                  <a:srgbClr val="ffffff"/>
+                  <a:srgbClr val="FFFFFF"/>
                 </a:solidFill>
                 <a:latin typeface="Arial Black"/>
                 <a:ea typeface="DejaVu Sans"/>
               </a:rPr>
               <a:t>Southwestern Oklahoma State University </a:t>
             </a:r>
-            <a:br/>
-            <a:br/>
-            <a:endParaRPr b="0" lang="en-US" sz="3600" spc="-1" strike="noStrike">
+            <a:br>
+              <a:rPr dirty="0"/>
+            </a:br>
+            <a:br>
+              <a:rPr dirty="0"/>
+            </a:br>
+            <a:endParaRPr lang="en-US" sz="3600" b="0" strike="noStrike" spc="-1" dirty="0">
               <a:latin typeface="Arial"/>
             </a:endParaRPr>
           </a:p>
@@ -2164,13 +2727,20 @@
           </a:ln>
         </p:spPr>
         <p:style>
-          <a:lnRef idx="0"/>
-          <a:fillRef idx="0"/>
-          <a:effectRef idx="0"/>
+          <a:lnRef idx="0">
+            <a:scrgbClr r="0" g="0" b="0"/>
+          </a:lnRef>
+          <a:fillRef idx="0">
+            <a:scrgbClr r="0" g="0" b="0"/>
+          </a:fillRef>
+          <a:effectRef idx="0">
+            <a:scrgbClr r="0" g="0" b="0"/>
+          </a:effectRef>
           <a:fontRef idx="minor"/>
         </p:style>
         <p:txBody>
-          <a:bodyPr lIns="90000" rIns="90000" tIns="45000" bIns="45000" anchor="ctr"/>
+          <a:bodyPr lIns="90000" tIns="45000" rIns="90000" bIns="45000" anchor="ctr"/>
+          <a:lstStyle/>
           <a:p>
             <a:pPr>
               <a:lnSpc>
@@ -2178,16 +2748,16 @@
               </a:lnSpc>
             </a:pPr>
             <a:r>
-              <a:rPr b="0" lang="en-US" sz="3600" spc="-1" strike="noStrike">
+              <a:rPr lang="en-US" sz="3600" b="0" strike="noStrike" spc="-1">
                 <a:solidFill>
-                  <a:srgbClr val="bfbfbf"/>
+                  <a:srgbClr val="BFBFBF"/>
                 </a:solidFill>
                 <a:latin typeface="Arial"/>
                 <a:ea typeface="DejaVu Sans"/>
               </a:rPr>
               <a:t>Jacob Miller | Dr. Jeremy Evert | Department of Computer Science and Engineering Technology</a:t>
             </a:r>
-            <a:endParaRPr b="0" lang="en-US" sz="3600" spc="-1" strike="noStrike">
+            <a:endParaRPr lang="en-US" sz="3600" b="0" strike="noStrike" spc="-1">
               <a:latin typeface="Arial"/>
             </a:endParaRPr>
           </a:p>
@@ -2210,10 +2780,10 @@
           <a:gradFill rotWithShape="0">
             <a:gsLst>
               <a:gs pos="0">
-                <a:srgbClr val="00b0ea"/>
+                <a:srgbClr val="00B0EA"/>
               </a:gs>
               <a:gs pos="100000">
-                <a:srgbClr val="00b0ea"/>
+                <a:srgbClr val="00B0EA"/>
               </a:gs>
             </a:gsLst>
             <a:lin ang="5400000"/>
@@ -2223,13 +2793,20 @@
           </a:ln>
         </p:spPr>
         <p:style>
-          <a:lnRef idx="0"/>
-          <a:fillRef idx="0"/>
-          <a:effectRef idx="0"/>
+          <a:lnRef idx="0">
+            <a:scrgbClr r="0" g="0" b="0"/>
+          </a:lnRef>
+          <a:fillRef idx="0">
+            <a:scrgbClr r="0" g="0" b="0"/>
+          </a:fillRef>
+          <a:effectRef idx="0">
+            <a:scrgbClr r="0" g="0" b="0"/>
+          </a:effectRef>
           <a:fontRef idx="minor"/>
         </p:style>
         <p:txBody>
-          <a:bodyPr lIns="365760" rIns="90000" tIns="45000" bIns="45000" anchor="ctr"/>
+          <a:bodyPr lIns="365760" tIns="45000" rIns="90000" bIns="45000" anchor="ctr"/>
+          <a:lstStyle/>
           <a:p>
             <a:pPr algn="ctr">
               <a:lnSpc>
@@ -2237,16 +2814,16 @@
               </a:lnSpc>
             </a:pPr>
             <a:r>
-              <a:rPr b="0" lang="en-US" sz="5400" spc="-1" strike="noStrike">
+              <a:rPr lang="en-US" sz="5400" b="0" strike="noStrike" spc="-1">
                 <a:solidFill>
-                  <a:srgbClr val="ffffff"/>
+                  <a:srgbClr val="FFFFFF"/>
                 </a:solidFill>
                 <a:latin typeface="Arial"/>
                 <a:ea typeface="DejaVu Sans"/>
               </a:rPr>
               <a:t>Introduction</a:t>
             </a:r>
-            <a:endParaRPr b="0" lang="en-US" sz="5400" spc="-1" strike="noStrike">
+            <a:endParaRPr lang="en-US" sz="5400" b="0" strike="noStrike" spc="-1">
               <a:latin typeface="Arial"/>
             </a:endParaRPr>
           </a:p>
@@ -2267,20 +2844,79 @@
             <a:avLst/>
           </a:prstGeom>
           <a:solidFill>
-            <a:srgbClr val="e8e8e8"/>
+            <a:srgbClr val="E8E8E8"/>
           </a:solidFill>
           <a:ln>
             <a:noFill/>
           </a:ln>
         </p:spPr>
         <p:style>
-          <a:lnRef idx="0"/>
-          <a:fillRef idx="0"/>
-          <a:effectRef idx="0"/>
+          <a:lnRef idx="0">
+            <a:scrgbClr r="0" g="0" b="0"/>
+          </a:lnRef>
+          <a:fillRef idx="0">
+            <a:scrgbClr r="0" g="0" b="0"/>
+          </a:fillRef>
+          <a:effectRef idx="0">
+            <a:scrgbClr r="0" g="0" b="0"/>
+          </a:effectRef>
           <a:fontRef idx="minor"/>
         </p:style>
         <p:txBody>
-          <a:bodyPr lIns="365760" rIns="365760" tIns="45000" bIns="45000" anchor="ctr"/>
+          <a:bodyPr lIns="365760" tIns="45000" rIns="365760" bIns="45000" anchor="ctr"/>
+          <a:lstStyle/>
+          <a:p>
+            <a:r>
+              <a:rPr lang="en-US" sz="4000" dirty="0"/>
+              <a:t>Developments in machine learning and computing </a:t>
+            </a:r>
+            <a:r>
+              <a:rPr lang="en-US" sz="4000" spc="-1" dirty="0">
+                <a:solidFill>
+                  <a:srgbClr val="000000"/>
+                </a:solidFill>
+                <a:latin typeface="Arial"/>
+                <a:ea typeface="DejaVu Sans"/>
+              </a:rPr>
+              <a:t>capability in recent years have created opportunities that were previously not cost effective. One such area is image recognition and computer vision, where a machine analyzes an image and classifies it. After classification, the machine can pass the information off to a different algorithm for decision making. Before a machine can classify parts of an image as a human does, it must break down the image in a process called image segmentation. This task is an open research area. Many algorithms exist to determine how pixels are grouped. This research poster details a validation study of related papers on image segmentation algorithms for machine learning. The first author has selected three different image segmentation approaches. Algorithms for this study will be reproduced in Python and utilize many pre-existing libraries. Our team has acquired a small robotic research platform to provide evaluation of our research. A Robot Operating System based robot will be assembled and tested with the three different algorithms to assess their real-world effectiveness. This study may lead to more research platforms. Additionally, this undergraduate research study opens opportunities for students to work with sophisticated code first-hand. This research was funded in part by the Dr. Snowden Memorial Scholarship with the NASA Oklahoma Space Grant Consortium. This material is based upon work supported by NASA issued through the OSGC. </a:t>
+            </a:r>
+          </a:p>
+        </p:txBody>
+      </p:sp>
+      <p:sp>
+        <p:nvSpPr>
+          <p:cNvPr id="50" name="CustomShape 5"/>
+          <p:cNvSpPr/>
+          <p:nvPr/>
+        </p:nvSpPr>
+        <p:spPr>
+          <a:xfrm>
+            <a:off x="1158120" y="27099360"/>
+            <a:ext cx="12615120" cy="5566320"/>
+          </a:xfrm>
+          <a:prstGeom prst="rect">
+            <a:avLst/>
+          </a:prstGeom>
+          <a:noFill/>
+          <a:ln>
+            <a:noFill/>
+          </a:ln>
+        </p:spPr>
+        <p:style>
+          <a:lnRef idx="0">
+            <a:scrgbClr r="0" g="0" b="0"/>
+          </a:lnRef>
+          <a:fillRef idx="0">
+            <a:scrgbClr r="0" g="0" b="0"/>
+          </a:fillRef>
+          <a:effectRef idx="0">
+            <a:scrgbClr r="0" g="0" b="0"/>
+          </a:effectRef>
+          <a:fontRef idx="minor"/>
+        </p:style>
+        <p:txBody>
+          <a:bodyPr lIns="90000" tIns="182880" rIns="90000" bIns="45000"/>
+          <a:lstStyle/>
           <a:p>
             <a:pPr>
               <a:lnSpc>
@@ -2291,86 +2927,31 @@
               </a:spcBef>
             </a:pPr>
             <a:r>
-              <a:rPr b="0" lang="en-US" sz="4000" spc="-1" strike="noStrike">
+              <a:rPr lang="en-US" sz="4000" b="0" strike="noStrike" spc="-1">
                 <a:solidFill>
                   <a:srgbClr val="000000"/>
                 </a:solidFill>
                 <a:latin typeface="Arial"/>
                 <a:ea typeface="DejaVu Sans"/>
               </a:rPr>
-              <a:t>Developments in machine learning in recent years have created opportunities that previously never existed. One such field with an explosion of opportunity is image recognition, also known as computer vision; the process in which a machine analyzes a digital image. </a:t>
-            </a:r>
-            <a:br/>
-            <a:r>
-              <a:rPr b="0" lang="en-US" sz="4000" spc="-1" strike="noStrike">
-                <a:solidFill>
-                  <a:srgbClr val="000000"/>
-                </a:solidFill>
-                <a:latin typeface="Arial"/>
-                <a:ea typeface="DejaVu Sans"/>
-              </a:rPr>
-              <a:t>In order for a machine to ‘see’ as a human does, it must break down the image in a process called image segmentation. The way the machine goes about doing this is important, and many algorithms exist to determine just how a machine will decide to group the pixels in an image. </a:t>
-            </a:r>
-            <a:br/>
-            <a:r>
-              <a:rPr b="0" lang="en-US" sz="4000" spc="-1" strike="noStrike">
-                <a:solidFill>
-                  <a:srgbClr val="000000"/>
-                </a:solidFill>
-                <a:latin typeface="Arial"/>
-                <a:ea typeface="DejaVu Sans"/>
-              </a:rPr>
-              <a:t>This research is a validation study of related papers on image segmentation algorithms for machine learning.</a:t>
-            </a:r>
-            <a:br/>
-            <a:r>
-              <a:rPr b="0" lang="en-US" sz="4000" spc="-1" strike="noStrike">
-                <a:solidFill>
-                  <a:srgbClr val="000000"/>
-                </a:solidFill>
-                <a:latin typeface="Arial"/>
-                <a:ea typeface="DejaVu Sans"/>
-              </a:rPr>
-              <a:t>Algorithms for this study will be written in Python and tested on three different hardware environments: a laptop, a desktop, and a server. </a:t>
-            </a:r>
-            <a:br/>
-            <a:r>
-              <a:rPr b="0" lang="en-US" sz="4000" spc="-1" strike="noStrike">
-                <a:solidFill>
-                  <a:srgbClr val="000000"/>
-                </a:solidFill>
-                <a:latin typeface="Arial"/>
-                <a:ea typeface="DejaVu Sans"/>
-              </a:rPr>
-              <a:t>Many fields have great use for computer vision, and its improvement is a good sign that more possibilities will open up with its application. Additionally, this study opens opportunities for students to see sophisticated code first hand. </a:t>
-            </a:r>
-            <a:br/>
-            <a:r>
-              <a:rPr b="0" lang="en-US" sz="4000" spc="-1" strike="noStrike">
-                <a:solidFill>
-                  <a:srgbClr val="000000"/>
-                </a:solidFill>
-                <a:latin typeface="Arial"/>
-                <a:ea typeface="DejaVu Sans"/>
-              </a:rPr>
-              <a:t>This research was funded in part by the Dr. Snowden Memorial Scholarship with the NASA OKLAHOMA Space Grant Consortium. This material is based upon work supported by the National Aeronautics and Space Administration issued through the Oklahoma Space Grant Consortium.</a:t>
-            </a:r>
-            <a:endParaRPr b="0" lang="en-US" sz="4000" spc="-1" strike="noStrike">
-              <a:latin typeface="Arial"/>
-            </a:endParaRPr>
-          </a:p>
-        </p:txBody>
-      </p:sp>
-      <p:sp>
-        <p:nvSpPr>
-          <p:cNvPr id="50" name="CustomShape 5"/>
+              <a:t>This project serves as an introduction to machine learning and the research around image segmentation. The goal for the researchers is an increase familiarity with tools and fundamental concepts. Emphasis was placed on projects related to current research trajectories for NASA, general robotics applications, and Southwest Research Institute. </a:t>
+            </a:r>
+            <a:endParaRPr lang="en-US" sz="4000" b="0" strike="noStrike" spc="-1">
+              <a:latin typeface="Arial"/>
+            </a:endParaRPr>
+          </a:p>
+        </p:txBody>
+      </p:sp>
+      <p:sp>
+        <p:nvSpPr>
+          <p:cNvPr id="52" name="CustomShape 7"/>
           <p:cNvSpPr/>
           <p:nvPr/>
         </p:nvSpPr>
         <p:spPr>
           <a:xfrm>
-            <a:off x="1158120" y="27099360"/>
-            <a:ext cx="12615120" cy="5566320"/>
+            <a:off x="30117960" y="25255153"/>
+            <a:ext cx="12800520" cy="5913347"/>
           </a:xfrm>
           <a:prstGeom prst="rect">
             <a:avLst/>
@@ -2381,13 +2962,20 @@
           </a:ln>
         </p:spPr>
         <p:style>
-          <a:lnRef idx="0"/>
-          <a:fillRef idx="0"/>
-          <a:effectRef idx="0"/>
+          <a:lnRef idx="0">
+            <a:scrgbClr r="0" g="0" b="0"/>
+          </a:lnRef>
+          <a:fillRef idx="0">
+            <a:scrgbClr r="0" g="0" b="0"/>
+          </a:fillRef>
+          <a:effectRef idx="0">
+            <a:scrgbClr r="0" g="0" b="0"/>
+          </a:effectRef>
           <a:fontRef idx="minor"/>
         </p:style>
         <p:txBody>
-          <a:bodyPr lIns="90000" rIns="90000" tIns="182880" bIns="45000"/>
+          <a:bodyPr lIns="90000" tIns="182880" rIns="90000" bIns="45000"/>
+          <a:lstStyle/>
           <a:p>
             <a:pPr>
               <a:lnSpc>
@@ -2398,107 +2986,16 @@
               </a:spcBef>
             </a:pPr>
             <a:r>
-              <a:rPr b="0" lang="en-US" sz="4000" spc="-1" strike="noStrike">
+              <a:rPr lang="en-US" sz="3200" spc="-1" dirty="0">
                 <a:solidFill>
                   <a:srgbClr val="000000"/>
                 </a:solidFill>
                 <a:latin typeface="Arial"/>
                 <a:ea typeface="DejaVu Sans"/>
               </a:rPr>
-              <a:t>This project serves as an introduction to machine learning and the research around image segmentation. The goal for the researchers is an increase familiarity with tools and fundamental concepts. Emphasis was placed on projects related to current research trajectories for NASA, general robotics applications, and Southwest Research Institute. </a:t>
-            </a:r>
-            <a:endParaRPr b="0" lang="en-US" sz="4000" spc="-1" strike="noStrike">
-              <a:latin typeface="Arial"/>
-            </a:endParaRPr>
-          </a:p>
-        </p:txBody>
-      </p:sp>
-      <p:sp>
-        <p:nvSpPr>
-          <p:cNvPr id="51" name="CustomShape 6"/>
-          <p:cNvSpPr/>
-          <p:nvPr/>
-        </p:nvSpPr>
-        <p:spPr>
-          <a:xfrm>
-            <a:off x="30264480" y="5608800"/>
-            <a:ext cx="12800520" cy="1218240"/>
-          </a:xfrm>
-          <a:prstGeom prst="rect">
-            <a:avLst/>
-          </a:prstGeom>
-          <a:gradFill rotWithShape="0">
-            <a:gsLst>
-              <a:gs pos="0">
-                <a:srgbClr val="00b0ea"/>
-              </a:gs>
-              <a:gs pos="100000">
-                <a:srgbClr val="00b0ea"/>
-              </a:gs>
-            </a:gsLst>
-            <a:lin ang="5400000"/>
-          </a:gradFill>
-          <a:ln>
-            <a:noFill/>
-          </a:ln>
-        </p:spPr>
-        <p:style>
-          <a:lnRef idx="0"/>
-          <a:fillRef idx="0"/>
-          <a:effectRef idx="0"/>
-          <a:fontRef idx="minor"/>
-        </p:style>
-        <p:txBody>
-          <a:bodyPr lIns="365760" rIns="90000" tIns="45000" bIns="45000" anchor="ctr"/>
-          <a:p>
-            <a:pPr algn="ctr">
-              <a:lnSpc>
-                <a:spcPct val="100000"/>
-              </a:lnSpc>
-            </a:pPr>
-            <a:r>
-              <a:rPr b="0" lang="en-US" sz="5400" spc="-1" strike="noStrike">
-                <a:solidFill>
-                  <a:srgbClr val="ffffff"/>
-                </a:solidFill>
-                <a:latin typeface="Arial"/>
-                <a:ea typeface="DejaVu Sans"/>
-              </a:rPr>
-              <a:t>Example</a:t>
-            </a:r>
-            <a:endParaRPr b="0" lang="en-US" sz="5400" spc="-1" strike="noStrike">
-              <a:latin typeface="Arial"/>
-            </a:endParaRPr>
-          </a:p>
-        </p:txBody>
-      </p:sp>
-      <p:sp>
-        <p:nvSpPr>
-          <p:cNvPr id="52" name="CustomShape 7"/>
-          <p:cNvSpPr/>
-          <p:nvPr/>
-        </p:nvSpPr>
-        <p:spPr>
-          <a:xfrm>
-            <a:off x="30540960" y="24780240"/>
-            <a:ext cx="12800520" cy="7044120"/>
-          </a:xfrm>
-          <a:prstGeom prst="rect">
-            <a:avLst/>
-          </a:prstGeom>
-          <a:noFill/>
-          <a:ln>
-            <a:noFill/>
-          </a:ln>
-        </p:spPr>
-        <p:style>
-          <a:lnRef idx="0"/>
-          <a:fillRef idx="0"/>
-          <a:effectRef idx="0"/>
-          <a:fontRef idx="minor"/>
-        </p:style>
-        <p:txBody>
-          <a:bodyPr lIns="90000" rIns="90000" tIns="182880" bIns="45000"/>
+              <a:t>Arbelaez, P., Maire, M., Fowlkes, C., &amp; Malik, J. (2010). Contour Detection and Hierarchical Image Segmentation. IEEE Transactions on Pattern Analysis and Machine Intelligence, 898 - 916</a:t>
+            </a:r>
+          </a:p>
           <a:p>
             <a:pPr>
               <a:lnSpc>
@@ -2509,16 +3006,36 @@
               </a:spcBef>
             </a:pPr>
             <a:r>
-              <a:rPr b="0" lang="en-US" sz="3200" spc="-1" strike="noStrike">
+              <a:rPr lang="en-US" sz="3200" b="0" strike="noStrike" spc="-1" dirty="0">
                 <a:solidFill>
                   <a:srgbClr val="000000"/>
                 </a:solidFill>
                 <a:latin typeface="Arial"/>
                 <a:ea typeface="DejaVu Sans"/>
               </a:rPr>
-              <a:t>Bhatia, R. (2018, April 10). Deeplearning.jpg [Digital image]. Retrieved November 7, 2018, from https://www.analyticsindiamag.com/how-to-build-a-career-in-computer-vision/</a:t>
-            </a:r>
-            <a:endParaRPr b="0" lang="en-US" sz="3200" spc="-1" strike="noStrike">
+              <a:t>Christophe </a:t>
+            </a:r>
+            <a:r>
+              <a:rPr lang="en-US" sz="3200" b="0" strike="noStrike" spc="-1" dirty="0" err="1">
+                <a:solidFill>
+                  <a:srgbClr val="000000"/>
+                </a:solidFill>
+                <a:latin typeface="Arial"/>
+                <a:ea typeface="DejaVu Sans"/>
+              </a:rPr>
+              <a:t>Andrieu</a:t>
+            </a:r>
+            <a:r>
+              <a:rPr lang="en-US" sz="3200" b="0" strike="noStrike" spc="-1" dirty="0">
+                <a:solidFill>
+                  <a:srgbClr val="000000"/>
+                </a:solidFill>
+                <a:latin typeface="Arial"/>
+                <a:ea typeface="DejaVu Sans"/>
+              </a:rPr>
+              <a:t>, N. D. (2003). An Introduction to MCMC for Machine Learning. Machine Learning, 50, 5-43.</a:t>
+            </a:r>
+            <a:endParaRPr lang="en-US" sz="3200" b="0" strike="noStrike" spc="-1" dirty="0">
               <a:latin typeface="Arial"/>
             </a:endParaRPr>
           </a:p>
@@ -2532,16 +3049,16 @@
               </a:spcBef>
             </a:pPr>
             <a:r>
-              <a:rPr b="0" lang="en-US" sz="3200" spc="-1" strike="noStrike">
+              <a:rPr lang="en-US" sz="3200" b="0" strike="noStrike" spc="-1" dirty="0">
                 <a:solidFill>
                   <a:srgbClr val="000000"/>
                 </a:solidFill>
                 <a:latin typeface="Arial"/>
                 <a:ea typeface="DejaVu Sans"/>
               </a:rPr>
-              <a:t>Christophe Andrieu, N. D. (2003). An Introduction to MCMC for Machine Learning. Machine Learning, 50, 5-43.</a:t>
-            </a:r>
-            <a:endParaRPr b="0" lang="en-US" sz="3200" spc="-1" strike="noStrike">
+              <a:t>David Martin, C. F. (2001). A Database of Human Segmented Natural Images and its Application to Evaluating Segmentation Algorithms and Measuring Ecological Statistics. Vancouver: IEEE.</a:t>
+            </a:r>
+            <a:endParaRPr lang="en-US" sz="3200" b="0" strike="noStrike" spc="-1" dirty="0">
               <a:latin typeface="Arial"/>
             </a:endParaRPr>
           </a:p>
@@ -2555,16 +3072,36 @@
               </a:spcBef>
             </a:pPr>
             <a:r>
-              <a:rPr b="0" lang="en-US" sz="3200" spc="-1" strike="noStrike">
+              <a:rPr lang="en-US" sz="3200" b="0" strike="noStrike" spc="-1" dirty="0">
                 <a:solidFill>
                   <a:srgbClr val="000000"/>
                 </a:solidFill>
                 <a:latin typeface="Arial"/>
                 <a:ea typeface="DejaVu Sans"/>
               </a:rPr>
-              <a:t>David Martin, C. F. (2001). A Database of Human Segmented Natural Images and its Application to Evaluating Segmentation Algorithms and Measuring Ecological Statistics. Vancouver: IEEE.</a:t>
-            </a:r>
-            <a:endParaRPr b="0" lang="en-US" sz="3200" spc="-1" strike="noStrike">
+              <a:t>Larry </a:t>
+            </a:r>
+            <a:r>
+              <a:rPr lang="en-US" sz="3200" b="0" strike="noStrike" spc="-1" dirty="0" err="1">
+                <a:solidFill>
+                  <a:srgbClr val="000000"/>
+                </a:solidFill>
+                <a:latin typeface="Arial"/>
+                <a:ea typeface="DejaVu Sans"/>
+              </a:rPr>
+              <a:t>Matthies</a:t>
+            </a:r>
+            <a:r>
+              <a:rPr lang="en-US" sz="3200" b="0" strike="noStrike" spc="-1" dirty="0">
+                <a:solidFill>
+                  <a:srgbClr val="000000"/>
+                </a:solidFill>
+                <a:latin typeface="Arial"/>
+                <a:ea typeface="DejaVu Sans"/>
+              </a:rPr>
+              <a:t>, M. M. (2007). Computer Vision on Mars. International Journal of Computer Vision, Volume 75, Issue 1, 67-92.</a:t>
+            </a:r>
+            <a:endParaRPr lang="en-US" sz="3200" b="0" strike="noStrike" spc="-1" dirty="0">
               <a:latin typeface="Arial"/>
             </a:endParaRPr>
           </a:p>
@@ -2578,16 +3115,16 @@
               </a:spcBef>
             </a:pPr>
             <a:r>
-              <a:rPr b="0" lang="en-US" sz="3200" spc="-1" strike="noStrike">
+              <a:rPr lang="en-US" sz="3200" b="0" strike="noStrike" spc="-1" dirty="0">
                 <a:solidFill>
                   <a:srgbClr val="000000"/>
                 </a:solidFill>
                 <a:latin typeface="Arial"/>
                 <a:ea typeface="DejaVu Sans"/>
               </a:rPr>
-              <a:t>Larry Matthies, M. M. (2007). Computer Vision on Mars. International Journal of Computer Vision, Volume 75, Issue 1, 67-92.</a:t>
-            </a:r>
-            <a:endParaRPr b="0" lang="en-US" sz="3200" spc="-1" strike="noStrike">
+              <a:t>P.C.H. Martens, e. a. (2012). Computer Vision for the Solar Dynamics Observatory (SDO). Solar Physics, Volume 275, Issue 1-2, 79-113.</a:t>
+            </a:r>
+            <a:endParaRPr lang="en-US" sz="3200" b="0" strike="noStrike" spc="-1" dirty="0">
               <a:latin typeface="Arial"/>
             </a:endParaRPr>
           </a:p>
@@ -2600,17 +3137,7 @@
                 <a:spcPts val="1199"/>
               </a:spcBef>
             </a:pPr>
-            <a:r>
-              <a:rPr b="0" lang="en-US" sz="3200" spc="-1" strike="noStrike">
-                <a:solidFill>
-                  <a:srgbClr val="000000"/>
-                </a:solidFill>
-                <a:latin typeface="Arial"/>
-                <a:ea typeface="DejaVu Sans"/>
-              </a:rPr>
-              <a:t>P.C.H. Martens, e. a. (2012). Computer Vision for the Solar Dynamics Observatory (SDO). Solar Physics, Volume 275, Issue 1-2, 79-113.</a:t>
-            </a:r>
-            <a:endParaRPr b="0" lang="en-US" sz="3200" spc="-1" strike="noStrike">
+            <a:endParaRPr lang="en-US" sz="3200" b="0" strike="noStrike" spc="-1" dirty="0">
               <a:latin typeface="Arial"/>
             </a:endParaRPr>
           </a:p>
@@ -2623,10 +3150,323 @@
                 <a:spcPts val="1199"/>
               </a:spcBef>
             </a:pPr>
-            <a:endParaRPr b="0" lang="en-US" sz="3200" spc="-1" strike="noStrike">
-              <a:latin typeface="Arial"/>
-            </a:endParaRPr>
-          </a:p>
+            <a:endParaRPr lang="en-US" sz="3200" b="0" strike="noStrike" spc="-1" dirty="0">
+              <a:latin typeface="Arial"/>
+            </a:endParaRPr>
+          </a:p>
+        </p:txBody>
+      </p:sp>
+      <p:pic>
+        <p:nvPicPr>
+          <p:cNvPr id="53" name="Picture 4"/>
+          <p:cNvPicPr/>
+          <p:nvPr/>
+        </p:nvPicPr>
+        <p:blipFill>
+          <a:blip r:embed="rId3"/>
+          <a:stretch/>
+        </p:blipFill>
+        <p:spPr>
+          <a:xfrm>
+            <a:off x="661680" y="74880"/>
+            <a:ext cx="4518720" cy="3427560"/>
+          </a:xfrm>
+          <a:prstGeom prst="rect">
+            <a:avLst/>
+          </a:prstGeom>
+          <a:ln>
+            <a:noFill/>
+          </a:ln>
+        </p:spPr>
+      </p:pic>
+      <p:sp>
+        <p:nvSpPr>
+          <p:cNvPr id="54" name="CustomShape 8"/>
+          <p:cNvSpPr/>
+          <p:nvPr/>
+        </p:nvSpPr>
+        <p:spPr>
+          <a:xfrm>
+            <a:off x="972720" y="25894440"/>
+            <a:ext cx="12800520" cy="1218240"/>
+          </a:xfrm>
+          <a:prstGeom prst="rect">
+            <a:avLst/>
+          </a:prstGeom>
+          <a:gradFill rotWithShape="0">
+            <a:gsLst>
+              <a:gs pos="0">
+                <a:srgbClr val="00B0EA"/>
+              </a:gs>
+              <a:gs pos="100000">
+                <a:srgbClr val="00B0EA"/>
+              </a:gs>
+            </a:gsLst>
+            <a:lin ang="5400000"/>
+          </a:gradFill>
+          <a:ln>
+            <a:noFill/>
+          </a:ln>
+        </p:spPr>
+        <p:style>
+          <a:lnRef idx="0">
+            <a:scrgbClr r="0" g="0" b="0"/>
+          </a:lnRef>
+          <a:fillRef idx="0">
+            <a:scrgbClr r="0" g="0" b="0"/>
+          </a:fillRef>
+          <a:effectRef idx="0">
+            <a:scrgbClr r="0" g="0" b="0"/>
+          </a:effectRef>
+          <a:fontRef idx="minor"/>
+        </p:style>
+        <p:txBody>
+          <a:bodyPr lIns="365760" tIns="45000" rIns="90000" bIns="45000" anchor="ctr"/>
+          <a:lstStyle/>
+          <a:p>
+            <a:pPr algn="ctr">
+              <a:lnSpc>
+                <a:spcPct val="100000"/>
+              </a:lnSpc>
+            </a:pPr>
+            <a:r>
+              <a:rPr lang="en-US" sz="5400" b="0" strike="noStrike" spc="-1">
+                <a:solidFill>
+                  <a:srgbClr val="FFFFFF"/>
+                </a:solidFill>
+                <a:latin typeface="Arial"/>
+                <a:ea typeface="DejaVu Sans"/>
+              </a:rPr>
+              <a:t>Objectives</a:t>
+            </a:r>
+            <a:endParaRPr lang="en-US" sz="5400" b="0" strike="noStrike" spc="-1">
+              <a:latin typeface="Arial"/>
+            </a:endParaRPr>
+          </a:p>
+        </p:txBody>
+      </p:sp>
+      <p:sp>
+        <p:nvSpPr>
+          <p:cNvPr id="55" name="CustomShape 9"/>
+          <p:cNvSpPr/>
+          <p:nvPr/>
+        </p:nvSpPr>
+        <p:spPr>
+          <a:xfrm>
+            <a:off x="0" y="32197320"/>
+            <a:ext cx="38610360" cy="638280"/>
+          </a:xfrm>
+          <a:prstGeom prst="rect">
+            <a:avLst/>
+          </a:prstGeom>
+          <a:noFill/>
+          <a:ln>
+            <a:noFill/>
+          </a:ln>
+        </p:spPr>
+        <p:style>
+          <a:lnRef idx="0">
+            <a:scrgbClr r="0" g="0" b="0"/>
+          </a:lnRef>
+          <a:fillRef idx="0">
+            <a:scrgbClr r="0" g="0" b="0"/>
+          </a:fillRef>
+          <a:effectRef idx="0">
+            <a:scrgbClr r="0" g="0" b="0"/>
+          </a:effectRef>
+          <a:fontRef idx="minor"/>
+        </p:style>
+        <p:txBody>
+          <a:bodyPr lIns="90000" tIns="45000" rIns="90000" bIns="45000"/>
+          <a:lstStyle/>
+          <a:p>
+            <a:pPr>
+              <a:lnSpc>
+                <a:spcPct val="100000"/>
+              </a:lnSpc>
+            </a:pPr>
+            <a:r>
+              <a:rPr lang="en-US" sz="3600" b="0" i="1" strike="noStrike" spc="-1">
+                <a:solidFill>
+                  <a:srgbClr val="000000"/>
+                </a:solidFill>
+                <a:latin typeface="Times New Roman"/>
+                <a:ea typeface="DejaVu Sans"/>
+              </a:rPr>
+              <a:t>This material is based upon work supported by the National Aeronautics and Space Administration under Grant No.NNX15AK02H issued through NASA Education.</a:t>
+            </a:r>
+            <a:endParaRPr lang="en-US" sz="3600" b="0" strike="noStrike" spc="-1">
+              <a:latin typeface="Arial"/>
+            </a:endParaRPr>
+          </a:p>
+        </p:txBody>
+      </p:sp>
+      <p:sp>
+        <p:nvSpPr>
+          <p:cNvPr id="56" name="CustomShape 10"/>
+          <p:cNvSpPr/>
+          <p:nvPr/>
+        </p:nvSpPr>
+        <p:spPr>
+          <a:xfrm>
+            <a:off x="30117960" y="16759346"/>
+            <a:ext cx="12709620" cy="6496487"/>
+          </a:xfrm>
+          <a:prstGeom prst="rect">
+            <a:avLst/>
+          </a:prstGeom>
+          <a:noFill/>
+          <a:ln>
+            <a:noFill/>
+          </a:ln>
+        </p:spPr>
+        <p:style>
+          <a:lnRef idx="0">
+            <a:scrgbClr r="0" g="0" b="0"/>
+          </a:lnRef>
+          <a:fillRef idx="0">
+            <a:scrgbClr r="0" g="0" b="0"/>
+          </a:fillRef>
+          <a:effectRef idx="0">
+            <a:scrgbClr r="0" g="0" b="0"/>
+          </a:effectRef>
+          <a:fontRef idx="minor"/>
+        </p:style>
+        <p:txBody>
+          <a:bodyPr lIns="90000" tIns="45000" rIns="90000" bIns="45000"/>
+          <a:lstStyle/>
+          <a:p>
+            <a:pPr>
+              <a:lnSpc>
+                <a:spcPct val="100000"/>
+              </a:lnSpc>
+            </a:pPr>
+            <a:r>
+              <a:rPr lang="en-US" sz="4100" b="0" strike="noStrike" spc="-1" dirty="0">
+                <a:solidFill>
+                  <a:srgbClr val="000000"/>
+                </a:solidFill>
+                <a:latin typeface="Arial"/>
+                <a:ea typeface="DejaVu Sans"/>
+              </a:rPr>
+              <a:t>Shown above is an example image with each segmentation algorithm considered in this project applied to it. The Sobel filter estimates the derivative at each pixel location in the image, and draws a line at all places where the derivative changes. The Laplacian filter is similar, however it estimates the second derivative at each location. Both the Sobel and Laplacian ar</a:t>
+            </a:r>
+            <a:r>
+              <a:rPr lang="en-US" sz="4100" spc="-1" dirty="0">
+                <a:solidFill>
+                  <a:srgbClr val="000000"/>
+                </a:solidFill>
+                <a:latin typeface="Arial"/>
+                <a:ea typeface="DejaVu Sans"/>
+              </a:rPr>
+              <a:t>e especially susceptible to image noise. The Canny Edge Detector addresses this by applying a Gaussian Filter to it, then applying a Sobel Filter. </a:t>
+            </a:r>
+            <a:endParaRPr lang="en-US" sz="4100" b="0" strike="noStrike" spc="-1" dirty="0">
+              <a:latin typeface="Arial"/>
+            </a:endParaRPr>
+          </a:p>
+        </p:txBody>
+      </p:sp>
+      <p:sp>
+        <p:nvSpPr>
+          <p:cNvPr id="57" name="CustomShape 11"/>
+          <p:cNvSpPr/>
+          <p:nvPr/>
+        </p:nvSpPr>
+        <p:spPr>
+          <a:xfrm>
+            <a:off x="15615000" y="5580000"/>
+            <a:ext cx="12800520" cy="1218240"/>
+          </a:xfrm>
+          <a:prstGeom prst="rect">
+            <a:avLst/>
+          </a:prstGeom>
+          <a:gradFill rotWithShape="0">
+            <a:gsLst>
+              <a:gs pos="0">
+                <a:srgbClr val="00B0EA"/>
+              </a:gs>
+              <a:gs pos="100000">
+                <a:srgbClr val="00B0EA"/>
+              </a:gs>
+            </a:gsLst>
+            <a:lin ang="5400000"/>
+          </a:gradFill>
+          <a:ln>
+            <a:noFill/>
+          </a:ln>
+        </p:spPr>
+        <p:style>
+          <a:lnRef idx="0">
+            <a:scrgbClr r="0" g="0" b="0"/>
+          </a:lnRef>
+          <a:fillRef idx="0">
+            <a:scrgbClr r="0" g="0" b="0"/>
+          </a:fillRef>
+          <a:effectRef idx="0">
+            <a:scrgbClr r="0" g="0" b="0"/>
+          </a:effectRef>
+          <a:fontRef idx="minor"/>
+        </p:style>
+        <p:txBody>
+          <a:bodyPr lIns="365760" tIns="45000" rIns="90000" bIns="45000" anchor="ctr"/>
+          <a:lstStyle/>
+          <a:p>
+            <a:pPr algn="ctr">
+              <a:lnSpc>
+                <a:spcPct val="100000"/>
+              </a:lnSpc>
+            </a:pPr>
+            <a:r>
+              <a:rPr lang="en-US" sz="5400" b="0" strike="noStrike" spc="-1">
+                <a:solidFill>
+                  <a:srgbClr val="FFFFFF"/>
+                </a:solidFill>
+                <a:latin typeface="Arial"/>
+                <a:ea typeface="DejaVu Sans"/>
+              </a:rPr>
+              <a:t>Methods</a:t>
+            </a:r>
+            <a:endParaRPr lang="en-US" sz="5400" b="0" strike="noStrike" spc="-1">
+              <a:latin typeface="Arial"/>
+            </a:endParaRPr>
+          </a:p>
+        </p:txBody>
+      </p:sp>
+      <p:sp>
+        <p:nvSpPr>
+          <p:cNvPr id="58" name="CustomShape 12"/>
+          <p:cNvSpPr/>
+          <p:nvPr/>
+        </p:nvSpPr>
+        <p:spPr>
+          <a:xfrm>
+            <a:off x="15615000" y="7098480"/>
+            <a:ext cx="12800520" cy="10450440"/>
+          </a:xfrm>
+          <a:prstGeom prst="rect">
+            <a:avLst/>
+          </a:prstGeom>
+          <a:noFill/>
+          <a:ln>
+            <a:noFill/>
+          </a:ln>
+        </p:spPr>
+        <p:style>
+          <a:lnRef idx="0">
+            <a:scrgbClr r="0" g="0" b="0"/>
+          </a:lnRef>
+          <a:fillRef idx="0">
+            <a:scrgbClr r="0" g="0" b="0"/>
+          </a:fillRef>
+          <a:effectRef idx="0">
+            <a:scrgbClr r="0" g="0" b="0"/>
+          </a:effectRef>
+          <a:fontRef idx="minor"/>
+        </p:style>
+        <p:txBody>
+          <a:bodyPr lIns="90000" tIns="45000" rIns="90000" bIns="45000"/>
+          <a:lstStyle/>
           <a:p>
             <a:pPr>
               <a:lnSpc>
@@ -2636,278 +3476,17 @@
                 <a:spcPts val="1199"/>
               </a:spcBef>
             </a:pPr>
-            <a:endParaRPr b="0" lang="en-US" sz="3200" spc="-1" strike="noStrike">
-              <a:latin typeface="Arial"/>
-            </a:endParaRPr>
-          </a:p>
-        </p:txBody>
-      </p:sp>
-      <p:pic>
-        <p:nvPicPr>
-          <p:cNvPr id="53" name="Picture 4" descr=""/>
-          <p:cNvPicPr/>
-          <p:nvPr/>
-        </p:nvPicPr>
-        <p:blipFill>
-          <a:blip r:embed="rId1"/>
-          <a:stretch/>
-        </p:blipFill>
-        <p:spPr>
-          <a:xfrm>
-            <a:off x="661680" y="74880"/>
-            <a:ext cx="4518720" cy="3427560"/>
-          </a:xfrm>
-          <a:prstGeom prst="rect">
-            <a:avLst/>
-          </a:prstGeom>
-          <a:ln>
-            <a:noFill/>
-          </a:ln>
-        </p:spPr>
-      </p:pic>
-      <p:sp>
-        <p:nvSpPr>
-          <p:cNvPr id="54" name="CustomShape 8"/>
-          <p:cNvSpPr/>
-          <p:nvPr/>
-        </p:nvSpPr>
-        <p:spPr>
-          <a:xfrm>
-            <a:off x="972720" y="25894440"/>
-            <a:ext cx="12800520" cy="1218240"/>
-          </a:xfrm>
-          <a:prstGeom prst="rect">
-            <a:avLst/>
-          </a:prstGeom>
-          <a:gradFill rotWithShape="0">
-            <a:gsLst>
-              <a:gs pos="0">
-                <a:srgbClr val="00b0ea"/>
-              </a:gs>
-              <a:gs pos="100000">
-                <a:srgbClr val="00b0ea"/>
-              </a:gs>
-            </a:gsLst>
-            <a:lin ang="5400000"/>
-          </a:gradFill>
-          <a:ln>
-            <a:noFill/>
-          </a:ln>
-        </p:spPr>
-        <p:style>
-          <a:lnRef idx="0"/>
-          <a:fillRef idx="0"/>
-          <a:effectRef idx="0"/>
-          <a:fontRef idx="minor"/>
-        </p:style>
-        <p:txBody>
-          <a:bodyPr lIns="365760" rIns="90000" tIns="45000" bIns="45000" anchor="ctr"/>
-          <a:p>
-            <a:pPr algn="ctr">
-              <a:lnSpc>
-                <a:spcPct val="100000"/>
-              </a:lnSpc>
-            </a:pPr>
-            <a:r>
-              <a:rPr b="0" lang="en-US" sz="5400" spc="-1" strike="noStrike">
-                <a:solidFill>
-                  <a:srgbClr val="ffffff"/>
-                </a:solidFill>
-                <a:latin typeface="Arial"/>
-                <a:ea typeface="DejaVu Sans"/>
-              </a:rPr>
-              <a:t>Objectives</a:t>
-            </a:r>
-            <a:endParaRPr b="0" lang="en-US" sz="5400" spc="-1" strike="noStrike">
-              <a:latin typeface="Arial"/>
-            </a:endParaRPr>
-          </a:p>
-        </p:txBody>
-      </p:sp>
-      <p:sp>
-        <p:nvSpPr>
-          <p:cNvPr id="55" name="CustomShape 9"/>
-          <p:cNvSpPr/>
-          <p:nvPr/>
-        </p:nvSpPr>
-        <p:spPr>
-          <a:xfrm>
-            <a:off x="0" y="32197320"/>
-            <a:ext cx="38610360" cy="638280"/>
-          </a:xfrm>
-          <a:prstGeom prst="rect">
-            <a:avLst/>
-          </a:prstGeom>
-          <a:noFill/>
-          <a:ln>
-            <a:noFill/>
-          </a:ln>
-        </p:spPr>
-        <p:style>
-          <a:lnRef idx="0"/>
-          <a:fillRef idx="0"/>
-          <a:effectRef idx="0"/>
-          <a:fontRef idx="minor"/>
-        </p:style>
-        <p:txBody>
-          <a:bodyPr lIns="90000" rIns="90000" tIns="45000" bIns="45000"/>
-          <a:p>
-            <a:pPr>
-              <a:lnSpc>
-                <a:spcPct val="100000"/>
-              </a:lnSpc>
-            </a:pPr>
-            <a:r>
-              <a:rPr b="0" i="1" lang="en-US" sz="3600" spc="-1" strike="noStrike">
-                <a:solidFill>
-                  <a:srgbClr val="000000"/>
-                </a:solidFill>
-                <a:latin typeface="Times New Roman"/>
-                <a:ea typeface="DejaVu Sans"/>
-              </a:rPr>
-              <a:t>This material is based upon work supported by the National Aeronautics and Space Administration under Grant No.NNX15AK02H issued through NASA Education.</a:t>
-            </a:r>
-            <a:endParaRPr b="0" lang="en-US" sz="3600" spc="-1" strike="noStrike">
-              <a:latin typeface="Arial"/>
-            </a:endParaRPr>
-          </a:p>
-        </p:txBody>
-      </p:sp>
-      <p:sp>
-        <p:nvSpPr>
-          <p:cNvPr id="56" name="CustomShape 10"/>
-          <p:cNvSpPr/>
-          <p:nvPr/>
-        </p:nvSpPr>
-        <p:spPr>
-          <a:xfrm>
-            <a:off x="30264480" y="14474160"/>
-            <a:ext cx="12800520" cy="1963440"/>
-          </a:xfrm>
-          <a:prstGeom prst="rect">
-            <a:avLst/>
-          </a:prstGeom>
-          <a:noFill/>
-          <a:ln>
-            <a:noFill/>
-          </a:ln>
-        </p:spPr>
-        <p:style>
-          <a:lnRef idx="0"/>
-          <a:fillRef idx="0"/>
-          <a:effectRef idx="0"/>
-          <a:fontRef idx="minor"/>
-        </p:style>
-        <p:txBody>
-          <a:bodyPr lIns="90000" rIns="90000" tIns="45000" bIns="45000"/>
-          <a:p>
-            <a:pPr>
-              <a:lnSpc>
-                <a:spcPct val="100000"/>
-              </a:lnSpc>
-            </a:pPr>
-            <a:r>
-              <a:rPr b="0" lang="en-US" sz="4100" spc="-1" strike="noStrike">
+            <a:r>
+              <a:rPr lang="en-US" sz="4000" b="0" strike="noStrike" spc="-1" dirty="0">
                 <a:solidFill>
                   <a:srgbClr val="000000"/>
                 </a:solidFill>
                 <a:latin typeface="Arial"/>
                 <a:ea typeface="DejaVu Sans"/>
               </a:rPr>
-              <a:t>Caption. </a:t>
-            </a:r>
-            <a:endParaRPr b="0" lang="en-US" sz="4100" spc="-1" strike="noStrike">
-              <a:latin typeface="Arial"/>
-            </a:endParaRPr>
-          </a:p>
-        </p:txBody>
-      </p:sp>
-      <p:sp>
-        <p:nvSpPr>
-          <p:cNvPr id="57" name="CustomShape 11"/>
-          <p:cNvSpPr/>
-          <p:nvPr/>
-        </p:nvSpPr>
-        <p:spPr>
-          <a:xfrm>
-            <a:off x="15615000" y="5580000"/>
-            <a:ext cx="12800520" cy="1218240"/>
-          </a:xfrm>
-          <a:prstGeom prst="rect">
-            <a:avLst/>
-          </a:prstGeom>
-          <a:gradFill rotWithShape="0">
-            <a:gsLst>
-              <a:gs pos="0">
-                <a:srgbClr val="00b0ea"/>
-              </a:gs>
-              <a:gs pos="100000">
-                <a:srgbClr val="00b0ea"/>
-              </a:gs>
-            </a:gsLst>
-            <a:lin ang="5400000"/>
-          </a:gradFill>
-          <a:ln>
-            <a:noFill/>
-          </a:ln>
-        </p:spPr>
-        <p:style>
-          <a:lnRef idx="0"/>
-          <a:fillRef idx="0"/>
-          <a:effectRef idx="0"/>
-          <a:fontRef idx="minor"/>
-        </p:style>
-        <p:txBody>
-          <a:bodyPr lIns="365760" rIns="90000" tIns="45000" bIns="45000" anchor="ctr"/>
-          <a:p>
-            <a:pPr algn="ctr">
-              <a:lnSpc>
-                <a:spcPct val="100000"/>
-              </a:lnSpc>
-            </a:pPr>
-            <a:r>
-              <a:rPr b="0" lang="en-US" sz="5400" spc="-1" strike="noStrike">
-                <a:solidFill>
-                  <a:srgbClr val="ffffff"/>
-                </a:solidFill>
-                <a:latin typeface="Arial"/>
-                <a:ea typeface="DejaVu Sans"/>
-              </a:rPr>
-              <a:t>Methods</a:t>
-            </a:r>
-            <a:endParaRPr b="0" lang="en-US" sz="5400" spc="-1" strike="noStrike">
-              <a:latin typeface="Arial"/>
-            </a:endParaRPr>
-          </a:p>
-        </p:txBody>
-      </p:sp>
-      <p:sp>
-        <p:nvSpPr>
-          <p:cNvPr id="58" name="CustomShape 12"/>
-          <p:cNvSpPr/>
-          <p:nvPr/>
-        </p:nvSpPr>
-        <p:spPr>
-          <a:xfrm>
-            <a:off x="15615000" y="7098480"/>
-            <a:ext cx="12800520" cy="10450440"/>
-          </a:xfrm>
-          <a:prstGeom prst="rect">
-            <a:avLst/>
-          </a:prstGeom>
-          <a:noFill/>
-          <a:ln>
-            <a:noFill/>
-          </a:ln>
-        </p:spPr>
-        <p:style>
-          <a:lnRef idx="0"/>
-          <a:fillRef idx="0"/>
-          <a:effectRef idx="0"/>
-          <a:fontRef idx="minor"/>
-        </p:style>
-        <p:txBody>
-          <a:bodyPr lIns="90000" rIns="90000" tIns="45000" bIns="45000"/>
+              <a:t>To begin, articles were selected that offered an approachable segmentation algorithm. </a:t>
+            </a:r>
+          </a:p>
           <a:p>
             <a:pPr>
               <a:lnSpc>
@@ -2918,16 +3497,16 @@
               </a:spcBef>
             </a:pPr>
             <a:r>
-              <a:rPr b="0" lang="en-US" sz="4000" spc="-1" strike="noStrike">
+              <a:rPr lang="en-US" sz="4000" spc="-1" dirty="0">
                 <a:solidFill>
                   <a:srgbClr val="000000"/>
                 </a:solidFill>
                 <a:latin typeface="Arial"/>
                 <a:ea typeface="DejaVu Sans"/>
               </a:rPr>
-              <a:t>This project will make use of open source software and segmentation algorithms from several journal articles to verify the results. </a:t>
-            </a:r>
-            <a:endParaRPr b="0" lang="en-US" sz="4000" spc="-1" strike="noStrike">
+              <a:t>The research team set aside time to research and understand three algorithms. These three are a Sobel filter, a Laplacian filter, and a Canny Edge Detector. </a:t>
+            </a:r>
+            <a:endParaRPr lang="en-US" sz="4000" b="0" strike="noStrike" spc="-1" dirty="0">
               <a:latin typeface="Arial"/>
             </a:endParaRPr>
           </a:p>
@@ -2941,16 +3520,46 @@
               </a:spcBef>
             </a:pPr>
             <a:r>
-              <a:rPr b="0" lang="en-US" sz="4000" spc="-1" strike="noStrike">
+              <a:rPr lang="en-US" sz="4000" b="0" strike="noStrike" spc="-1" dirty="0">
                 <a:solidFill>
                   <a:srgbClr val="000000"/>
                 </a:solidFill>
                 <a:latin typeface="Arial"/>
                 <a:ea typeface="DejaVu Sans"/>
               </a:rPr>
-              <a:t>To begin, articles were selected that offered a segmentation algorithm.</a:t>
-            </a:r>
-            <a:endParaRPr b="0" lang="en-US" sz="4000" spc="-1" strike="noStrike">
+              <a:t>Then, these algorithms were implemented in Python, using a </a:t>
+            </a:r>
+            <a:r>
+              <a:rPr lang="en-US" sz="4000" b="0" strike="noStrike" spc="-1" dirty="0" err="1">
+                <a:solidFill>
+                  <a:srgbClr val="000000"/>
+                </a:solidFill>
+                <a:latin typeface="Arial"/>
+                <a:ea typeface="DejaVu Sans"/>
+              </a:rPr>
+              <a:t>Jupyter</a:t>
+            </a:r>
+            <a:r>
+              <a:rPr lang="en-US" sz="4000" b="0" strike="noStrike" spc="-1" dirty="0">
+                <a:solidFill>
+                  <a:srgbClr val="000000"/>
+                </a:solidFill>
+                <a:latin typeface="Arial"/>
+                <a:ea typeface="DejaVu Sans"/>
+              </a:rPr>
+              <a:t> Notebook. </a:t>
+            </a:r>
+            <a:r>
+              <a:rPr lang="en-US" sz="4000" spc="-1" dirty="0">
+                <a:solidFill>
+                  <a:srgbClr val="000000"/>
+                </a:solidFill>
+                <a:latin typeface="Arial"/>
+                <a:ea typeface="DejaVu Sans"/>
+              </a:rPr>
+              <a:t>Each algorithm will include a implementation by the researcher and with an open source library known as OpenCV. </a:t>
+            </a:r>
+            <a:endParaRPr lang="en-US" sz="4000" b="0" strike="noStrike" spc="-1" dirty="0">
               <a:latin typeface="Arial"/>
             </a:endParaRPr>
           </a:p>
@@ -2964,62 +3573,16 @@
               </a:spcBef>
             </a:pPr>
             <a:r>
-              <a:rPr b="0" lang="en-US" sz="4000" spc="-1" strike="noStrike">
+              <a:rPr lang="en-US" sz="4000" b="0" strike="noStrike" spc="-1" dirty="0">
                 <a:solidFill>
                   <a:srgbClr val="000000"/>
                 </a:solidFill>
                 <a:latin typeface="Arial"/>
                 <a:ea typeface="DejaVu Sans"/>
               </a:rPr>
-              <a:t>Then, these algorithms will be implemented into independent builds of the same software, and be instructed to analyze the same set of images. The Corel database is widely used in Computer Vision and has more than 40,000 images to choose a large sample from. Currently, that is where the images are planned to come from.</a:t>
-            </a:r>
-            <a:endParaRPr b="0" lang="en-US" sz="4000" spc="-1" strike="noStrike">
-              <a:latin typeface="Arial"/>
-            </a:endParaRPr>
-          </a:p>
-          <a:p>
-            <a:pPr>
-              <a:lnSpc>
-                <a:spcPct val="100000"/>
-              </a:lnSpc>
-              <a:spcBef>
-                <a:spcPts val="1199"/>
-              </a:spcBef>
-            </a:pPr>
-            <a:r>
-              <a:rPr b="0" lang="en-US" sz="4000" spc="-1" strike="noStrike">
-                <a:solidFill>
-                  <a:srgbClr val="000000"/>
-                </a:solidFill>
-                <a:latin typeface="Arial"/>
-                <a:ea typeface="DejaVu Sans"/>
-              </a:rPr>
-              <a:t>This process will be done three times: once on a laptop, a desktop, and then a server. </a:t>
-            </a:r>
-            <a:endParaRPr b="0" lang="en-US" sz="4000" spc="-1" strike="noStrike">
-              <a:latin typeface="Arial"/>
-            </a:endParaRPr>
-          </a:p>
-          <a:p>
-            <a:pPr>
-              <a:lnSpc>
-                <a:spcPct val="100000"/>
-              </a:lnSpc>
-              <a:spcBef>
-                <a:spcPts val="1199"/>
-              </a:spcBef>
-            </a:pPr>
-            <a:r>
-              <a:rPr b="0" lang="en-US" sz="4000" spc="-1" strike="noStrike">
-                <a:solidFill>
-                  <a:srgbClr val="000000"/>
-                </a:solidFill>
-                <a:latin typeface="Arial"/>
-                <a:ea typeface="DejaVu Sans"/>
-              </a:rPr>
-              <a:t>Algorithms will be ranked against each other based on Accuracy, Efficiency, and Scalability. </a:t>
-            </a:r>
-            <a:endParaRPr b="0" lang="en-US" sz="4000" spc="-1" strike="noStrike">
+              <a:t>Each algorithm will be measured against one another using a measure of accuracy and efficiency. Accuracy will be tested through an open source resource detailed in Arbelaez's paper. Efficiency will be verified on a machine with a better CPU and again on a machine with a better GPU.</a:t>
+            </a:r>
+            <a:endParaRPr lang="en-US" sz="4000" b="0" strike="noStrike" spc="-1" dirty="0">
               <a:latin typeface="Arial"/>
             </a:endParaRPr>
           </a:p>
@@ -3027,12 +3590,12 @@
       </p:sp>
       <p:pic>
         <p:nvPicPr>
-          <p:cNvPr id="59" name="Picture 9" descr=""/>
+          <p:cNvPr id="59" name="Picture 9"/>
           <p:cNvPicPr/>
           <p:nvPr/>
         </p:nvPicPr>
         <p:blipFill>
-          <a:blip r:embed="rId2"/>
+          <a:blip r:embed="rId4"/>
           <a:stretch/>
         </p:blipFill>
         <p:spPr>
@@ -3057,7 +3620,7 @@
         <p:spPr>
           <a:xfrm>
             <a:off x="15615000" y="17939880"/>
-            <a:ext cx="12979080" cy="1218240"/>
+            <a:ext cx="12800520" cy="1218240"/>
           </a:xfrm>
           <a:prstGeom prst="rect">
             <a:avLst/>
@@ -3090,13 +3653,20 @@
           </a:ln>
         </p:spPr>
         <p:style>
-          <a:lnRef idx="0"/>
-          <a:fillRef idx="0"/>
-          <a:effectRef idx="0"/>
+          <a:lnRef idx="0">
+            <a:scrgbClr r="0" g="0" b="0"/>
+          </a:lnRef>
+          <a:fillRef idx="0">
+            <a:scrgbClr r="0" g="0" b="0"/>
+          </a:fillRef>
+          <a:effectRef idx="0">
+            <a:scrgbClr r="0" g="0" b="0"/>
+          </a:effectRef>
           <a:fontRef idx="minor"/>
         </p:style>
         <p:txBody>
-          <a:bodyPr lIns="365760" rIns="90000" tIns="45000" bIns="45000" anchor="ctr"/>
+          <a:bodyPr lIns="365760" tIns="45000" rIns="90000" bIns="45000" anchor="ctr"/>
+          <a:lstStyle/>
           <a:p>
             <a:pPr algn="ctr">
               <a:lnSpc>
@@ -3104,16 +3674,16 @@
               </a:lnSpc>
             </a:pPr>
             <a:r>
-              <a:rPr b="0" lang="en-US" sz="5400" spc="-1" strike="noStrike">
+              <a:rPr lang="en-US" sz="5400" b="0" strike="noStrike" spc="-1">
                 <a:solidFill>
-                  <a:srgbClr val="ffffff"/>
+                  <a:srgbClr val="FFFFFF"/>
                 </a:solidFill>
                 <a:latin typeface="Arial"/>
                 <a:ea typeface="DejaVu Sans"/>
               </a:rPr>
               <a:t>Project Effects</a:t>
             </a:r>
-            <a:endParaRPr b="0" lang="en-US" sz="5400" spc="-1" strike="noStrike">
+            <a:endParaRPr lang="en-US" sz="5400" b="0" strike="noStrike" spc="-1">
               <a:latin typeface="Arial"/>
             </a:endParaRPr>
           </a:p>
@@ -3161,13 +3731,20 @@
           </a:ln>
         </p:spPr>
         <p:style>
-          <a:lnRef idx="0"/>
-          <a:fillRef idx="0"/>
-          <a:effectRef idx="0"/>
+          <a:lnRef idx="0">
+            <a:scrgbClr r="0" g="0" b="0"/>
+          </a:lnRef>
+          <a:fillRef idx="0">
+            <a:scrgbClr r="0" g="0" b="0"/>
+          </a:fillRef>
+          <a:effectRef idx="0">
+            <a:scrgbClr r="0" g="0" b="0"/>
+          </a:effectRef>
           <a:fontRef idx="minor"/>
         </p:style>
         <p:txBody>
-          <a:bodyPr lIns="365760" rIns="90000" tIns="45000" bIns="45000" anchor="ctr"/>
+          <a:bodyPr lIns="365760" tIns="45000" rIns="90000" bIns="45000" anchor="ctr"/>
+          <a:lstStyle/>
           <a:p>
             <a:pPr algn="ctr">
               <a:lnSpc>
@@ -3175,16 +3752,16 @@
               </a:lnSpc>
             </a:pPr>
             <a:r>
-              <a:rPr b="0" lang="en-US" sz="5400" spc="-1" strike="noStrike">
+              <a:rPr lang="en-US" sz="5400" b="0" strike="noStrike" spc="-1" dirty="0">
                 <a:solidFill>
-                  <a:srgbClr val="ffffff"/>
+                  <a:srgbClr val="FFFFFF"/>
                 </a:solidFill>
                 <a:latin typeface="Arial"/>
                 <a:ea typeface="DejaVu Sans"/>
               </a:rPr>
-              <a:t>Other Considerations</a:t>
-            </a:r>
-            <a:endParaRPr b="0" lang="en-US" sz="5400" spc="-1" strike="noStrike">
+              <a:t>Gaussian Filter</a:t>
+            </a:r>
+            <a:endParaRPr lang="en-US" sz="5400" b="0" strike="noStrike" spc="-1" dirty="0">
               <a:latin typeface="Arial"/>
             </a:endParaRPr>
           </a:p>
@@ -3210,13 +3787,20 @@
           </a:ln>
         </p:spPr>
         <p:style>
-          <a:lnRef idx="0"/>
-          <a:fillRef idx="0"/>
-          <a:effectRef idx="0"/>
+          <a:lnRef idx="0">
+            <a:scrgbClr r="0" g="0" b="0"/>
+          </a:lnRef>
+          <a:fillRef idx="0">
+            <a:scrgbClr r="0" g="0" b="0"/>
+          </a:fillRef>
+          <a:effectRef idx="0">
+            <a:scrgbClr r="0" g="0" b="0"/>
+          </a:effectRef>
           <a:fontRef idx="minor"/>
         </p:style>
         <p:txBody>
-          <a:bodyPr lIns="90000" rIns="90000" tIns="45000" bIns="45000"/>
+          <a:bodyPr lIns="90000" tIns="45000" rIns="90000" bIns="45000"/>
+          <a:lstStyle/>
           <a:p>
             <a:pPr>
               <a:lnSpc>
@@ -3227,16 +3811,36 @@
               </a:spcBef>
             </a:pPr>
             <a:r>
-              <a:rPr b="0" lang="en-US" sz="4000" spc="-1" strike="noStrike">
+              <a:rPr lang="en-US" sz="4000" b="0" strike="noStrike" spc="-1" dirty="0">
                 <a:solidFill>
                   <a:srgbClr val="000000"/>
                 </a:solidFill>
                 <a:latin typeface="Arial"/>
                 <a:ea typeface="DejaVu Sans"/>
               </a:rPr>
-              <a:t>One of the goals of this project is for the team to familiarize themselves with machine learning concepts and tools. This benefit is two-fold, in that it prepares the researcher to continue to research more specific and advanced topics as well as allows new students interested in the topic a resource they would have easy access to. </a:t>
-            </a:r>
-            <a:endParaRPr b="0" lang="en-US" sz="4000" spc="-1" strike="noStrike">
+              <a:t>One of the goals of this project is for the team to familiarize themselves with machine learning concepts and tools. This benefit </a:t>
+            </a:r>
+            <a:r>
+              <a:rPr lang="en-US" sz="4000" b="0" strike="noStrike" spc="-1">
+                <a:solidFill>
+                  <a:srgbClr val="000000"/>
+                </a:solidFill>
+                <a:latin typeface="Arial"/>
+                <a:ea typeface="DejaVu Sans"/>
+              </a:rPr>
+              <a:t>is two-fold, </a:t>
+            </a:r>
+            <a:r>
+              <a:rPr lang="en-US" sz="4000" b="0" strike="noStrike" spc="-1" dirty="0">
+                <a:solidFill>
+                  <a:srgbClr val="000000"/>
+                </a:solidFill>
+                <a:latin typeface="Arial"/>
+                <a:ea typeface="DejaVu Sans"/>
+              </a:rPr>
+              <a:t>in that it prepares the researcher to continue to research more specific and advanced topics as well as allows new students interested in the topic a resource they would have easy access to. </a:t>
+            </a:r>
+            <a:endParaRPr lang="en-US" sz="4000" b="0" strike="noStrike" spc="-1" dirty="0">
               <a:latin typeface="Arial"/>
             </a:endParaRPr>
           </a:p>
@@ -3249,7 +3853,7 @@
                 <a:spcPts val="1199"/>
               </a:spcBef>
             </a:pPr>
-            <a:endParaRPr b="0" lang="en-US" sz="4000" spc="-1" strike="noStrike">
+            <a:endParaRPr lang="en-US" sz="4000" b="0" strike="noStrike" spc="-1" dirty="0">
               <a:latin typeface="Arial"/>
             </a:endParaRPr>
           </a:p>
@@ -3275,13 +3879,20 @@
           </a:ln>
         </p:spPr>
         <p:style>
-          <a:lnRef idx="0"/>
-          <a:fillRef idx="0"/>
-          <a:effectRef idx="0"/>
+          <a:lnRef idx="0">
+            <a:scrgbClr r="0" g="0" b="0"/>
+          </a:lnRef>
+          <a:fillRef idx="0">
+            <a:scrgbClr r="0" g="0" b="0"/>
+          </a:fillRef>
+          <a:effectRef idx="0">
+            <a:scrgbClr r="0" g="0" b="0"/>
+          </a:effectRef>
           <a:fontRef idx="minor"/>
         </p:style>
         <p:txBody>
-          <a:bodyPr lIns="90000" rIns="90000" tIns="45000" bIns="45000"/>
+          <a:bodyPr lIns="90000" tIns="45000" rIns="90000" bIns="45000"/>
+          <a:lstStyle/>
           <a:p>
             <a:pPr>
               <a:lnSpc>
@@ -3291,40 +3902,7 @@
                 <a:spcPts val="1199"/>
               </a:spcBef>
             </a:pPr>
-            <a:r>
-              <a:rPr b="0" lang="en-US" sz="4000" spc="-1" strike="noStrike">
-                <a:solidFill>
-                  <a:srgbClr val="000000"/>
-                </a:solidFill>
-                <a:latin typeface="Arial"/>
-                <a:ea typeface="DejaVu Sans"/>
-              </a:rPr>
-              <a:t>This project’s primary goal was not to discover the best algorithm, or to develop a more accurate or efficient one. That could certainly be approached with the results of this study, however. </a:t>
-            </a:r>
-            <a:endParaRPr b="0" lang="en-US" sz="4000" spc="-1" strike="noStrike">
-              <a:latin typeface="Arial"/>
-            </a:endParaRPr>
-          </a:p>
-          <a:p>
-            <a:pPr>
-              <a:lnSpc>
-                <a:spcPct val="100000"/>
-              </a:lnSpc>
-              <a:spcBef>
-                <a:spcPts val="1199"/>
-              </a:spcBef>
-            </a:pPr>
-            <a:r>
-              <a:rPr b="0" lang="en-US" sz="4000" spc="-1" strike="noStrike">
-                <a:solidFill>
-                  <a:srgbClr val="000000"/>
-                </a:solidFill>
-                <a:latin typeface="Arial"/>
-                <a:ea typeface="DejaVu Sans"/>
-              </a:rPr>
-              <a:t>It is certainly possible that these algorithms have strengths and weaknesses outside the scope of this study. It was only checked that the they were accurate. </a:t>
-            </a:r>
-            <a:endParaRPr b="0" lang="en-US" sz="4000" spc="-1" strike="noStrike">
+            <a:endParaRPr lang="en-US" sz="4000" b="0" strike="noStrike" spc="-1" dirty="0">
               <a:latin typeface="Arial"/>
             </a:endParaRPr>
           </a:p>
@@ -3338,7 +3916,7 @@
         </p:nvSpPr>
         <p:spPr>
           <a:xfrm>
-            <a:off x="30449520" y="23317200"/>
+            <a:off x="30208860" y="23973280"/>
             <a:ext cx="12800520" cy="1218240"/>
           </a:xfrm>
           <a:prstGeom prst="rect">
@@ -3347,10 +3925,10 @@
           <a:gradFill rotWithShape="0">
             <a:gsLst>
               <a:gs pos="0">
-                <a:srgbClr val="00b0ea"/>
+                <a:srgbClr val="00B0EA"/>
               </a:gs>
               <a:gs pos="100000">
-                <a:srgbClr val="00b0ea"/>
+                <a:srgbClr val="00B0EA"/>
               </a:gs>
             </a:gsLst>
             <a:lin ang="5400000"/>
@@ -3360,13 +3938,20 @@
           </a:ln>
         </p:spPr>
         <p:style>
-          <a:lnRef idx="0"/>
-          <a:fillRef idx="0"/>
-          <a:effectRef idx="0"/>
+          <a:lnRef idx="0">
+            <a:scrgbClr r="0" g="0" b="0"/>
+          </a:lnRef>
+          <a:fillRef idx="0">
+            <a:scrgbClr r="0" g="0" b="0"/>
+          </a:fillRef>
+          <a:effectRef idx="0">
+            <a:scrgbClr r="0" g="0" b="0"/>
+          </a:effectRef>
           <a:fontRef idx="minor"/>
         </p:style>
         <p:txBody>
-          <a:bodyPr lIns="365760" rIns="90000" tIns="45000" bIns="45000" anchor="ctr"/>
+          <a:bodyPr lIns="365760" tIns="45000" rIns="90000" bIns="45000" anchor="ctr"/>
+          <a:lstStyle/>
           <a:p>
             <a:pPr algn="ctr">
               <a:lnSpc>
@@ -3374,23 +3959,692 @@
               </a:lnSpc>
             </a:pPr>
             <a:r>
-              <a:rPr b="0" lang="en-US" sz="5400" spc="-1" strike="noStrike">
+              <a:rPr lang="en-US" sz="5400" b="0" strike="noStrike" spc="-1">
                 <a:solidFill>
-                  <a:srgbClr val="ffffff"/>
+                  <a:srgbClr val="FFFFFF"/>
                 </a:solidFill>
                 <a:latin typeface="Arial"/>
                 <a:ea typeface="DejaVu Sans"/>
               </a:rPr>
               <a:t>References</a:t>
             </a:r>
-            <a:endParaRPr b="0" lang="en-US" sz="5400" spc="-1" strike="noStrike">
-              <a:latin typeface="Arial"/>
+            <a:endParaRPr lang="en-US" sz="5400" b="0" strike="noStrike" spc="-1">
+              <a:latin typeface="Arial"/>
+            </a:endParaRPr>
+          </a:p>
+        </p:txBody>
+      </p:sp>
+      <p:pic>
+        <p:nvPicPr>
+          <p:cNvPr id="3" name="Picture 2" descr="A brown bear walking around in the ocean&#10;&#10;Description generated with very high confidence">
+            <a:extLst>
+              <a:ext uri="{FF2B5EF4-FFF2-40B4-BE49-F238E27FC236}">
+                <a16:creationId xmlns:a16="http://schemas.microsoft.com/office/drawing/2014/main" id="{716B2FDC-A2D8-4AF1-A82A-6AD3C89024A0}"/>
+              </a:ext>
+            </a:extLst>
+          </p:cNvPr>
+          <p:cNvPicPr>
+            <a:picLocks noChangeAspect="1"/>
+          </p:cNvPicPr>
+          <p:nvPr/>
+        </p:nvPicPr>
+        <p:blipFill>
+          <a:blip r:embed="rId5">
+            <a:extLst>
+              <a:ext uri="{28A0092B-C50C-407E-A947-70E740481C1C}">
+                <a14:useLocalDpi xmlns:a14="http://schemas.microsoft.com/office/drawing/2010/main" val="0"/>
+              </a:ext>
+            </a:extLst>
+          </a:blip>
+          <a:stretch>
+            <a:fillRect/>
+          </a:stretch>
+        </p:blipFill>
+        <p:spPr>
+          <a:xfrm>
+            <a:off x="30117960" y="7060713"/>
+            <a:ext cx="6309360" cy="4210613"/>
+          </a:xfrm>
+          <a:prstGeom prst="rect">
+            <a:avLst/>
+          </a:prstGeom>
+        </p:spPr>
+      </p:pic>
+      <p:pic>
+        <p:nvPicPr>
+          <p:cNvPr id="5" name="Picture 4" descr="A black and white photo of a field&#10;&#10;Description generated with high confidence">
+            <a:extLst>
+              <a:ext uri="{FF2B5EF4-FFF2-40B4-BE49-F238E27FC236}">
+                <a16:creationId xmlns:a16="http://schemas.microsoft.com/office/drawing/2014/main" id="{BCF837E8-6DF0-401D-B691-6E72754979E6}"/>
+              </a:ext>
+            </a:extLst>
+          </p:cNvPr>
+          <p:cNvPicPr>
+            <a:picLocks noChangeAspect="1"/>
+          </p:cNvPicPr>
+          <p:nvPr/>
+        </p:nvPicPr>
+        <p:blipFill>
+          <a:blip r:embed="rId6">
+            <a:extLst>
+              <a:ext uri="{28A0092B-C50C-407E-A947-70E740481C1C}">
+                <a14:useLocalDpi xmlns:a14="http://schemas.microsoft.com/office/drawing/2010/main" val="0"/>
+              </a:ext>
+            </a:extLst>
+          </a:blip>
+          <a:stretch>
+            <a:fillRect/>
+          </a:stretch>
+        </p:blipFill>
+        <p:spPr>
+          <a:xfrm>
+            <a:off x="36609120" y="7060713"/>
+            <a:ext cx="6309360" cy="4210612"/>
+          </a:xfrm>
+          <a:prstGeom prst="rect">
+            <a:avLst/>
+          </a:prstGeom>
+        </p:spPr>
+      </p:pic>
+      <p:pic>
+        <p:nvPicPr>
+          <p:cNvPr id="7" name="Picture 6" descr="A picture containing building, outdoor&#10;&#10;Description generated with very high confidence">
+            <a:extLst>
+              <a:ext uri="{FF2B5EF4-FFF2-40B4-BE49-F238E27FC236}">
+                <a16:creationId xmlns:a16="http://schemas.microsoft.com/office/drawing/2014/main" id="{FEC6F722-4E67-4A55-BE08-E89949C8C44F}"/>
+              </a:ext>
+            </a:extLst>
+          </p:cNvPr>
+          <p:cNvPicPr>
+            <a:picLocks noChangeAspect="1"/>
+          </p:cNvPicPr>
+          <p:nvPr/>
+        </p:nvPicPr>
+        <p:blipFill>
+          <a:blip r:embed="rId7">
+            <a:extLst>
+              <a:ext uri="{28A0092B-C50C-407E-A947-70E740481C1C}">
+                <a14:useLocalDpi xmlns:a14="http://schemas.microsoft.com/office/drawing/2010/main" val="0"/>
+              </a:ext>
+            </a:extLst>
+          </a:blip>
+          <a:stretch>
+            <a:fillRect/>
+          </a:stretch>
+        </p:blipFill>
+        <p:spPr>
+          <a:xfrm>
+            <a:off x="30117960" y="11962183"/>
+            <a:ext cx="6309360" cy="4219385"/>
+          </a:xfrm>
+          <a:prstGeom prst="rect">
+            <a:avLst/>
+          </a:prstGeom>
+        </p:spPr>
+      </p:pic>
+      <p:pic>
+        <p:nvPicPr>
+          <p:cNvPr id="9" name="Picture 8" descr="A picture containing water, outdoor&#10;&#10;Description generated with very high confidence">
+            <a:extLst>
+              <a:ext uri="{FF2B5EF4-FFF2-40B4-BE49-F238E27FC236}">
+                <a16:creationId xmlns:a16="http://schemas.microsoft.com/office/drawing/2014/main" id="{0D9CE361-7BE2-4A6A-B316-A9D57BDB5C6B}"/>
+              </a:ext>
+            </a:extLst>
+          </p:cNvPr>
+          <p:cNvPicPr>
+            <a:picLocks noChangeAspect="1"/>
+          </p:cNvPicPr>
+          <p:nvPr/>
+        </p:nvPicPr>
+        <p:blipFill>
+          <a:blip r:embed="rId8">
+            <a:extLst>
+              <a:ext uri="{28A0092B-C50C-407E-A947-70E740481C1C}">
+                <a14:useLocalDpi xmlns:a14="http://schemas.microsoft.com/office/drawing/2010/main" val="0"/>
+              </a:ext>
+            </a:extLst>
+          </a:blip>
+          <a:stretch>
+            <a:fillRect/>
+          </a:stretch>
+        </p:blipFill>
+        <p:spPr>
+          <a:xfrm>
+            <a:off x="36609120" y="11962709"/>
+            <a:ext cx="6309360" cy="4219385"/>
+          </a:xfrm>
+          <a:prstGeom prst="rect">
+            <a:avLst/>
+          </a:prstGeom>
+        </p:spPr>
+      </p:pic>
+      <p:sp>
+        <p:nvSpPr>
+          <p:cNvPr id="29" name="CustomShape 11">
+            <a:extLst>
+              <a:ext uri="{FF2B5EF4-FFF2-40B4-BE49-F238E27FC236}">
+                <a16:creationId xmlns:a16="http://schemas.microsoft.com/office/drawing/2014/main" id="{F6FFDA46-C90E-4361-83FC-57F636BF147D}"/>
+              </a:ext>
+            </a:extLst>
+          </p:cNvPr>
+          <p:cNvSpPr/>
+          <p:nvPr/>
+        </p:nvSpPr>
+        <p:spPr>
+          <a:xfrm>
+            <a:off x="30117960" y="5639173"/>
+            <a:ext cx="12800520" cy="1218240"/>
+          </a:xfrm>
+          <a:prstGeom prst="rect">
+            <a:avLst/>
+          </a:prstGeom>
+          <a:gradFill rotWithShape="0">
+            <a:gsLst>
+              <a:gs pos="0">
+                <a:srgbClr val="00B0EA"/>
+              </a:gs>
+              <a:gs pos="100000">
+                <a:srgbClr val="00B0EA"/>
+              </a:gs>
+            </a:gsLst>
+            <a:lin ang="5400000"/>
+          </a:gradFill>
+          <a:ln>
+            <a:noFill/>
+          </a:ln>
+        </p:spPr>
+        <p:style>
+          <a:lnRef idx="0">
+            <a:scrgbClr r="0" g="0" b="0"/>
+          </a:lnRef>
+          <a:fillRef idx="0">
+            <a:scrgbClr r="0" g="0" b="0"/>
+          </a:fillRef>
+          <a:effectRef idx="0">
+            <a:scrgbClr r="0" g="0" b="0"/>
+          </a:effectRef>
+          <a:fontRef idx="minor"/>
+        </p:style>
+        <p:txBody>
+          <a:bodyPr lIns="365760" tIns="45000" rIns="90000" bIns="45000" anchor="ctr"/>
+          <a:lstStyle/>
+          <a:p>
+            <a:pPr algn="ctr">
+              <a:lnSpc>
+                <a:spcPct val="100000"/>
+              </a:lnSpc>
+            </a:pPr>
+            <a:r>
+              <a:rPr lang="en-US" sz="5400" b="0" strike="noStrike" spc="-1" dirty="0">
+                <a:solidFill>
+                  <a:srgbClr val="FFFFFF"/>
+                </a:solidFill>
+                <a:latin typeface="Arial"/>
+                <a:ea typeface="DejaVu Sans"/>
+              </a:rPr>
+              <a:t>Example Segmentations</a:t>
+            </a:r>
+            <a:endParaRPr lang="en-US" sz="5400" b="0" strike="noStrike" spc="-1" dirty="0">
+              <a:latin typeface="Arial"/>
+            </a:endParaRPr>
+          </a:p>
+        </p:txBody>
+      </p:sp>
+      <p:sp>
+        <p:nvSpPr>
+          <p:cNvPr id="30" name="CustomShape 10">
+            <a:extLst>
+              <a:ext uri="{FF2B5EF4-FFF2-40B4-BE49-F238E27FC236}">
+                <a16:creationId xmlns:a16="http://schemas.microsoft.com/office/drawing/2014/main" id="{8FE31807-F52F-4B62-9F0B-723587D80A5B}"/>
+              </a:ext>
+            </a:extLst>
+          </p:cNvPr>
+          <p:cNvSpPr/>
+          <p:nvPr/>
+        </p:nvSpPr>
+        <p:spPr>
+          <a:xfrm>
+            <a:off x="30117960" y="11271325"/>
+            <a:ext cx="6309360" cy="684048"/>
+          </a:xfrm>
+          <a:prstGeom prst="rect">
+            <a:avLst/>
+          </a:prstGeom>
+          <a:noFill/>
+          <a:ln>
+            <a:noFill/>
+          </a:ln>
+        </p:spPr>
+        <p:style>
+          <a:lnRef idx="0">
+            <a:scrgbClr r="0" g="0" b="0"/>
+          </a:lnRef>
+          <a:fillRef idx="0">
+            <a:scrgbClr r="0" g="0" b="0"/>
+          </a:fillRef>
+          <a:effectRef idx="0">
+            <a:scrgbClr r="0" g="0" b="0"/>
+          </a:effectRef>
+          <a:fontRef idx="minor"/>
+        </p:style>
+        <p:txBody>
+          <a:bodyPr lIns="90000" tIns="45000" rIns="90000" bIns="45000"/>
+          <a:lstStyle/>
+          <a:p>
+            <a:pPr algn="ctr">
+              <a:lnSpc>
+                <a:spcPct val="100000"/>
+              </a:lnSpc>
+            </a:pPr>
+            <a:r>
+              <a:rPr lang="en-US" sz="3200" b="0" i="1" strike="noStrike" spc="-1" dirty="0">
+                <a:solidFill>
+                  <a:srgbClr val="000000"/>
+                </a:solidFill>
+                <a:latin typeface="Arial"/>
+                <a:ea typeface="DejaVu Sans"/>
+              </a:rPr>
+              <a:t>Original Image </a:t>
+            </a:r>
+            <a:endParaRPr lang="en-US" sz="3200" b="0" i="1" strike="noStrike" spc="-1" dirty="0">
+              <a:latin typeface="Arial"/>
+            </a:endParaRPr>
+          </a:p>
+        </p:txBody>
+      </p:sp>
+      <p:sp>
+        <p:nvSpPr>
+          <p:cNvPr id="31" name="CustomShape 10">
+            <a:extLst>
+              <a:ext uri="{FF2B5EF4-FFF2-40B4-BE49-F238E27FC236}">
+                <a16:creationId xmlns:a16="http://schemas.microsoft.com/office/drawing/2014/main" id="{103207A8-8DD7-4E6C-99DE-1763B5D4FA0E}"/>
+              </a:ext>
+            </a:extLst>
+          </p:cNvPr>
+          <p:cNvSpPr/>
+          <p:nvPr/>
+        </p:nvSpPr>
+        <p:spPr>
+          <a:xfrm>
+            <a:off x="36609120" y="11242776"/>
+            <a:ext cx="6309360" cy="684048"/>
+          </a:xfrm>
+          <a:prstGeom prst="rect">
+            <a:avLst/>
+          </a:prstGeom>
+          <a:noFill/>
+          <a:ln>
+            <a:noFill/>
+          </a:ln>
+        </p:spPr>
+        <p:style>
+          <a:lnRef idx="0">
+            <a:scrgbClr r="0" g="0" b="0"/>
+          </a:lnRef>
+          <a:fillRef idx="0">
+            <a:scrgbClr r="0" g="0" b="0"/>
+          </a:fillRef>
+          <a:effectRef idx="0">
+            <a:scrgbClr r="0" g="0" b="0"/>
+          </a:effectRef>
+          <a:fontRef idx="minor"/>
+        </p:style>
+        <p:txBody>
+          <a:bodyPr lIns="90000" tIns="45000" rIns="90000" bIns="45000"/>
+          <a:lstStyle/>
+          <a:p>
+            <a:pPr algn="ctr">
+              <a:lnSpc>
+                <a:spcPct val="100000"/>
+              </a:lnSpc>
+            </a:pPr>
+            <a:r>
+              <a:rPr lang="en-US" sz="3200" i="1" spc="-1" dirty="0">
+                <a:solidFill>
+                  <a:srgbClr val="000000"/>
+                </a:solidFill>
+                <a:latin typeface="Arial"/>
+                <a:ea typeface="DejaVu Sans"/>
+              </a:rPr>
+              <a:t>Sobel Filter</a:t>
+            </a:r>
+            <a:endParaRPr lang="en-US" sz="3200" b="0" i="1" strike="noStrike" spc="-1" dirty="0">
+              <a:latin typeface="Arial"/>
+            </a:endParaRPr>
+          </a:p>
+        </p:txBody>
+      </p:sp>
+      <p:sp>
+        <p:nvSpPr>
+          <p:cNvPr id="32" name="CustomShape 10">
+            <a:extLst>
+              <a:ext uri="{FF2B5EF4-FFF2-40B4-BE49-F238E27FC236}">
+                <a16:creationId xmlns:a16="http://schemas.microsoft.com/office/drawing/2014/main" id="{C7FF79B6-0B19-4954-A4ED-5A4BB6AA8FE6}"/>
+              </a:ext>
+            </a:extLst>
+          </p:cNvPr>
+          <p:cNvSpPr/>
+          <p:nvPr/>
+        </p:nvSpPr>
+        <p:spPr>
+          <a:xfrm>
+            <a:off x="36609120" y="16181984"/>
+            <a:ext cx="6309360" cy="684048"/>
+          </a:xfrm>
+          <a:prstGeom prst="rect">
+            <a:avLst/>
+          </a:prstGeom>
+          <a:noFill/>
+          <a:ln>
+            <a:noFill/>
+          </a:ln>
+        </p:spPr>
+        <p:style>
+          <a:lnRef idx="0">
+            <a:scrgbClr r="0" g="0" b="0"/>
+          </a:lnRef>
+          <a:fillRef idx="0">
+            <a:scrgbClr r="0" g="0" b="0"/>
+          </a:fillRef>
+          <a:effectRef idx="0">
+            <a:scrgbClr r="0" g="0" b="0"/>
+          </a:effectRef>
+          <a:fontRef idx="minor"/>
+        </p:style>
+        <p:txBody>
+          <a:bodyPr lIns="90000" tIns="45000" rIns="90000" bIns="45000"/>
+          <a:lstStyle/>
+          <a:p>
+            <a:pPr algn="ctr">
+              <a:lnSpc>
+                <a:spcPct val="100000"/>
+              </a:lnSpc>
+            </a:pPr>
+            <a:r>
+              <a:rPr lang="en-US" sz="3200" b="0" i="1" strike="noStrike" spc="-1" dirty="0">
+                <a:solidFill>
+                  <a:srgbClr val="000000"/>
+                </a:solidFill>
+                <a:latin typeface="Arial"/>
+                <a:ea typeface="DejaVu Sans"/>
+              </a:rPr>
+              <a:t>Canny Edge Detector</a:t>
+            </a:r>
+            <a:endParaRPr lang="en-US" sz="3200" b="0" i="1" strike="noStrike" spc="-1" dirty="0">
+              <a:latin typeface="Arial"/>
+            </a:endParaRPr>
+          </a:p>
+        </p:txBody>
+      </p:sp>
+      <p:sp>
+        <p:nvSpPr>
+          <p:cNvPr id="33" name="CustomShape 10">
+            <a:extLst>
+              <a:ext uri="{FF2B5EF4-FFF2-40B4-BE49-F238E27FC236}">
+                <a16:creationId xmlns:a16="http://schemas.microsoft.com/office/drawing/2014/main" id="{5ED19ED0-83AA-44FC-BCA4-430194C77BE4}"/>
+              </a:ext>
+            </a:extLst>
+          </p:cNvPr>
+          <p:cNvSpPr/>
+          <p:nvPr/>
+        </p:nvSpPr>
+        <p:spPr>
+          <a:xfrm>
+            <a:off x="30027060" y="16181568"/>
+            <a:ext cx="6309360" cy="684048"/>
+          </a:xfrm>
+          <a:prstGeom prst="rect">
+            <a:avLst/>
+          </a:prstGeom>
+          <a:noFill/>
+          <a:ln>
+            <a:noFill/>
+          </a:ln>
+        </p:spPr>
+        <p:style>
+          <a:lnRef idx="0">
+            <a:scrgbClr r="0" g="0" b="0"/>
+          </a:lnRef>
+          <a:fillRef idx="0">
+            <a:scrgbClr r="0" g="0" b="0"/>
+          </a:fillRef>
+          <a:effectRef idx="0">
+            <a:scrgbClr r="0" g="0" b="0"/>
+          </a:effectRef>
+          <a:fontRef idx="minor"/>
+        </p:style>
+        <p:txBody>
+          <a:bodyPr lIns="90000" tIns="45000" rIns="90000" bIns="45000"/>
+          <a:lstStyle/>
+          <a:p>
+            <a:pPr algn="ctr">
+              <a:lnSpc>
+                <a:spcPct val="100000"/>
+              </a:lnSpc>
+            </a:pPr>
+            <a:r>
+              <a:rPr lang="en-US" sz="3200" b="0" i="1" strike="noStrike" spc="-1" dirty="0">
+                <a:solidFill>
+                  <a:srgbClr val="000000"/>
+                </a:solidFill>
+                <a:latin typeface="Arial"/>
+                <a:ea typeface="DejaVu Sans"/>
+              </a:rPr>
+              <a:t>Laplacian Filter</a:t>
+            </a:r>
+            <a:endParaRPr lang="en-US" sz="3200" b="0" i="1" strike="noStrike" spc="-1" dirty="0">
+              <a:latin typeface="Arial"/>
+            </a:endParaRPr>
+          </a:p>
+        </p:txBody>
+      </p:sp>
+      <p:pic>
+        <p:nvPicPr>
+          <p:cNvPr id="11" name="Picture 10" descr="A bear that is standing in the dirt&#10;&#10;Description generated with very high confidence">
+            <a:extLst>
+              <a:ext uri="{FF2B5EF4-FFF2-40B4-BE49-F238E27FC236}">
+                <a16:creationId xmlns:a16="http://schemas.microsoft.com/office/drawing/2014/main" id="{FE785608-BE93-4EBC-B6E9-7DCDCB3D516A}"/>
+              </a:ext>
+            </a:extLst>
+          </p:cNvPr>
+          <p:cNvPicPr>
+            <a:picLocks noChangeAspect="1"/>
+          </p:cNvPicPr>
+          <p:nvPr/>
+        </p:nvPicPr>
+        <p:blipFill>
+          <a:blip r:embed="rId9">
+            <a:extLst>
+              <a:ext uri="{28A0092B-C50C-407E-A947-70E740481C1C}">
+                <a14:useLocalDpi xmlns:a14="http://schemas.microsoft.com/office/drawing/2010/main" val="0"/>
+              </a:ext>
+            </a:extLst>
+          </a:blip>
+          <a:stretch>
+            <a:fillRect/>
+          </a:stretch>
+        </p:blipFill>
+        <p:spPr>
+          <a:xfrm>
+            <a:off x="17437594" y="25937839"/>
+            <a:ext cx="9333891" cy="6242040"/>
+          </a:xfrm>
+          <a:prstGeom prst="rect">
+            <a:avLst/>
+          </a:prstGeom>
+        </p:spPr>
+      </p:pic>
+      <p:sp>
+        <p:nvSpPr>
+          <p:cNvPr id="12" name="Rectangle 1">
+            <a:extLst>
+              <a:ext uri="{FF2B5EF4-FFF2-40B4-BE49-F238E27FC236}">
+                <a16:creationId xmlns:a16="http://schemas.microsoft.com/office/drawing/2014/main" id="{1F864123-EE25-4597-B0C9-00113F25B27B}"/>
+              </a:ext>
+            </a:extLst>
+          </p:cNvPr>
+          <p:cNvSpPr>
+            <a:spLocks noChangeArrowheads="1"/>
+          </p:cNvSpPr>
+          <p:nvPr/>
+        </p:nvSpPr>
+        <p:spPr bwMode="auto">
+          <a:xfrm>
+            <a:off x="0" y="0"/>
+            <a:ext cx="43891200" cy="457200"/>
+          </a:xfrm>
+          <a:prstGeom prst="rect">
+            <a:avLst/>
+          </a:prstGeom>
+          <a:noFill/>
+          <a:ln>
+            <a:noFill/>
+          </a:ln>
+          <a:effectLst/>
+          <a:extLst>
+            <a:ext uri="{909E8E84-426E-40DD-AFC4-6F175D3DCCD1}">
+              <a14:hiddenFill xmlns:a14="http://schemas.microsoft.com/office/drawing/2010/main">
+                <a:solidFill>
+                  <a:schemeClr val="accent1"/>
+                </a:solidFill>
+              </a14:hiddenFill>
+            </a:ext>
+            <a:ext uri="{91240B29-F687-4F45-9708-019B960494DF}">
+              <a14:hiddenLine xmlns:a14="http://schemas.microsoft.com/office/drawing/2010/main" w="9525">
+                <a:solidFill>
+                  <a:schemeClr val="tx1"/>
+                </a:solidFill>
+                <a:miter lim="800000"/>
+                <a:headEnd/>
+                <a:tailEnd/>
+              </a14:hiddenLine>
+            </a:ext>
+            <a:ext uri="{AF507438-7753-43E0-B8FC-AC1667EBCBE1}">
+              <a14:hiddenEffects xmlns:a14="http://schemas.microsoft.com/office/drawing/2010/main">
+                <a:effectLst>
+                  <a:outerShdw dist="35921" dir="2700000" algn="ctr" rotWithShape="0">
+                    <a:schemeClr val="bg2"/>
+                  </a:outerShdw>
+                </a:effectLst>
+              </a14:hiddenEffects>
+            </a:ext>
+          </a:extLst>
+        </p:spPr>
+        <p:txBody>
+          <a:bodyPr vert="horz" wrap="none" lIns="91440" tIns="45720" rIns="91440" bIns="45720" numCol="1" anchor="ctr" anchorCtr="0" compatLnSpc="1">
+            <a:prstTxWarp prst="textNoShape">
+              <a:avLst/>
+            </a:prstTxWarp>
+            <a:spAutoFit/>
+          </a:bodyPr>
+          <a:lstStyle/>
+          <a:p>
+            <a:pPr marL="0" marR="0" lvl="0" indent="0" algn="l" defTabSz="914400" rtl="0" eaLnBrk="0" fontAlgn="base" latinLnBrk="0" hangingPunct="0">
+              <a:lnSpc>
+                <a:spcPct val="100000"/>
+              </a:lnSpc>
+              <a:spcBef>
+                <a:spcPct val="0"/>
+              </a:spcBef>
+              <a:spcAft>
+                <a:spcPct val="0"/>
+              </a:spcAft>
+              <a:buClrTx/>
+              <a:buSzTx/>
+              <a:buFontTx/>
+              <a:buNone/>
+              <a:tabLst/>
+            </a:pPr>
+            <a:r>
+              <a:rPr kumimoji="0" lang="en-US" altLang="en-US" sz="1100" b="0" i="0" u="none" strike="noStrike" cap="none" normalizeH="0" baseline="0">
+                <a:ln>
+                  <a:noFill/>
+                </a:ln>
+                <a:solidFill>
+                  <a:schemeClr val="tx1"/>
+                </a:solidFill>
+                <a:effectLst/>
+                <a:latin typeface="Calibri" panose="020F0502020204030204" pitchFamily="34" charset="0"/>
+                <a:ea typeface="Yu Mincho" panose="02020400000000000000" pitchFamily="18" charset="-128"/>
+                <a:cs typeface="Times New Roman" panose="02020603050405020304" pitchFamily="18" charset="0"/>
+              </a:rPr>
+              <a:t>Arbeaez, P., Maire, M., Fowlkes, C., &amp; Malik, J. (2010). Contour Detection and Hierarchical Image Segmentation. </a:t>
+            </a:r>
+            <a:r>
+              <a:rPr kumimoji="0" lang="en-US" altLang="en-US" sz="1100" b="0" i="1" u="none" strike="noStrike" cap="none" normalizeH="0" baseline="0">
+                <a:ln>
+                  <a:noFill/>
+                </a:ln>
+                <a:solidFill>
+                  <a:schemeClr val="tx1"/>
+                </a:solidFill>
+                <a:effectLst/>
+                <a:latin typeface="Calibri" panose="020F0502020204030204" pitchFamily="34" charset="0"/>
+                <a:ea typeface="Yu Mincho" panose="02020400000000000000" pitchFamily="18" charset="-128"/>
+                <a:cs typeface="Times New Roman" panose="02020603050405020304" pitchFamily="18" charset="0"/>
+              </a:rPr>
+              <a:t>IEEE Transactions on Pattern Analysis and Machine Intelligence</a:t>
+            </a:r>
+            <a:r>
+              <a:rPr kumimoji="0" lang="en-US" altLang="en-US" sz="1100" b="0" i="0" u="none" strike="noStrike" cap="none" normalizeH="0" baseline="0">
+                <a:ln>
+                  <a:noFill/>
+                </a:ln>
+                <a:solidFill>
+                  <a:schemeClr val="tx1"/>
+                </a:solidFill>
+                <a:effectLst/>
+                <a:latin typeface="Calibri" panose="020F0502020204030204" pitchFamily="34" charset="0"/>
+                <a:ea typeface="Yu Mincho" panose="02020400000000000000" pitchFamily="18" charset="-128"/>
+                <a:cs typeface="Times New Roman" panose="02020603050405020304" pitchFamily="18" charset="0"/>
+              </a:rPr>
+              <a:t>, 898 - 916.</a:t>
+            </a:r>
+            <a:endParaRPr kumimoji="0" lang="en-US" altLang="en-US" sz="2800" b="0" i="0" u="none" strike="noStrike" cap="none" normalizeH="0" baseline="0">
+              <a:ln>
+                <a:noFill/>
+              </a:ln>
+              <a:solidFill>
+                <a:schemeClr val="tx1"/>
+              </a:solidFill>
+              <a:effectLst/>
+            </a:endParaRPr>
+          </a:p>
+          <a:p>
+            <a:pPr marL="0" marR="0" lvl="0" indent="0" algn="l" defTabSz="914400" rtl="0" eaLnBrk="0" fontAlgn="base" latinLnBrk="0" hangingPunct="0">
+              <a:lnSpc>
+                <a:spcPct val="100000"/>
+              </a:lnSpc>
+              <a:spcBef>
+                <a:spcPct val="0"/>
+              </a:spcBef>
+              <a:spcAft>
+                <a:spcPct val="0"/>
+              </a:spcAft>
+              <a:buClrTx/>
+              <a:buSzTx/>
+              <a:buFontTx/>
+              <a:buNone/>
+              <a:tabLst/>
+            </a:pPr>
+            <a:endParaRPr kumimoji="0" lang="en-US" altLang="en-US" sz="1800" b="0" i="0" u="none" strike="noStrike" cap="none" normalizeH="0" baseline="0">
+              <a:ln>
+                <a:noFill/>
+              </a:ln>
+              <a:solidFill>
+                <a:schemeClr val="tx1"/>
+              </a:solidFill>
+              <a:effectLst/>
+              <a:latin typeface="Arial" panose="020B0604020202020204" pitchFamily="34" charset="0"/>
             </a:endParaRPr>
           </a:p>
         </p:txBody>
       </p:sp>
     </p:spTree>
   </p:cSld>
+  <p:clrMapOvr>
+    <a:masterClrMapping/>
+  </p:clrMapOvr>
   <p:timing>
     <p:tnLst>
       <p:par>
@@ -3399,14 +4653,14 @@
             <p:seq>
               <p:cTn id="2" dur="indefinite" nodeType="mainSeq"/>
               <p:prevCondLst>
-                <p:cond delay="0" evt="onPrev">
+                <p:cond evt="onPrev" delay="0">
                   <p:tgtEl>
                     <p:sldTgt/>
                   </p:tgtEl>
                 </p:cond>
               </p:prevCondLst>
               <p:nextCondLst>
-                <p:cond delay="0" evt="onNext">
+                <p:cond evt="onNext" delay="0">
                   <p:tgtEl>
                     <p:sldTgt/>
                   </p:tgtEl>
@@ -3432,31 +4686,31 @@
         <a:sysClr val="window" lastClr="FFFFFF"/>
       </a:lt1>
       <a:dk2>
-        <a:srgbClr val="1b1b1b"/>
+        <a:srgbClr val="1B1B1B"/>
       </a:dk2>
       <a:lt2>
-        <a:srgbClr val="e5e8e8"/>
+        <a:srgbClr val="E5E8E8"/>
       </a:lt2>
       <a:accent1>
-        <a:srgbClr val="00b0ea"/>
+        <a:srgbClr val="00B0EA"/>
       </a:accent1>
       <a:accent2>
-        <a:srgbClr val="45ae22"/>
+        <a:srgbClr val="45AE22"/>
       </a:accent2>
       <a:accent3>
-        <a:srgbClr val="ffff00"/>
+        <a:srgbClr val="FFFF00"/>
       </a:accent3>
       <a:accent4>
-        <a:srgbClr val="f2760d"/>
+        <a:srgbClr val="F2760D"/>
       </a:accent4>
       <a:accent5>
-        <a:srgbClr val="bb2b35"/>
+        <a:srgbClr val="BB2B35"/>
       </a:accent5>
       <a:accent6>
-        <a:srgbClr val="6c3ca2"/>
+        <a:srgbClr val="6C3CA2"/>
       </a:accent6>
       <a:hlink>
-        <a:srgbClr val="00b0ea"/>
+        <a:srgbClr val="00B0EA"/>
       </a:hlink>
       <a:folHlink>
         <a:srgbClr val="969696"/>
@@ -3641,6 +4895,8 @@
       </a:bgFillStyleLst>
     </a:fmtScheme>
   </a:themeElements>
+  <a:objectDefaults/>
+  <a:extraClrSchemeLst/>
 </a:theme>
 </file>
 
@@ -3655,31 +4911,31 @@
         <a:sysClr val="window" lastClr="FFFFFF"/>
       </a:lt1>
       <a:dk2>
-        <a:srgbClr val="1b1b1b"/>
+        <a:srgbClr val="1B1B1B"/>
       </a:dk2>
       <a:lt2>
-        <a:srgbClr val="e5e8e8"/>
+        <a:srgbClr val="E5E8E8"/>
       </a:lt2>
       <a:accent1>
-        <a:srgbClr val="00b0ea"/>
+        <a:srgbClr val="00B0EA"/>
       </a:accent1>
       <a:accent2>
-        <a:srgbClr val="45ae22"/>
+        <a:srgbClr val="45AE22"/>
       </a:accent2>
       <a:accent3>
-        <a:srgbClr val="ffff00"/>
+        <a:srgbClr val="FFFF00"/>
       </a:accent3>
       <a:accent4>
-        <a:srgbClr val="f2760d"/>
+        <a:srgbClr val="F2760D"/>
       </a:accent4>
       <a:accent5>
-        <a:srgbClr val="bb2b35"/>
+        <a:srgbClr val="BB2B35"/>
       </a:accent5>
       <a:accent6>
-        <a:srgbClr val="6c3ca2"/>
+        <a:srgbClr val="6C3CA2"/>
       </a:accent6>
       <a:hlink>
-        <a:srgbClr val="00b0ea"/>
+        <a:srgbClr val="00B0EA"/>
       </a:hlink>
       <a:folHlink>
         <a:srgbClr val="969696"/>
@@ -3864,5 +5120,7 @@
       </a:bgFillStyleLst>
     </a:fmtScheme>
   </a:themeElements>
+  <a:objectDefaults/>
+  <a:extraClrSchemeLst/>
 </a:theme>
 </file>
</xml_diff>

<commit_message>
Uploading Poster V1 to take to writing center.
</commit_message>
<xml_diff>
--- a/Posters/JacobORDSpring2019.pptx
+++ b/Posters/JacobORDSpring2019.pptx
@@ -107,6 +107,11 @@
       </a:defRPr>
     </a:lvl9pPr>
   </p:defaultTextStyle>
+  <p:extLst>
+    <p:ext uri="{EFAFB233-063F-42B5-8137-9DF3F51BA10A}">
+      <p15:sldGuideLst xmlns:p15="http://schemas.microsoft.com/office/powerpoint/2012/main"/>
+    </p:ext>
+  </p:extLst>
 </p:presentation>
 </file>
 
@@ -3697,7 +3702,7 @@
         </p:nvSpPr>
         <p:spPr>
           <a:xfrm>
-            <a:off x="15615000" y="24474600"/>
+            <a:off x="15615000" y="24036913"/>
             <a:ext cx="12800520" cy="1218240"/>
           </a:xfrm>
           <a:prstGeom prst="rect">
@@ -3818,41 +3823,8 @@
                 <a:latin typeface="Arial"/>
                 <a:ea typeface="DejaVu Sans"/>
               </a:rPr>
-              <a:t>One of the goals of this project is for the team to familiarize themselves with machine learning concepts and tools. This benefit </a:t>
-            </a:r>
-            <a:r>
-              <a:rPr lang="en-US" sz="4000" b="0" strike="noStrike" spc="-1">
-                <a:solidFill>
-                  <a:srgbClr val="000000"/>
-                </a:solidFill>
-                <a:latin typeface="Arial"/>
-                <a:ea typeface="DejaVu Sans"/>
-              </a:rPr>
-              <a:t>is two-fold, </a:t>
-            </a:r>
-            <a:r>
-              <a:rPr lang="en-US" sz="4000" b="0" strike="noStrike" spc="-1" dirty="0">
-                <a:solidFill>
-                  <a:srgbClr val="000000"/>
-                </a:solidFill>
-                <a:latin typeface="Arial"/>
-                <a:ea typeface="DejaVu Sans"/>
-              </a:rPr>
-              <a:t>in that it prepares the researcher to continue to research more specific and advanced topics as well as allows new students interested in the topic a resource they would have easy access to. </a:t>
-            </a:r>
-            <a:endParaRPr lang="en-US" sz="4000" b="0" strike="noStrike" spc="-1" dirty="0">
-              <a:latin typeface="Arial"/>
-            </a:endParaRPr>
-          </a:p>
-          <a:p>
-            <a:pPr>
-              <a:lnSpc>
-                <a:spcPct val="100000"/>
-              </a:lnSpc>
-              <a:spcBef>
-                <a:spcPts val="1199"/>
-              </a:spcBef>
-            </a:pPr>
+              <a:t>One of the goals of this project is for the team to familiarize themselves with machine learning concepts and tools. This has two main benefits: it prepares the researcher to potentially find other avenues of research in this area and gives newer students interested in this research area a resource for them to get started. </a:t>
+            </a:r>
             <a:endParaRPr lang="en-US" sz="4000" b="0" strike="noStrike" spc="-1" dirty="0">
               <a:latin typeface="Arial"/>
             </a:endParaRPr>
@@ -3867,7 +3839,7 @@
         </p:nvSpPr>
         <p:spPr>
           <a:xfrm>
-            <a:off x="15615000" y="26236800"/>
+            <a:off x="15775594" y="26207314"/>
             <a:ext cx="12800520" cy="4508280"/>
           </a:xfrm>
           <a:prstGeom prst="rect">
@@ -4466,7 +4438,7 @@
         </p:blipFill>
         <p:spPr>
           <a:xfrm>
-            <a:off x="17437594" y="25937839"/>
+            <a:off x="17437594" y="25593733"/>
             <a:ext cx="9333891" cy="6242040"/>
           </a:xfrm>
           <a:prstGeom prst="rect">

</xml_diff>